<commit_message>
add agenda and change intro slides
</commit_message>
<xml_diff>
--- a/Serverless perspectives.pptx
+++ b/Serverless perspectives.pptx
@@ -7,13 +7,15 @@
   <p:sldIdLst>
     <p:sldId id="257" r:id="rId2"/>
     <p:sldId id="263" r:id="rId3"/>
-    <p:sldId id="258" r:id="rId4"/>
-    <p:sldId id="259" r:id="rId5"/>
-    <p:sldId id="264" r:id="rId6"/>
-    <p:sldId id="260" r:id="rId7"/>
-    <p:sldId id="261" r:id="rId8"/>
-    <p:sldId id="262" r:id="rId9"/>
-    <p:sldId id="265" r:id="rId10"/>
+    <p:sldId id="267" r:id="rId4"/>
+    <p:sldId id="266" r:id="rId5"/>
+    <p:sldId id="258" r:id="rId6"/>
+    <p:sldId id="259" r:id="rId7"/>
+    <p:sldId id="264" r:id="rId8"/>
+    <p:sldId id="260" r:id="rId9"/>
+    <p:sldId id="261" r:id="rId10"/>
+    <p:sldId id="262" r:id="rId11"/>
+    <p:sldId id="265" r:id="rId12"/>
   </p:sldIdLst>
   <p:sldSz cx="12192000" cy="6858000"/>
   <p:notesSz cx="6858000" cy="9144000"/>
@@ -260,7 +262,7 @@
           <a:p>
             <a:fld id="{2FCDDBFB-5A55-4C7D-9621-3F1CC18082CF}" type="datetimeFigureOut">
               <a:rPr lang="en-US" smtClean="0"/>
-              <a:t>2/20/2017</a:t>
+              <a:t>2/21/2017</a:t>
             </a:fld>
             <a:endParaRPr lang="en-US"/>
           </a:p>
@@ -428,7 +430,7 @@
           <a:p>
             <a:fld id="{2FCDDBFB-5A55-4C7D-9621-3F1CC18082CF}" type="datetimeFigureOut">
               <a:rPr lang="en-US" smtClean="0"/>
-              <a:t>2/20/2017</a:t>
+              <a:t>2/21/2017</a:t>
             </a:fld>
             <a:endParaRPr lang="en-US"/>
           </a:p>
@@ -606,7 +608,7 @@
           <a:p>
             <a:fld id="{2FCDDBFB-5A55-4C7D-9621-3F1CC18082CF}" type="datetimeFigureOut">
               <a:rPr lang="en-US" smtClean="0"/>
-              <a:t>2/20/2017</a:t>
+              <a:t>2/21/2017</a:t>
             </a:fld>
             <a:endParaRPr lang="en-US"/>
           </a:p>
@@ -774,7 +776,7 @@
           <a:p>
             <a:fld id="{2FCDDBFB-5A55-4C7D-9621-3F1CC18082CF}" type="datetimeFigureOut">
               <a:rPr lang="en-US" smtClean="0"/>
-              <a:t>2/20/2017</a:t>
+              <a:t>2/21/2017</a:t>
             </a:fld>
             <a:endParaRPr lang="en-US"/>
           </a:p>
@@ -1019,7 +1021,7 @@
           <a:p>
             <a:fld id="{2FCDDBFB-5A55-4C7D-9621-3F1CC18082CF}" type="datetimeFigureOut">
               <a:rPr lang="en-US" smtClean="0"/>
-              <a:t>2/20/2017</a:t>
+              <a:t>2/21/2017</a:t>
             </a:fld>
             <a:endParaRPr lang="en-US"/>
           </a:p>
@@ -1248,7 +1250,7 @@
           <a:p>
             <a:fld id="{2FCDDBFB-5A55-4C7D-9621-3F1CC18082CF}" type="datetimeFigureOut">
               <a:rPr lang="en-US" smtClean="0"/>
-              <a:t>2/20/2017</a:t>
+              <a:t>2/21/2017</a:t>
             </a:fld>
             <a:endParaRPr lang="en-US"/>
           </a:p>
@@ -1612,7 +1614,7 @@
           <a:p>
             <a:fld id="{2FCDDBFB-5A55-4C7D-9621-3F1CC18082CF}" type="datetimeFigureOut">
               <a:rPr lang="en-US" smtClean="0"/>
-              <a:t>2/20/2017</a:t>
+              <a:t>2/21/2017</a:t>
             </a:fld>
             <a:endParaRPr lang="en-US"/>
           </a:p>
@@ -1729,7 +1731,7 @@
           <a:p>
             <a:fld id="{2FCDDBFB-5A55-4C7D-9621-3F1CC18082CF}" type="datetimeFigureOut">
               <a:rPr lang="en-US" smtClean="0"/>
-              <a:t>2/20/2017</a:t>
+              <a:t>2/21/2017</a:t>
             </a:fld>
             <a:endParaRPr lang="en-US"/>
           </a:p>
@@ -1824,7 +1826,7 @@
           <a:p>
             <a:fld id="{2FCDDBFB-5A55-4C7D-9621-3F1CC18082CF}" type="datetimeFigureOut">
               <a:rPr lang="en-US" smtClean="0"/>
-              <a:t>2/20/2017</a:t>
+              <a:t>2/21/2017</a:t>
             </a:fld>
             <a:endParaRPr lang="en-US"/>
           </a:p>
@@ -2099,7 +2101,7 @@
           <a:p>
             <a:fld id="{2FCDDBFB-5A55-4C7D-9621-3F1CC18082CF}" type="datetimeFigureOut">
               <a:rPr lang="en-US" smtClean="0"/>
-              <a:t>2/20/2017</a:t>
+              <a:t>2/21/2017</a:t>
             </a:fld>
             <a:endParaRPr lang="en-US"/>
           </a:p>
@@ -2351,7 +2353,7 @@
           <a:p>
             <a:fld id="{2FCDDBFB-5A55-4C7D-9621-3F1CC18082CF}" type="datetimeFigureOut">
               <a:rPr lang="en-US" smtClean="0"/>
-              <a:t>2/20/2017</a:t>
+              <a:t>2/21/2017</a:t>
             </a:fld>
             <a:endParaRPr lang="en-US"/>
           </a:p>
@@ -2565,7 +2567,7 @@
           <a:p>
             <a:fld id="{2FCDDBFB-5A55-4C7D-9621-3F1CC18082CF}" type="datetimeFigureOut">
               <a:rPr lang="en-US" smtClean="0"/>
-              <a:t>2/20/2017</a:t>
+              <a:t>2/21/2017</a:t>
             </a:fld>
             <a:endParaRPr lang="en-US"/>
           </a:p>
@@ -3064,7 +3066,7 @@
 </p:sld>
 </file>
 
-<file path=ppt/slides/slide2.xml><?xml version="1.0" encoding="utf-8"?>
+<file path=ppt/slides/slide10.xml><?xml version="1.0" encoding="utf-8"?>
 <p:sld xmlns:a="http://schemas.openxmlformats.org/drawingml/2006/main" xmlns:r="http://schemas.openxmlformats.org/officeDocument/2006/relationships" xmlns:p="http://schemas.openxmlformats.org/presentationml/2006/main">
   <p:cSld>
     <p:spTree>
@@ -3102,618 +3104,6 @@
                   <a:schemeClr val="accent4"/>
                 </a:solidFill>
               </a:rPr>
-              <a:t>Make our claim</a:t>
-            </a:r>
-          </a:p>
-        </p:txBody>
-      </p:sp>
-      <p:sp>
-        <p:nvSpPr>
-          <p:cNvPr id="3" name="Content Placeholder 2"/>
-          <p:cNvSpPr>
-            <a:spLocks noGrp="1"/>
-          </p:cNvSpPr>
-          <p:nvPr>
-            <p:ph idx="1"/>
-          </p:nvPr>
-        </p:nvSpPr>
-        <p:spPr/>
-        <p:txBody>
-          <a:bodyPr/>
-          <a:lstStyle/>
-          <a:p>
-            <a:r>
-              <a:rPr lang="en-US" dirty="0" err="1"/>
-              <a:t>Serverless</a:t>
-            </a:r>
-            <a:r>
-              <a:rPr lang="en-US" dirty="0"/>
-              <a:t> is the pinnacle of the DevOps movement</a:t>
-            </a:r>
-          </a:p>
-          <a:p>
-            <a:r>
-              <a:rPr lang="en-US" dirty="0"/>
-              <a:t>We think </a:t>
-            </a:r>
-            <a:r>
-              <a:rPr lang="en-US" dirty="0" err="1"/>
-              <a:t>serverless</a:t>
-            </a:r>
-            <a:r>
-              <a:rPr lang="en-US" dirty="0"/>
-              <a:t> is the best opportunity for adopting DevOps best practices at your organization</a:t>
-            </a:r>
-          </a:p>
-        </p:txBody>
-      </p:sp>
-    </p:spTree>
-    <p:extLst>
-      <p:ext uri="{BB962C8B-B14F-4D97-AF65-F5344CB8AC3E}">
-        <p14:creationId xmlns:p14="http://schemas.microsoft.com/office/powerpoint/2010/main" val="2056317850"/>
-      </p:ext>
-    </p:extLst>
-  </p:cSld>
-  <p:clrMapOvr>
-    <a:masterClrMapping/>
-  </p:clrMapOvr>
-</p:sld>
-</file>
-
-<file path=ppt/slides/slide3.xml><?xml version="1.0" encoding="utf-8"?>
-<p:sld xmlns:a="http://schemas.openxmlformats.org/drawingml/2006/main" xmlns:r="http://schemas.openxmlformats.org/officeDocument/2006/relationships" xmlns:p="http://schemas.openxmlformats.org/presentationml/2006/main">
-  <p:cSld>
-    <p:spTree>
-      <p:nvGrpSpPr>
-        <p:cNvPr id="1" name=""/>
-        <p:cNvGrpSpPr/>
-        <p:nvPr/>
-      </p:nvGrpSpPr>
-      <p:grpSpPr>
-        <a:xfrm>
-          <a:off x="0" y="0"/>
-          <a:ext cx="0" cy="0"/>
-          <a:chOff x="0" y="0"/>
-          <a:chExt cx="0" cy="0"/>
-        </a:xfrm>
-      </p:grpSpPr>
-      <p:sp>
-        <p:nvSpPr>
-          <p:cNvPr id="2" name="Title 1"/>
-          <p:cNvSpPr>
-            <a:spLocks noGrp="1"/>
-          </p:cNvSpPr>
-          <p:nvPr>
-            <p:ph type="title"/>
-          </p:nvPr>
-        </p:nvSpPr>
-        <p:spPr/>
-        <p:txBody>
-          <a:bodyPr/>
-          <a:lstStyle/>
-          <a:p>
-            <a:r>
-              <a:rPr lang="en-US" b="1" dirty="0">
-                <a:solidFill>
-                  <a:schemeClr val="accent4"/>
-                </a:solidFill>
-              </a:rPr>
-              <a:t>Define what we’re talking about</a:t>
-            </a:r>
-          </a:p>
-        </p:txBody>
-      </p:sp>
-      <p:sp>
-        <p:nvSpPr>
-          <p:cNvPr id="3" name="Content Placeholder 2"/>
-          <p:cNvSpPr>
-            <a:spLocks noGrp="1"/>
-          </p:cNvSpPr>
-          <p:nvPr>
-            <p:ph idx="1"/>
-          </p:nvPr>
-        </p:nvSpPr>
-        <p:spPr/>
-        <p:txBody>
-          <a:bodyPr/>
-          <a:lstStyle/>
-          <a:p>
-            <a:r>
-              <a:rPr lang="en-US" dirty="0" err="1"/>
-              <a:t>Serverless</a:t>
-            </a:r>
-            <a:r>
-              <a:rPr lang="en-US" dirty="0"/>
-              <a:t> as general pattern</a:t>
-            </a:r>
-          </a:p>
-          <a:p>
-            <a:r>
-              <a:rPr lang="en-US" dirty="0"/>
-              <a:t>Specifically using experience we have with using the </a:t>
-            </a:r>
-            <a:r>
-              <a:rPr lang="en-US" dirty="0" err="1"/>
-              <a:t>Serverless</a:t>
-            </a:r>
-            <a:r>
-              <a:rPr lang="en-US" dirty="0"/>
-              <a:t> Framework on AWS</a:t>
-            </a:r>
-          </a:p>
-        </p:txBody>
-      </p:sp>
-    </p:spTree>
-    <p:extLst>
-      <p:ext uri="{BB962C8B-B14F-4D97-AF65-F5344CB8AC3E}">
-        <p14:creationId xmlns:p14="http://schemas.microsoft.com/office/powerpoint/2010/main" val="3922689527"/>
-      </p:ext>
-    </p:extLst>
-  </p:cSld>
-  <p:clrMapOvr>
-    <a:masterClrMapping/>
-  </p:clrMapOvr>
-</p:sld>
-</file>
-
-<file path=ppt/slides/slide4.xml><?xml version="1.0" encoding="utf-8"?>
-<p:sld xmlns:a="http://schemas.openxmlformats.org/drawingml/2006/main" xmlns:r="http://schemas.openxmlformats.org/officeDocument/2006/relationships" xmlns:p="http://schemas.openxmlformats.org/presentationml/2006/main">
-  <p:cSld>
-    <p:spTree>
-      <p:nvGrpSpPr>
-        <p:cNvPr id="1" name=""/>
-        <p:cNvGrpSpPr/>
-        <p:nvPr/>
-      </p:nvGrpSpPr>
-      <p:grpSpPr>
-        <a:xfrm>
-          <a:off x="0" y="0"/>
-          <a:ext cx="0" cy="0"/>
-          <a:chOff x="0" y="0"/>
-          <a:chExt cx="0" cy="0"/>
-        </a:xfrm>
-      </p:grpSpPr>
-      <p:sp>
-        <p:nvSpPr>
-          <p:cNvPr id="2" name="Title 1"/>
-          <p:cNvSpPr>
-            <a:spLocks noGrp="1"/>
-          </p:cNvSpPr>
-          <p:nvPr>
-            <p:ph type="title"/>
-          </p:nvPr>
-        </p:nvSpPr>
-        <p:spPr/>
-        <p:txBody>
-          <a:bodyPr/>
-          <a:lstStyle/>
-          <a:p>
-            <a:r>
-              <a:rPr lang="en-US" b="1" dirty="0">
-                <a:solidFill>
-                  <a:schemeClr val="accent4"/>
-                </a:solidFill>
-              </a:rPr>
-              <a:t>DevOps best practices</a:t>
-            </a:r>
-          </a:p>
-        </p:txBody>
-      </p:sp>
-      <p:sp>
-        <p:nvSpPr>
-          <p:cNvPr id="3" name="Content Placeholder 2"/>
-          <p:cNvSpPr>
-            <a:spLocks noGrp="1"/>
-          </p:cNvSpPr>
-          <p:nvPr>
-            <p:ph idx="1"/>
-          </p:nvPr>
-        </p:nvSpPr>
-        <p:spPr/>
-        <p:txBody>
-          <a:bodyPr/>
-          <a:lstStyle/>
-          <a:p>
-            <a:r>
-              <a:rPr lang="en-US" dirty="0"/>
-              <a:t>Infrastructure as code</a:t>
-            </a:r>
-          </a:p>
-          <a:p>
-            <a:r>
-              <a:rPr lang="en-US" dirty="0"/>
-              <a:t>CI/CD for increased speed and stability</a:t>
-            </a:r>
-          </a:p>
-          <a:p>
-            <a:r>
-              <a:rPr lang="en-US" dirty="0"/>
-              <a:t>Monoliths to microservices to functions</a:t>
-            </a:r>
-          </a:p>
-          <a:p>
-            <a:r>
-              <a:rPr lang="en-US" dirty="0"/>
-              <a:t>Small teams, highly cohesive and loosely coupled</a:t>
-            </a:r>
-          </a:p>
-          <a:p>
-            <a:r>
-              <a:rPr lang="en-US" dirty="0"/>
-              <a:t>Only pay for what you use</a:t>
-            </a:r>
-          </a:p>
-          <a:p>
-            <a:r>
-              <a:rPr lang="en-US" dirty="0"/>
-              <a:t>Polyglot – the right language/framework for the job</a:t>
-            </a:r>
-          </a:p>
-        </p:txBody>
-      </p:sp>
-    </p:spTree>
-    <p:extLst>
-      <p:ext uri="{BB962C8B-B14F-4D97-AF65-F5344CB8AC3E}">
-        <p14:creationId xmlns:p14="http://schemas.microsoft.com/office/powerpoint/2010/main" val="1859706539"/>
-      </p:ext>
-    </p:extLst>
-  </p:cSld>
-  <p:clrMapOvr>
-    <a:masterClrMapping/>
-  </p:clrMapOvr>
-</p:sld>
-</file>
-
-<file path=ppt/slides/slide5.xml><?xml version="1.0" encoding="utf-8"?>
-<p:sld xmlns:a="http://schemas.openxmlformats.org/drawingml/2006/main" xmlns:r="http://schemas.openxmlformats.org/officeDocument/2006/relationships" xmlns:p="http://schemas.openxmlformats.org/presentationml/2006/main">
-  <p:cSld>
-    <p:spTree>
-      <p:nvGrpSpPr>
-        <p:cNvPr id="1" name=""/>
-        <p:cNvGrpSpPr/>
-        <p:nvPr/>
-      </p:nvGrpSpPr>
-      <p:grpSpPr>
-        <a:xfrm>
-          <a:off x="0" y="0"/>
-          <a:ext cx="0" cy="0"/>
-          <a:chOff x="0" y="0"/>
-          <a:chExt cx="0" cy="0"/>
-        </a:xfrm>
-      </p:grpSpPr>
-      <p:sp>
-        <p:nvSpPr>
-          <p:cNvPr id="2" name="Title 1"/>
-          <p:cNvSpPr>
-            <a:spLocks noGrp="1"/>
-          </p:cNvSpPr>
-          <p:nvPr>
-            <p:ph type="title"/>
-          </p:nvPr>
-        </p:nvSpPr>
-        <p:spPr/>
-        <p:txBody>
-          <a:bodyPr/>
-          <a:lstStyle/>
-          <a:p>
-            <a:r>
-              <a:rPr lang="en-US" b="1" dirty="0">
-                <a:solidFill>
-                  <a:schemeClr val="accent4"/>
-                </a:solidFill>
-              </a:rPr>
-              <a:t>Benefits of </a:t>
-            </a:r>
-            <a:r>
-              <a:rPr lang="en-US" b="1" dirty="0" err="1">
-                <a:solidFill>
-                  <a:schemeClr val="accent4"/>
-                </a:solidFill>
-              </a:rPr>
-              <a:t>serverless</a:t>
-            </a:r>
-            <a:endParaRPr lang="en-US" b="1" dirty="0">
-              <a:solidFill>
-                <a:schemeClr val="accent4"/>
-              </a:solidFill>
-            </a:endParaRPr>
-          </a:p>
-        </p:txBody>
-      </p:sp>
-      <p:sp>
-        <p:nvSpPr>
-          <p:cNvPr id="3" name="Content Placeholder 2"/>
-          <p:cNvSpPr>
-            <a:spLocks noGrp="1"/>
-          </p:cNvSpPr>
-          <p:nvPr>
-            <p:ph idx="1"/>
-          </p:nvPr>
-        </p:nvSpPr>
-        <p:spPr/>
-        <p:txBody>
-          <a:bodyPr/>
-          <a:lstStyle/>
-          <a:p>
-            <a:r>
-              <a:rPr lang="en-US" dirty="0"/>
-              <a:t>True variable cost computing</a:t>
-            </a:r>
-          </a:p>
-          <a:p>
-            <a:r>
-              <a:rPr lang="en-US" dirty="0"/>
-              <a:t>Time to market goes from months or weeks to days or hours</a:t>
-            </a:r>
-          </a:p>
-          <a:p>
-            <a:r>
-              <a:rPr lang="en-US" dirty="0"/>
-              <a:t>Built in support for things you should be doing already</a:t>
-            </a:r>
-          </a:p>
-          <a:p>
-            <a:pPr lvl="1"/>
-            <a:r>
-              <a:rPr lang="en-US" dirty="0"/>
-              <a:t>Infrastructure as code</a:t>
-            </a:r>
-          </a:p>
-          <a:p>
-            <a:pPr lvl="1"/>
-            <a:r>
-              <a:rPr lang="en-US" dirty="0"/>
-              <a:t>API driven development and data analysis to inform product development</a:t>
-            </a:r>
-          </a:p>
-          <a:p>
-            <a:pPr lvl="1"/>
-            <a:r>
-              <a:rPr lang="en-US" dirty="0"/>
-              <a:t>Small teams</a:t>
-            </a:r>
-          </a:p>
-        </p:txBody>
-      </p:sp>
-    </p:spTree>
-    <p:extLst>
-      <p:ext uri="{BB962C8B-B14F-4D97-AF65-F5344CB8AC3E}">
-        <p14:creationId xmlns:p14="http://schemas.microsoft.com/office/powerpoint/2010/main" val="2276068305"/>
-      </p:ext>
-    </p:extLst>
-  </p:cSld>
-  <p:clrMapOvr>
-    <a:masterClrMapping/>
-  </p:clrMapOvr>
-</p:sld>
-</file>
-
-<file path=ppt/slides/slide6.xml><?xml version="1.0" encoding="utf-8"?>
-<p:sld xmlns:a="http://schemas.openxmlformats.org/drawingml/2006/main" xmlns:r="http://schemas.openxmlformats.org/officeDocument/2006/relationships" xmlns:p="http://schemas.openxmlformats.org/presentationml/2006/main">
-  <p:cSld>
-    <p:spTree>
-      <p:nvGrpSpPr>
-        <p:cNvPr id="1" name=""/>
-        <p:cNvGrpSpPr/>
-        <p:nvPr/>
-      </p:nvGrpSpPr>
-      <p:grpSpPr>
-        <a:xfrm>
-          <a:off x="0" y="0"/>
-          <a:ext cx="0" cy="0"/>
-          <a:chOff x="0" y="0"/>
-          <a:chExt cx="0" cy="0"/>
-        </a:xfrm>
-      </p:grpSpPr>
-      <p:sp>
-        <p:nvSpPr>
-          <p:cNvPr id="2" name="Title 1"/>
-          <p:cNvSpPr>
-            <a:spLocks noGrp="1"/>
-          </p:cNvSpPr>
-          <p:nvPr>
-            <p:ph type="title"/>
-          </p:nvPr>
-        </p:nvSpPr>
-        <p:spPr/>
-        <p:txBody>
-          <a:bodyPr/>
-          <a:lstStyle/>
-          <a:p>
-            <a:r>
-              <a:rPr lang="en-US" b="1" dirty="0" err="1">
-                <a:solidFill>
-                  <a:schemeClr val="accent4"/>
-                </a:solidFill>
-              </a:rPr>
-              <a:t>Serverless</a:t>
-            </a:r>
-            <a:r>
-              <a:rPr lang="en-US" b="1" dirty="0">
-                <a:solidFill>
-                  <a:schemeClr val="accent4"/>
-                </a:solidFill>
-              </a:rPr>
-              <a:t> as Trojan horse</a:t>
-            </a:r>
-          </a:p>
-        </p:txBody>
-      </p:sp>
-      <p:sp>
-        <p:nvSpPr>
-          <p:cNvPr id="3" name="Content Placeholder 2"/>
-          <p:cNvSpPr>
-            <a:spLocks noGrp="1"/>
-          </p:cNvSpPr>
-          <p:nvPr>
-            <p:ph idx="1"/>
-          </p:nvPr>
-        </p:nvSpPr>
-        <p:spPr/>
-        <p:txBody>
-          <a:bodyPr/>
-          <a:lstStyle/>
-          <a:p>
-            <a:r>
-              <a:rPr lang="en-US" dirty="0"/>
-              <a:t>It’s like magic – haven’t met a developer who didn’t love it</a:t>
-            </a:r>
-          </a:p>
-          <a:p>
-            <a:r>
-              <a:rPr lang="en-US" dirty="0"/>
-              <a:t>Easy to use, easy to experiment with</a:t>
-            </a:r>
-          </a:p>
-          <a:p>
-            <a:r>
-              <a:rPr lang="en-US" dirty="0"/>
-              <a:t>Low cost to learn, develop with, experiment with – only cost is time, no infrastructure or hosting</a:t>
-            </a:r>
-          </a:p>
-        </p:txBody>
-      </p:sp>
-    </p:spTree>
-    <p:extLst>
-      <p:ext uri="{BB962C8B-B14F-4D97-AF65-F5344CB8AC3E}">
-        <p14:creationId xmlns:p14="http://schemas.microsoft.com/office/powerpoint/2010/main" val="3178848806"/>
-      </p:ext>
-    </p:extLst>
-  </p:cSld>
-  <p:clrMapOvr>
-    <a:masterClrMapping/>
-  </p:clrMapOvr>
-</p:sld>
-</file>
-
-<file path=ppt/slides/slide7.xml><?xml version="1.0" encoding="utf-8"?>
-<p:sld xmlns:a="http://schemas.openxmlformats.org/drawingml/2006/main" xmlns:r="http://schemas.openxmlformats.org/officeDocument/2006/relationships" xmlns:p="http://schemas.openxmlformats.org/presentationml/2006/main">
-  <p:cSld>
-    <p:spTree>
-      <p:nvGrpSpPr>
-        <p:cNvPr id="1" name=""/>
-        <p:cNvGrpSpPr/>
-        <p:nvPr/>
-      </p:nvGrpSpPr>
-      <p:grpSpPr>
-        <a:xfrm>
-          <a:off x="0" y="0"/>
-          <a:ext cx="0" cy="0"/>
-          <a:chOff x="0" y="0"/>
-          <a:chExt cx="0" cy="0"/>
-        </a:xfrm>
-      </p:grpSpPr>
-      <p:sp>
-        <p:nvSpPr>
-          <p:cNvPr id="2" name="Title 1"/>
-          <p:cNvSpPr>
-            <a:spLocks noGrp="1"/>
-          </p:cNvSpPr>
-          <p:nvPr>
-            <p:ph type="title"/>
-          </p:nvPr>
-        </p:nvSpPr>
-        <p:spPr/>
-        <p:txBody>
-          <a:bodyPr/>
-          <a:lstStyle/>
-          <a:p>
-            <a:r>
-              <a:rPr lang="en-US" b="1" dirty="0">
-                <a:solidFill>
-                  <a:schemeClr val="accent4"/>
-                </a:solidFill>
-              </a:rPr>
-              <a:t>Who should do it</a:t>
-            </a:r>
-          </a:p>
-        </p:txBody>
-      </p:sp>
-      <p:sp>
-        <p:nvSpPr>
-          <p:cNvPr id="3" name="Content Placeholder 2"/>
-          <p:cNvSpPr>
-            <a:spLocks noGrp="1"/>
-          </p:cNvSpPr>
-          <p:nvPr>
-            <p:ph idx="1"/>
-          </p:nvPr>
-        </p:nvSpPr>
-        <p:spPr/>
-        <p:txBody>
-          <a:bodyPr/>
-          <a:lstStyle/>
-          <a:p>
-            <a:r>
-              <a:rPr lang="en-US" dirty="0"/>
-              <a:t>Everyone, but the value will you get is inversely related to the investments you have made in DevOps and the cloud already</a:t>
-            </a:r>
-          </a:p>
-          <a:p>
-            <a:r>
-              <a:rPr lang="en-US" dirty="0"/>
-              <a:t>For mature DevOps and cloud companies the benefits will be more incremental because they are already following best practices</a:t>
-            </a:r>
-          </a:p>
-          <a:p>
-            <a:r>
-              <a:rPr lang="en-US" dirty="0"/>
-              <a:t>For companies without strong DevOps or cloud practices the value is much higher</a:t>
-            </a:r>
-          </a:p>
-        </p:txBody>
-      </p:sp>
-    </p:spTree>
-    <p:extLst>
-      <p:ext uri="{BB962C8B-B14F-4D97-AF65-F5344CB8AC3E}">
-        <p14:creationId xmlns:p14="http://schemas.microsoft.com/office/powerpoint/2010/main" val="2452892142"/>
-      </p:ext>
-    </p:extLst>
-  </p:cSld>
-  <p:clrMapOvr>
-    <a:masterClrMapping/>
-  </p:clrMapOvr>
-</p:sld>
-</file>
-
-<file path=ppt/slides/slide8.xml><?xml version="1.0" encoding="utf-8"?>
-<p:sld xmlns:a="http://schemas.openxmlformats.org/drawingml/2006/main" xmlns:r="http://schemas.openxmlformats.org/officeDocument/2006/relationships" xmlns:p="http://schemas.openxmlformats.org/presentationml/2006/main">
-  <p:cSld>
-    <p:spTree>
-      <p:nvGrpSpPr>
-        <p:cNvPr id="1" name=""/>
-        <p:cNvGrpSpPr/>
-        <p:nvPr/>
-      </p:nvGrpSpPr>
-      <p:grpSpPr>
-        <a:xfrm>
-          <a:off x="0" y="0"/>
-          <a:ext cx="0" cy="0"/>
-          <a:chOff x="0" y="0"/>
-          <a:chExt cx="0" cy="0"/>
-        </a:xfrm>
-      </p:grpSpPr>
-      <p:sp>
-        <p:nvSpPr>
-          <p:cNvPr id="2" name="Title 1"/>
-          <p:cNvSpPr>
-            <a:spLocks noGrp="1"/>
-          </p:cNvSpPr>
-          <p:nvPr>
-            <p:ph type="title"/>
-          </p:nvPr>
-        </p:nvSpPr>
-        <p:spPr/>
-        <p:txBody>
-          <a:bodyPr/>
-          <a:lstStyle/>
-          <a:p>
-            <a:r>
-              <a:rPr lang="en-US" b="1" dirty="0">
-                <a:solidFill>
-                  <a:schemeClr val="accent4"/>
-                </a:solidFill>
-              </a:rPr>
               <a:t>How to try it</a:t>
             </a:r>
           </a:p>
@@ -3804,7 +3194,7 @@
 </p:sld>
 </file>
 
-<file path=ppt/slides/slide9.xml><?xml version="1.0" encoding="utf-8"?>
+<file path=ppt/slides/slide11.xml><?xml version="1.0" encoding="utf-8"?>
 <p:sld xmlns:a="http://schemas.openxmlformats.org/drawingml/2006/main" xmlns:r="http://schemas.openxmlformats.org/officeDocument/2006/relationships" xmlns:p="http://schemas.openxmlformats.org/presentationml/2006/main">
   <p:cSld>
     <p:spTree>
@@ -4031,6 +3421,902 @@
     <p:extLst>
       <p:ext uri="{BB962C8B-B14F-4D97-AF65-F5344CB8AC3E}">
         <p14:creationId xmlns:p14="http://schemas.microsoft.com/office/powerpoint/2010/main" val="1604661848"/>
+      </p:ext>
+    </p:extLst>
+  </p:cSld>
+  <p:clrMapOvr>
+    <a:masterClrMapping/>
+  </p:clrMapOvr>
+</p:sld>
+</file>
+
+<file path=ppt/slides/slide2.xml><?xml version="1.0" encoding="utf-8"?>
+<p:sld xmlns:a="http://schemas.openxmlformats.org/drawingml/2006/main" xmlns:r="http://schemas.openxmlformats.org/officeDocument/2006/relationships" xmlns:p="http://schemas.openxmlformats.org/presentationml/2006/main">
+  <p:cSld>
+    <p:spTree>
+      <p:nvGrpSpPr>
+        <p:cNvPr id="1" name=""/>
+        <p:cNvGrpSpPr/>
+        <p:nvPr/>
+      </p:nvGrpSpPr>
+      <p:grpSpPr>
+        <a:xfrm>
+          <a:off x="0" y="0"/>
+          <a:ext cx="0" cy="0"/>
+          <a:chOff x="0" y="0"/>
+          <a:chExt cx="0" cy="0"/>
+        </a:xfrm>
+      </p:grpSpPr>
+      <p:sp>
+        <p:nvSpPr>
+          <p:cNvPr id="2" name="Title 1"/>
+          <p:cNvSpPr>
+            <a:spLocks noGrp="1"/>
+          </p:cNvSpPr>
+          <p:nvPr>
+            <p:ph type="title"/>
+          </p:nvPr>
+        </p:nvSpPr>
+        <p:spPr/>
+        <p:txBody>
+          <a:bodyPr/>
+          <a:lstStyle/>
+          <a:p>
+            <a:r>
+              <a:rPr lang="en-US" b="1" dirty="0">
+                <a:solidFill>
+                  <a:schemeClr val="accent4"/>
+                </a:solidFill>
+              </a:rPr>
+              <a:t>Agenda</a:t>
+            </a:r>
+          </a:p>
+        </p:txBody>
+      </p:sp>
+      <p:sp>
+        <p:nvSpPr>
+          <p:cNvPr id="3" name="Content Placeholder 2"/>
+          <p:cNvSpPr>
+            <a:spLocks noGrp="1"/>
+          </p:cNvSpPr>
+          <p:nvPr>
+            <p:ph idx="1"/>
+          </p:nvPr>
+        </p:nvSpPr>
+        <p:spPr/>
+        <p:txBody>
+          <a:bodyPr/>
+          <a:lstStyle/>
+          <a:p>
+            <a:r>
+              <a:rPr lang="en-US" dirty="0"/>
+              <a:t>Maturity model</a:t>
+            </a:r>
+          </a:p>
+          <a:p>
+            <a:r>
+              <a:rPr lang="en-US" dirty="0" err="1"/>
+              <a:t>Wardley</a:t>
+            </a:r>
+            <a:r>
+              <a:rPr lang="en-US" dirty="0"/>
+              <a:t> map, discussion on utilities</a:t>
+            </a:r>
+          </a:p>
+          <a:p>
+            <a:r>
+              <a:rPr lang="en-US" dirty="0"/>
+              <a:t>Benefits / ideas about how this changes everything</a:t>
+            </a:r>
+          </a:p>
+          <a:p>
+            <a:r>
+              <a:rPr lang="en-US" dirty="0"/>
+              <a:t>Adoption ideas</a:t>
+            </a:r>
+          </a:p>
+          <a:p>
+            <a:pPr lvl="1"/>
+            <a:r>
+              <a:rPr lang="en-US" dirty="0"/>
+              <a:t>Focus on high value changes</a:t>
+            </a:r>
+          </a:p>
+          <a:p>
+            <a:endParaRPr lang="en-US" dirty="0"/>
+          </a:p>
+          <a:p>
+            <a:endParaRPr lang="en-US" dirty="0"/>
+          </a:p>
+        </p:txBody>
+      </p:sp>
+    </p:spTree>
+    <p:extLst>
+      <p:ext uri="{BB962C8B-B14F-4D97-AF65-F5344CB8AC3E}">
+        <p14:creationId xmlns:p14="http://schemas.microsoft.com/office/powerpoint/2010/main" val="2056317850"/>
+      </p:ext>
+    </p:extLst>
+  </p:cSld>
+  <p:clrMapOvr>
+    <a:masterClrMapping/>
+  </p:clrMapOvr>
+</p:sld>
+</file>
+
+<file path=ppt/slides/slide3.xml><?xml version="1.0" encoding="utf-8"?>
+<p:sld xmlns:a="http://schemas.openxmlformats.org/drawingml/2006/main" xmlns:r="http://schemas.openxmlformats.org/officeDocument/2006/relationships" xmlns:p="http://schemas.openxmlformats.org/presentationml/2006/main">
+  <p:cSld>
+    <p:spTree>
+      <p:nvGrpSpPr>
+        <p:cNvPr id="1" name=""/>
+        <p:cNvGrpSpPr/>
+        <p:nvPr/>
+      </p:nvGrpSpPr>
+      <p:grpSpPr>
+        <a:xfrm>
+          <a:off x="0" y="0"/>
+          <a:ext cx="0" cy="0"/>
+          <a:chOff x="0" y="0"/>
+          <a:chExt cx="0" cy="0"/>
+        </a:xfrm>
+      </p:grpSpPr>
+      <p:sp>
+        <p:nvSpPr>
+          <p:cNvPr id="2" name="Title 1"/>
+          <p:cNvSpPr>
+            <a:spLocks noGrp="1"/>
+          </p:cNvSpPr>
+          <p:nvPr>
+            <p:ph type="title"/>
+          </p:nvPr>
+        </p:nvSpPr>
+        <p:spPr/>
+        <p:txBody>
+          <a:bodyPr/>
+          <a:lstStyle/>
+          <a:p>
+            <a:r>
+              <a:rPr lang="en-US" b="1" dirty="0">
+                <a:solidFill>
+                  <a:schemeClr val="accent4"/>
+                </a:solidFill>
+              </a:rPr>
+              <a:t>Where’s the audience at, and our premise</a:t>
+            </a:r>
+          </a:p>
+        </p:txBody>
+      </p:sp>
+      <p:sp>
+        <p:nvSpPr>
+          <p:cNvPr id="3" name="Content Placeholder 2"/>
+          <p:cNvSpPr>
+            <a:spLocks noGrp="1"/>
+          </p:cNvSpPr>
+          <p:nvPr>
+            <p:ph idx="1"/>
+          </p:nvPr>
+        </p:nvSpPr>
+        <p:spPr/>
+        <p:txBody>
+          <a:bodyPr/>
+          <a:lstStyle/>
+          <a:p>
+            <a:r>
+              <a:rPr lang="en-US" dirty="0"/>
+              <a:t>Maturity framework of DevOps/cloud adoption</a:t>
+            </a:r>
+          </a:p>
+          <a:p>
+            <a:pPr lvl="1"/>
+            <a:r>
+              <a:rPr lang="en-US" dirty="0"/>
+              <a:t>Show framework, ask people where they are, we will show how </a:t>
+            </a:r>
+            <a:r>
+              <a:rPr lang="en-US" dirty="0" err="1"/>
+              <a:t>serverless</a:t>
+            </a:r>
+            <a:r>
+              <a:rPr lang="en-US" dirty="0"/>
+              <a:t> gets you to most mature stage</a:t>
+            </a:r>
+          </a:p>
+          <a:p>
+            <a:pPr lvl="1"/>
+            <a:endParaRPr lang="en-US" dirty="0"/>
+          </a:p>
+          <a:p>
+            <a:r>
+              <a:rPr lang="en-US" dirty="0"/>
+              <a:t>Makes it easier for you to do all the things you should have done before</a:t>
+            </a:r>
+          </a:p>
+          <a:p>
+            <a:pPr lvl="1"/>
+            <a:r>
+              <a:rPr lang="en-US" dirty="0" err="1"/>
+              <a:t>Serverless</a:t>
+            </a:r>
+            <a:r>
+              <a:rPr lang="en-US" dirty="0"/>
+              <a:t> democratizes the DevOps movement</a:t>
+            </a:r>
+          </a:p>
+          <a:p>
+            <a:pPr lvl="1"/>
+            <a:r>
+              <a:rPr lang="en-US" dirty="0" err="1"/>
+              <a:t>Serverless</a:t>
+            </a:r>
+            <a:r>
+              <a:rPr lang="en-US" dirty="0"/>
+              <a:t> is the pinnacle of the DevOps movement</a:t>
+            </a:r>
+          </a:p>
+          <a:p>
+            <a:pPr lvl="1"/>
+            <a:r>
+              <a:rPr lang="en-US" dirty="0"/>
+              <a:t>We think </a:t>
+            </a:r>
+            <a:r>
+              <a:rPr lang="en-US" dirty="0" err="1"/>
+              <a:t>serverless</a:t>
+            </a:r>
+            <a:r>
+              <a:rPr lang="en-US" dirty="0"/>
+              <a:t> is the best opportunity for adopting DevOps best practices at your organization</a:t>
+            </a:r>
+          </a:p>
+          <a:p>
+            <a:endParaRPr lang="en-US" dirty="0"/>
+          </a:p>
+        </p:txBody>
+      </p:sp>
+    </p:spTree>
+    <p:extLst>
+      <p:ext uri="{BB962C8B-B14F-4D97-AF65-F5344CB8AC3E}">
+        <p14:creationId xmlns:p14="http://schemas.microsoft.com/office/powerpoint/2010/main" val="2318218812"/>
+      </p:ext>
+    </p:extLst>
+  </p:cSld>
+  <p:clrMapOvr>
+    <a:masterClrMapping/>
+  </p:clrMapOvr>
+</p:sld>
+</file>
+
+<file path=ppt/slides/slide4.xml><?xml version="1.0" encoding="utf-8"?>
+<p:sld xmlns:a="http://schemas.openxmlformats.org/drawingml/2006/main" xmlns:r="http://schemas.openxmlformats.org/officeDocument/2006/relationships" xmlns:p="http://schemas.openxmlformats.org/presentationml/2006/main">
+  <p:cSld>
+    <p:spTree>
+      <p:nvGrpSpPr>
+        <p:cNvPr id="1" name=""/>
+        <p:cNvGrpSpPr/>
+        <p:nvPr/>
+      </p:nvGrpSpPr>
+      <p:grpSpPr>
+        <a:xfrm>
+          <a:off x="0" y="0"/>
+          <a:ext cx="0" cy="0"/>
+          <a:chOff x="0" y="0"/>
+          <a:chExt cx="0" cy="0"/>
+        </a:xfrm>
+      </p:grpSpPr>
+      <p:sp>
+        <p:nvSpPr>
+          <p:cNvPr id="2" name="Title 1"/>
+          <p:cNvSpPr>
+            <a:spLocks noGrp="1"/>
+          </p:cNvSpPr>
+          <p:nvPr>
+            <p:ph type="title"/>
+          </p:nvPr>
+        </p:nvSpPr>
+        <p:spPr/>
+        <p:txBody>
+          <a:bodyPr/>
+          <a:lstStyle/>
+          <a:p>
+            <a:r>
+              <a:rPr lang="en-US" b="1" dirty="0" err="1">
+                <a:solidFill>
+                  <a:schemeClr val="accent4"/>
+                </a:solidFill>
+              </a:rPr>
+              <a:t>Serverless</a:t>
+            </a:r>
+            <a:r>
+              <a:rPr lang="en-US" b="1" dirty="0">
+                <a:solidFill>
+                  <a:schemeClr val="accent4"/>
+                </a:solidFill>
+              </a:rPr>
+              <a:t> is a commodity</a:t>
+            </a:r>
+          </a:p>
+        </p:txBody>
+      </p:sp>
+      <p:sp>
+        <p:nvSpPr>
+          <p:cNvPr id="3" name="Content Placeholder 2"/>
+          <p:cNvSpPr>
+            <a:spLocks noGrp="1"/>
+          </p:cNvSpPr>
+          <p:nvPr>
+            <p:ph idx="1"/>
+          </p:nvPr>
+        </p:nvSpPr>
+        <p:spPr/>
+        <p:txBody>
+          <a:bodyPr/>
+          <a:lstStyle/>
+          <a:p>
+            <a:r>
+              <a:rPr lang="en-US" dirty="0"/>
+              <a:t>Lets you move yourself up the value chain</a:t>
+            </a:r>
+          </a:p>
+          <a:p>
+            <a:r>
+              <a:rPr lang="en-US" dirty="0" err="1"/>
+              <a:t>Wardley</a:t>
+            </a:r>
+            <a:r>
+              <a:rPr lang="en-US" dirty="0"/>
+              <a:t> graph included here</a:t>
+            </a:r>
+          </a:p>
+          <a:p>
+            <a:pPr lvl="1"/>
+            <a:r>
+              <a:rPr lang="en-US" dirty="0"/>
+              <a:t>(revisit at the end when discussing adoption paths)</a:t>
+            </a:r>
+          </a:p>
+          <a:p>
+            <a:pPr lvl="2"/>
+            <a:r>
+              <a:rPr lang="en-US" dirty="0" err="1"/>
+              <a:t>Serverless</a:t>
+            </a:r>
+            <a:r>
+              <a:rPr lang="en-US" dirty="0"/>
+              <a:t> is focusing on the top of the value chain</a:t>
+            </a:r>
+          </a:p>
+          <a:p>
+            <a:pPr lvl="2"/>
+            <a:r>
+              <a:rPr lang="en-US" dirty="0"/>
+              <a:t>Lift and shift is focusing on the bottom of the value chain</a:t>
+            </a:r>
+          </a:p>
+          <a:p>
+            <a:endParaRPr lang="en-US" dirty="0"/>
+          </a:p>
+        </p:txBody>
+      </p:sp>
+    </p:spTree>
+    <p:extLst>
+      <p:ext uri="{BB962C8B-B14F-4D97-AF65-F5344CB8AC3E}">
+        <p14:creationId xmlns:p14="http://schemas.microsoft.com/office/powerpoint/2010/main" val="2922807310"/>
+      </p:ext>
+    </p:extLst>
+  </p:cSld>
+  <p:clrMapOvr>
+    <a:masterClrMapping/>
+  </p:clrMapOvr>
+</p:sld>
+</file>
+
+<file path=ppt/slides/slide5.xml><?xml version="1.0" encoding="utf-8"?>
+<p:sld xmlns:a="http://schemas.openxmlformats.org/drawingml/2006/main" xmlns:r="http://schemas.openxmlformats.org/officeDocument/2006/relationships" xmlns:p="http://schemas.openxmlformats.org/presentationml/2006/main">
+  <p:cSld>
+    <p:spTree>
+      <p:nvGrpSpPr>
+        <p:cNvPr id="1" name=""/>
+        <p:cNvGrpSpPr/>
+        <p:nvPr/>
+      </p:nvGrpSpPr>
+      <p:grpSpPr>
+        <a:xfrm>
+          <a:off x="0" y="0"/>
+          <a:ext cx="0" cy="0"/>
+          <a:chOff x="0" y="0"/>
+          <a:chExt cx="0" cy="0"/>
+        </a:xfrm>
+      </p:grpSpPr>
+      <p:sp>
+        <p:nvSpPr>
+          <p:cNvPr id="2" name="Title 1"/>
+          <p:cNvSpPr>
+            <a:spLocks noGrp="1"/>
+          </p:cNvSpPr>
+          <p:nvPr>
+            <p:ph type="title"/>
+          </p:nvPr>
+        </p:nvSpPr>
+        <p:spPr/>
+        <p:txBody>
+          <a:bodyPr/>
+          <a:lstStyle/>
+          <a:p>
+            <a:r>
+              <a:rPr lang="en-US" b="1" dirty="0">
+                <a:solidFill>
+                  <a:schemeClr val="accent4"/>
+                </a:solidFill>
+              </a:rPr>
+              <a:t>Define what we’re talking about</a:t>
+            </a:r>
+          </a:p>
+        </p:txBody>
+      </p:sp>
+      <p:sp>
+        <p:nvSpPr>
+          <p:cNvPr id="3" name="Content Placeholder 2"/>
+          <p:cNvSpPr>
+            <a:spLocks noGrp="1"/>
+          </p:cNvSpPr>
+          <p:nvPr>
+            <p:ph idx="1"/>
+          </p:nvPr>
+        </p:nvSpPr>
+        <p:spPr/>
+        <p:txBody>
+          <a:bodyPr/>
+          <a:lstStyle/>
+          <a:p>
+            <a:r>
+              <a:rPr lang="en-US" dirty="0" err="1"/>
+              <a:t>Serverless</a:t>
+            </a:r>
+            <a:r>
+              <a:rPr lang="en-US" dirty="0"/>
+              <a:t> as general pattern</a:t>
+            </a:r>
+          </a:p>
+          <a:p>
+            <a:r>
+              <a:rPr lang="en-US" dirty="0"/>
+              <a:t>Specifically using experience we have with using the </a:t>
+            </a:r>
+            <a:r>
+              <a:rPr lang="en-US" dirty="0" err="1"/>
+              <a:t>Serverless</a:t>
+            </a:r>
+            <a:r>
+              <a:rPr lang="en-US" dirty="0"/>
+              <a:t> Framework on AWS</a:t>
+            </a:r>
+          </a:p>
+        </p:txBody>
+      </p:sp>
+    </p:spTree>
+    <p:extLst>
+      <p:ext uri="{BB962C8B-B14F-4D97-AF65-F5344CB8AC3E}">
+        <p14:creationId xmlns:p14="http://schemas.microsoft.com/office/powerpoint/2010/main" val="3922689527"/>
+      </p:ext>
+    </p:extLst>
+  </p:cSld>
+  <p:clrMapOvr>
+    <a:masterClrMapping/>
+  </p:clrMapOvr>
+</p:sld>
+</file>
+
+<file path=ppt/slides/slide6.xml><?xml version="1.0" encoding="utf-8"?>
+<p:sld xmlns:a="http://schemas.openxmlformats.org/drawingml/2006/main" xmlns:r="http://schemas.openxmlformats.org/officeDocument/2006/relationships" xmlns:p="http://schemas.openxmlformats.org/presentationml/2006/main">
+  <p:cSld>
+    <p:spTree>
+      <p:nvGrpSpPr>
+        <p:cNvPr id="1" name=""/>
+        <p:cNvGrpSpPr/>
+        <p:nvPr/>
+      </p:nvGrpSpPr>
+      <p:grpSpPr>
+        <a:xfrm>
+          <a:off x="0" y="0"/>
+          <a:ext cx="0" cy="0"/>
+          <a:chOff x="0" y="0"/>
+          <a:chExt cx="0" cy="0"/>
+        </a:xfrm>
+      </p:grpSpPr>
+      <p:sp>
+        <p:nvSpPr>
+          <p:cNvPr id="2" name="Title 1"/>
+          <p:cNvSpPr>
+            <a:spLocks noGrp="1"/>
+          </p:cNvSpPr>
+          <p:nvPr>
+            <p:ph type="title"/>
+          </p:nvPr>
+        </p:nvSpPr>
+        <p:spPr/>
+        <p:txBody>
+          <a:bodyPr/>
+          <a:lstStyle/>
+          <a:p>
+            <a:r>
+              <a:rPr lang="en-US" b="1" dirty="0">
+                <a:solidFill>
+                  <a:schemeClr val="accent4"/>
+                </a:solidFill>
+              </a:rPr>
+              <a:t>DevOps best practices</a:t>
+            </a:r>
+          </a:p>
+        </p:txBody>
+      </p:sp>
+      <p:sp>
+        <p:nvSpPr>
+          <p:cNvPr id="3" name="Content Placeholder 2"/>
+          <p:cNvSpPr>
+            <a:spLocks noGrp="1"/>
+          </p:cNvSpPr>
+          <p:nvPr>
+            <p:ph idx="1"/>
+          </p:nvPr>
+        </p:nvSpPr>
+        <p:spPr/>
+        <p:txBody>
+          <a:bodyPr/>
+          <a:lstStyle/>
+          <a:p>
+            <a:r>
+              <a:rPr lang="en-US" dirty="0"/>
+              <a:t>Infrastructure as code</a:t>
+            </a:r>
+          </a:p>
+          <a:p>
+            <a:r>
+              <a:rPr lang="en-US" dirty="0"/>
+              <a:t>CI/CD for increased speed and stability</a:t>
+            </a:r>
+          </a:p>
+          <a:p>
+            <a:r>
+              <a:rPr lang="en-US" dirty="0"/>
+              <a:t>Monoliths to microservices to functions</a:t>
+            </a:r>
+          </a:p>
+          <a:p>
+            <a:r>
+              <a:rPr lang="en-US" dirty="0"/>
+              <a:t>Small teams, highly cohesive and loosely coupled</a:t>
+            </a:r>
+          </a:p>
+          <a:p>
+            <a:r>
+              <a:rPr lang="en-US" dirty="0"/>
+              <a:t>Only pay for what you use</a:t>
+            </a:r>
+          </a:p>
+          <a:p>
+            <a:r>
+              <a:rPr lang="en-US" dirty="0"/>
+              <a:t>Polyglot – the right language/framework for the job</a:t>
+            </a:r>
+          </a:p>
+        </p:txBody>
+      </p:sp>
+    </p:spTree>
+    <p:extLst>
+      <p:ext uri="{BB962C8B-B14F-4D97-AF65-F5344CB8AC3E}">
+        <p14:creationId xmlns:p14="http://schemas.microsoft.com/office/powerpoint/2010/main" val="1859706539"/>
+      </p:ext>
+    </p:extLst>
+  </p:cSld>
+  <p:clrMapOvr>
+    <a:masterClrMapping/>
+  </p:clrMapOvr>
+</p:sld>
+</file>
+
+<file path=ppt/slides/slide7.xml><?xml version="1.0" encoding="utf-8"?>
+<p:sld xmlns:a="http://schemas.openxmlformats.org/drawingml/2006/main" xmlns:r="http://schemas.openxmlformats.org/officeDocument/2006/relationships" xmlns:p="http://schemas.openxmlformats.org/presentationml/2006/main">
+  <p:cSld>
+    <p:spTree>
+      <p:nvGrpSpPr>
+        <p:cNvPr id="1" name=""/>
+        <p:cNvGrpSpPr/>
+        <p:nvPr/>
+      </p:nvGrpSpPr>
+      <p:grpSpPr>
+        <a:xfrm>
+          <a:off x="0" y="0"/>
+          <a:ext cx="0" cy="0"/>
+          <a:chOff x="0" y="0"/>
+          <a:chExt cx="0" cy="0"/>
+        </a:xfrm>
+      </p:grpSpPr>
+      <p:sp>
+        <p:nvSpPr>
+          <p:cNvPr id="2" name="Title 1"/>
+          <p:cNvSpPr>
+            <a:spLocks noGrp="1"/>
+          </p:cNvSpPr>
+          <p:nvPr>
+            <p:ph type="title"/>
+          </p:nvPr>
+        </p:nvSpPr>
+        <p:spPr/>
+        <p:txBody>
+          <a:bodyPr/>
+          <a:lstStyle/>
+          <a:p>
+            <a:r>
+              <a:rPr lang="en-US" b="1" dirty="0">
+                <a:solidFill>
+                  <a:schemeClr val="accent4"/>
+                </a:solidFill>
+              </a:rPr>
+              <a:t>Benefits of </a:t>
+            </a:r>
+            <a:r>
+              <a:rPr lang="en-US" b="1" dirty="0" err="1">
+                <a:solidFill>
+                  <a:schemeClr val="accent4"/>
+                </a:solidFill>
+              </a:rPr>
+              <a:t>serverless</a:t>
+            </a:r>
+            <a:endParaRPr lang="en-US" b="1" dirty="0">
+              <a:solidFill>
+                <a:schemeClr val="accent4"/>
+              </a:solidFill>
+            </a:endParaRPr>
+          </a:p>
+        </p:txBody>
+      </p:sp>
+      <p:sp>
+        <p:nvSpPr>
+          <p:cNvPr id="3" name="Content Placeholder 2"/>
+          <p:cNvSpPr>
+            <a:spLocks noGrp="1"/>
+          </p:cNvSpPr>
+          <p:nvPr>
+            <p:ph idx="1"/>
+          </p:nvPr>
+        </p:nvSpPr>
+        <p:spPr/>
+        <p:txBody>
+          <a:bodyPr/>
+          <a:lstStyle/>
+          <a:p>
+            <a:r>
+              <a:rPr lang="en-US" dirty="0"/>
+              <a:t>True variable cost computing</a:t>
+            </a:r>
+          </a:p>
+          <a:p>
+            <a:r>
+              <a:rPr lang="en-US" dirty="0"/>
+              <a:t>Time to market goes from months or weeks to days or hours</a:t>
+            </a:r>
+          </a:p>
+          <a:p>
+            <a:r>
+              <a:rPr lang="en-US" dirty="0"/>
+              <a:t>Built in support for things you should be doing already</a:t>
+            </a:r>
+          </a:p>
+          <a:p>
+            <a:pPr lvl="1"/>
+            <a:r>
+              <a:rPr lang="en-US" dirty="0"/>
+              <a:t>Infrastructure as code</a:t>
+            </a:r>
+          </a:p>
+          <a:p>
+            <a:pPr lvl="1"/>
+            <a:r>
+              <a:rPr lang="en-US" dirty="0"/>
+              <a:t>API driven development and data analysis to inform product development</a:t>
+            </a:r>
+          </a:p>
+          <a:p>
+            <a:pPr lvl="1"/>
+            <a:r>
+              <a:rPr lang="en-US" dirty="0"/>
+              <a:t>Small teams</a:t>
+            </a:r>
+          </a:p>
+        </p:txBody>
+      </p:sp>
+    </p:spTree>
+    <p:extLst>
+      <p:ext uri="{BB962C8B-B14F-4D97-AF65-F5344CB8AC3E}">
+        <p14:creationId xmlns:p14="http://schemas.microsoft.com/office/powerpoint/2010/main" val="2276068305"/>
+      </p:ext>
+    </p:extLst>
+  </p:cSld>
+  <p:clrMapOvr>
+    <a:masterClrMapping/>
+  </p:clrMapOvr>
+</p:sld>
+</file>
+
+<file path=ppt/slides/slide8.xml><?xml version="1.0" encoding="utf-8"?>
+<p:sld xmlns:a="http://schemas.openxmlformats.org/drawingml/2006/main" xmlns:r="http://schemas.openxmlformats.org/officeDocument/2006/relationships" xmlns:p="http://schemas.openxmlformats.org/presentationml/2006/main">
+  <p:cSld>
+    <p:spTree>
+      <p:nvGrpSpPr>
+        <p:cNvPr id="1" name=""/>
+        <p:cNvGrpSpPr/>
+        <p:nvPr/>
+      </p:nvGrpSpPr>
+      <p:grpSpPr>
+        <a:xfrm>
+          <a:off x="0" y="0"/>
+          <a:ext cx="0" cy="0"/>
+          <a:chOff x="0" y="0"/>
+          <a:chExt cx="0" cy="0"/>
+        </a:xfrm>
+      </p:grpSpPr>
+      <p:sp>
+        <p:nvSpPr>
+          <p:cNvPr id="2" name="Title 1"/>
+          <p:cNvSpPr>
+            <a:spLocks noGrp="1"/>
+          </p:cNvSpPr>
+          <p:nvPr>
+            <p:ph type="title"/>
+          </p:nvPr>
+        </p:nvSpPr>
+        <p:spPr/>
+        <p:txBody>
+          <a:bodyPr/>
+          <a:lstStyle/>
+          <a:p>
+            <a:r>
+              <a:rPr lang="en-US" b="1" dirty="0" err="1">
+                <a:solidFill>
+                  <a:schemeClr val="accent4"/>
+                </a:solidFill>
+              </a:rPr>
+              <a:t>Serverless</a:t>
+            </a:r>
+            <a:r>
+              <a:rPr lang="en-US" b="1" dirty="0">
+                <a:solidFill>
+                  <a:schemeClr val="accent4"/>
+                </a:solidFill>
+              </a:rPr>
+              <a:t> as Trojan horse</a:t>
+            </a:r>
+          </a:p>
+        </p:txBody>
+      </p:sp>
+      <p:sp>
+        <p:nvSpPr>
+          <p:cNvPr id="3" name="Content Placeholder 2"/>
+          <p:cNvSpPr>
+            <a:spLocks noGrp="1"/>
+          </p:cNvSpPr>
+          <p:nvPr>
+            <p:ph idx="1"/>
+          </p:nvPr>
+        </p:nvSpPr>
+        <p:spPr/>
+        <p:txBody>
+          <a:bodyPr/>
+          <a:lstStyle/>
+          <a:p>
+            <a:r>
+              <a:rPr lang="en-US" dirty="0"/>
+              <a:t>It’s like magic – haven’t met a developer who didn’t love it</a:t>
+            </a:r>
+          </a:p>
+          <a:p>
+            <a:r>
+              <a:rPr lang="en-US" dirty="0"/>
+              <a:t>Easy to use, easy to experiment with</a:t>
+            </a:r>
+          </a:p>
+          <a:p>
+            <a:r>
+              <a:rPr lang="en-US" dirty="0"/>
+              <a:t>Low cost to learn, develop with, experiment with – only cost is time, no infrastructure or hosting</a:t>
+            </a:r>
+          </a:p>
+        </p:txBody>
+      </p:sp>
+    </p:spTree>
+    <p:extLst>
+      <p:ext uri="{BB962C8B-B14F-4D97-AF65-F5344CB8AC3E}">
+        <p14:creationId xmlns:p14="http://schemas.microsoft.com/office/powerpoint/2010/main" val="3178848806"/>
+      </p:ext>
+    </p:extLst>
+  </p:cSld>
+  <p:clrMapOvr>
+    <a:masterClrMapping/>
+  </p:clrMapOvr>
+</p:sld>
+</file>
+
+<file path=ppt/slides/slide9.xml><?xml version="1.0" encoding="utf-8"?>
+<p:sld xmlns:a="http://schemas.openxmlformats.org/drawingml/2006/main" xmlns:r="http://schemas.openxmlformats.org/officeDocument/2006/relationships" xmlns:p="http://schemas.openxmlformats.org/presentationml/2006/main">
+  <p:cSld>
+    <p:spTree>
+      <p:nvGrpSpPr>
+        <p:cNvPr id="1" name=""/>
+        <p:cNvGrpSpPr/>
+        <p:nvPr/>
+      </p:nvGrpSpPr>
+      <p:grpSpPr>
+        <a:xfrm>
+          <a:off x="0" y="0"/>
+          <a:ext cx="0" cy="0"/>
+          <a:chOff x="0" y="0"/>
+          <a:chExt cx="0" cy="0"/>
+        </a:xfrm>
+      </p:grpSpPr>
+      <p:sp>
+        <p:nvSpPr>
+          <p:cNvPr id="2" name="Title 1"/>
+          <p:cNvSpPr>
+            <a:spLocks noGrp="1"/>
+          </p:cNvSpPr>
+          <p:nvPr>
+            <p:ph type="title"/>
+          </p:nvPr>
+        </p:nvSpPr>
+        <p:spPr/>
+        <p:txBody>
+          <a:bodyPr/>
+          <a:lstStyle/>
+          <a:p>
+            <a:r>
+              <a:rPr lang="en-US" b="1" dirty="0">
+                <a:solidFill>
+                  <a:schemeClr val="accent4"/>
+                </a:solidFill>
+              </a:rPr>
+              <a:t>Who should do it</a:t>
+            </a:r>
+          </a:p>
+        </p:txBody>
+      </p:sp>
+      <p:sp>
+        <p:nvSpPr>
+          <p:cNvPr id="3" name="Content Placeholder 2"/>
+          <p:cNvSpPr>
+            <a:spLocks noGrp="1"/>
+          </p:cNvSpPr>
+          <p:nvPr>
+            <p:ph idx="1"/>
+          </p:nvPr>
+        </p:nvSpPr>
+        <p:spPr/>
+        <p:txBody>
+          <a:bodyPr/>
+          <a:lstStyle/>
+          <a:p>
+            <a:r>
+              <a:rPr lang="en-US" dirty="0"/>
+              <a:t>Everyone, but the value will you get is inversely related to the investments you have made in DevOps and the cloud already</a:t>
+            </a:r>
+          </a:p>
+          <a:p>
+            <a:r>
+              <a:rPr lang="en-US" dirty="0"/>
+              <a:t>For mature DevOps and cloud companies the benefits will be more incremental because they are already following best practices</a:t>
+            </a:r>
+          </a:p>
+          <a:p>
+            <a:r>
+              <a:rPr lang="en-US" dirty="0"/>
+              <a:t>For companies without strong DevOps or cloud practices the value is much higher</a:t>
+            </a:r>
+          </a:p>
+        </p:txBody>
+      </p:sp>
+    </p:spTree>
+    <p:extLst>
+      <p:ext uri="{BB962C8B-B14F-4D97-AF65-F5344CB8AC3E}">
+        <p14:creationId xmlns:p14="http://schemas.microsoft.com/office/powerpoint/2010/main" val="2452892142"/>
       </p:ext>
     </p:extLst>
   </p:cSld>

</xml_diff>

<commit_message>
add placeholder wardley map
</commit_message>
<xml_diff>
--- a/Serverless perspectives.pptx
+++ b/Serverless perspectives.pptx
@@ -8,15 +8,16 @@
     <p:sldId id="257" r:id="rId2"/>
     <p:sldId id="263" r:id="rId3"/>
     <p:sldId id="267" r:id="rId4"/>
-    <p:sldId id="268" r:id="rId5"/>
-    <p:sldId id="266" r:id="rId6"/>
-    <p:sldId id="258" r:id="rId7"/>
-    <p:sldId id="259" r:id="rId8"/>
-    <p:sldId id="264" r:id="rId9"/>
-    <p:sldId id="260" r:id="rId10"/>
-    <p:sldId id="261" r:id="rId11"/>
-    <p:sldId id="262" r:id="rId12"/>
-    <p:sldId id="265" r:id="rId13"/>
+    <p:sldId id="269" r:id="rId5"/>
+    <p:sldId id="268" r:id="rId6"/>
+    <p:sldId id="266" r:id="rId7"/>
+    <p:sldId id="258" r:id="rId8"/>
+    <p:sldId id="259" r:id="rId9"/>
+    <p:sldId id="264" r:id="rId10"/>
+    <p:sldId id="260" r:id="rId11"/>
+    <p:sldId id="261" r:id="rId12"/>
+    <p:sldId id="262" r:id="rId13"/>
+    <p:sldId id="265" r:id="rId14"/>
   </p:sldIdLst>
   <p:sldSz cx="12192000" cy="6858000"/>
   <p:notesSz cx="6858000" cy="9144000"/>
@@ -3100,12 +3101,20 @@
           <a:lstStyle/>
           <a:p>
             <a:r>
+              <a:rPr lang="en-US" b="1" dirty="0" err="1">
+                <a:solidFill>
+                  <a:schemeClr val="accent4"/>
+                </a:solidFill>
+              </a:rPr>
+              <a:t>Serverless</a:t>
+            </a:r>
+            <a:r>
               <a:rPr lang="en-US" b="1" dirty="0">
                 <a:solidFill>
                   <a:schemeClr val="accent4"/>
                 </a:solidFill>
               </a:rPr>
-              <a:t>Who should do it</a:t>
+              <a:t> as Trojan horse</a:t>
             </a:r>
           </a:p>
         </p:txBody>
@@ -3127,19 +3136,19 @@
           <a:p>
             <a:r>
               <a:rPr lang="en-US" dirty="0"/>
-              <a:t>Everyone, but the value will you get is inversely related to the investments you have made in DevOps and the cloud already</a:t>
+              <a:t>It’s like magic – haven’t met a developer who didn’t love it</a:t>
             </a:r>
           </a:p>
           <a:p>
             <a:r>
               <a:rPr lang="en-US" dirty="0"/>
-              <a:t>For mature DevOps and cloud companies the benefits will be more incremental because they are already following best practices</a:t>
+              <a:t>Easy to use, easy to experiment with</a:t>
             </a:r>
           </a:p>
           <a:p>
             <a:r>
               <a:rPr lang="en-US" dirty="0"/>
-              <a:t>For companies without strong DevOps or cloud practices the value is much higher</a:t>
+              <a:t>Low cost to learn, develop with, experiment with – only cost is time, no infrastructure or hosting</a:t>
             </a:r>
           </a:p>
         </p:txBody>
@@ -3147,7 +3156,7 @@
     </p:spTree>
     <p:extLst>
       <p:ext uri="{BB962C8B-B14F-4D97-AF65-F5344CB8AC3E}">
-        <p14:creationId xmlns:p14="http://schemas.microsoft.com/office/powerpoint/2010/main" val="2452892142"/>
+        <p14:creationId xmlns:p14="http://schemas.microsoft.com/office/powerpoint/2010/main" val="3178848806"/>
       </p:ext>
     </p:extLst>
   </p:cSld>
@@ -3195,6 +3204,96 @@
                   <a:schemeClr val="accent4"/>
                 </a:solidFill>
               </a:rPr>
+              <a:t>Who should do it</a:t>
+            </a:r>
+          </a:p>
+        </p:txBody>
+      </p:sp>
+      <p:sp>
+        <p:nvSpPr>
+          <p:cNvPr id="3" name="Content Placeholder 2"/>
+          <p:cNvSpPr>
+            <a:spLocks noGrp="1"/>
+          </p:cNvSpPr>
+          <p:nvPr>
+            <p:ph idx="1"/>
+          </p:nvPr>
+        </p:nvSpPr>
+        <p:spPr/>
+        <p:txBody>
+          <a:bodyPr/>
+          <a:lstStyle/>
+          <a:p>
+            <a:r>
+              <a:rPr lang="en-US" dirty="0"/>
+              <a:t>Everyone, but the value will you get is inversely related to the investments you have made in DevOps and the cloud already</a:t>
+            </a:r>
+          </a:p>
+          <a:p>
+            <a:r>
+              <a:rPr lang="en-US" dirty="0"/>
+              <a:t>For mature DevOps and cloud companies the benefits will be more incremental because they are already following best practices</a:t>
+            </a:r>
+          </a:p>
+          <a:p>
+            <a:r>
+              <a:rPr lang="en-US" dirty="0"/>
+              <a:t>For companies without strong DevOps or cloud practices the value is much higher</a:t>
+            </a:r>
+          </a:p>
+        </p:txBody>
+      </p:sp>
+    </p:spTree>
+    <p:extLst>
+      <p:ext uri="{BB962C8B-B14F-4D97-AF65-F5344CB8AC3E}">
+        <p14:creationId xmlns:p14="http://schemas.microsoft.com/office/powerpoint/2010/main" val="2452892142"/>
+      </p:ext>
+    </p:extLst>
+  </p:cSld>
+  <p:clrMapOvr>
+    <a:masterClrMapping/>
+  </p:clrMapOvr>
+</p:sld>
+</file>
+
+<file path=ppt/slides/slide12.xml><?xml version="1.0" encoding="utf-8"?>
+<p:sld xmlns:a="http://schemas.openxmlformats.org/drawingml/2006/main" xmlns:r="http://schemas.openxmlformats.org/officeDocument/2006/relationships" xmlns:p="http://schemas.openxmlformats.org/presentationml/2006/main">
+  <p:cSld>
+    <p:spTree>
+      <p:nvGrpSpPr>
+        <p:cNvPr id="1" name=""/>
+        <p:cNvGrpSpPr/>
+        <p:nvPr/>
+      </p:nvGrpSpPr>
+      <p:grpSpPr>
+        <a:xfrm>
+          <a:off x="0" y="0"/>
+          <a:ext cx="0" cy="0"/>
+          <a:chOff x="0" y="0"/>
+          <a:chExt cx="0" cy="0"/>
+        </a:xfrm>
+      </p:grpSpPr>
+      <p:sp>
+        <p:nvSpPr>
+          <p:cNvPr id="2" name="Title 1"/>
+          <p:cNvSpPr>
+            <a:spLocks noGrp="1"/>
+          </p:cNvSpPr>
+          <p:nvPr>
+            <p:ph type="title"/>
+          </p:nvPr>
+        </p:nvSpPr>
+        <p:spPr/>
+        <p:txBody>
+          <a:bodyPr/>
+          <a:lstStyle/>
+          <a:p>
+            <a:r>
+              <a:rPr lang="en-US" b="1" dirty="0">
+                <a:solidFill>
+                  <a:schemeClr val="accent4"/>
+                </a:solidFill>
+              </a:rPr>
               <a:t>How to try it</a:t>
             </a:r>
           </a:p>
@@ -3285,7 +3384,7 @@
 </p:sld>
 </file>
 
-<file path=ppt/slides/slide12.xml><?xml version="1.0" encoding="utf-8"?>
+<file path=ppt/slides/slide13.xml><?xml version="1.0" encoding="utf-8"?>
 <p:sld xmlns:a="http://schemas.openxmlformats.org/drawingml/2006/main" xmlns:r="http://schemas.openxmlformats.org/officeDocument/2006/relationships" xmlns:p="http://schemas.openxmlformats.org/presentationml/2006/main">
   <p:cSld>
     <p:spTree>
@@ -3581,6 +3680,17 @@
           <a:p>
             <a:r>
               <a:rPr lang="en-US" dirty="0"/>
+              <a:t>Quick intro to </a:t>
+            </a:r>
+            <a:r>
+              <a:rPr lang="en-US" dirty="0" err="1"/>
+              <a:t>serverless</a:t>
+            </a:r>
+            <a:endParaRPr lang="en-US" dirty="0"/>
+          </a:p>
+          <a:p>
+            <a:r>
+              <a:rPr lang="en-US" dirty="0"/>
               <a:t>Maturity model</a:t>
             </a:r>
           </a:p>
@@ -3672,8 +3782,21 @@
                   <a:schemeClr val="accent4"/>
                 </a:solidFill>
               </a:rPr>
-              <a:t>Where’s the audience at, and our premise</a:t>
-            </a:r>
+              <a:t>Quick intro to </a:t>
+            </a:r>
+            <a:r>
+              <a:rPr lang="en-US" b="1" dirty="0" err="1">
+                <a:solidFill>
+                  <a:schemeClr val="accent4"/>
+                </a:solidFill>
+              </a:rPr>
+              <a:t>serverless</a:t>
+            </a:r>
+            <a:endParaRPr lang="en-US" b="1" dirty="0">
+              <a:solidFill>
+                <a:schemeClr val="accent4"/>
+              </a:solidFill>
+            </a:endParaRPr>
           </a:p>
         </p:txBody>
       </p:sp>
@@ -3694,69 +3817,19 @@
           <a:p>
             <a:r>
               <a:rPr lang="en-US" dirty="0"/>
-              <a:t>Maturity framework of DevOps/cloud adoption</a:t>
-            </a:r>
-          </a:p>
-          <a:p>
-            <a:pPr lvl="1"/>
+              <a:t>Patterns</a:t>
+            </a:r>
+          </a:p>
+          <a:p>
             <a:r>
               <a:rPr lang="en-US" dirty="0"/>
-              <a:t>Show framework, ask people where they are, we will show how </a:t>
-            </a:r>
-            <a:r>
-              <a:rPr lang="en-US" dirty="0" err="1"/>
-              <a:t>serverless</a:t>
-            </a:r>
+              <a:t>Framework</a:t>
+            </a:r>
+          </a:p>
+          <a:p>
             <a:r>
               <a:rPr lang="en-US" dirty="0"/>
-              <a:t> gets you to most mature stage</a:t>
-            </a:r>
-          </a:p>
-          <a:p>
-            <a:pPr lvl="1"/>
-            <a:endParaRPr lang="en-US" dirty="0"/>
-          </a:p>
-          <a:p>
-            <a:r>
-              <a:rPr lang="en-US" dirty="0"/>
-              <a:t>Makes it easier for you to do all the things you should have done before</a:t>
-            </a:r>
-          </a:p>
-          <a:p>
-            <a:pPr lvl="1"/>
-            <a:r>
-              <a:rPr lang="en-US" dirty="0" err="1"/>
-              <a:t>Serverless</a:t>
-            </a:r>
-            <a:r>
-              <a:rPr lang="en-US" dirty="0"/>
-              <a:t> democratizes the DevOps movement</a:t>
-            </a:r>
-          </a:p>
-          <a:p>
-            <a:pPr lvl="1"/>
-            <a:r>
-              <a:rPr lang="en-US" dirty="0" err="1"/>
-              <a:t>Serverless</a:t>
-            </a:r>
-            <a:r>
-              <a:rPr lang="en-US" dirty="0"/>
-              <a:t> is the pinnacle of the DevOps movement</a:t>
-            </a:r>
-          </a:p>
-          <a:p>
-            <a:pPr lvl="1"/>
-            <a:r>
-              <a:rPr lang="en-US" dirty="0"/>
-              <a:t>We think </a:t>
-            </a:r>
-            <a:r>
-              <a:rPr lang="en-US" dirty="0" err="1"/>
-              <a:t>serverless</a:t>
-            </a:r>
-            <a:r>
-              <a:rPr lang="en-US" dirty="0"/>
-              <a:t> is the best opportunity for adopting DevOps best practices at your organization</a:t>
+              <a:t>AWS</a:t>
             </a:r>
           </a:p>
           <a:p>
@@ -3778,6 +3851,149 @@
 </file>
 
 <file path=ppt/slides/slide4.xml><?xml version="1.0" encoding="utf-8"?>
+<p:sld xmlns:a="http://schemas.openxmlformats.org/drawingml/2006/main" xmlns:r="http://schemas.openxmlformats.org/officeDocument/2006/relationships" xmlns:p="http://schemas.openxmlformats.org/presentationml/2006/main">
+  <p:cSld>
+    <p:spTree>
+      <p:nvGrpSpPr>
+        <p:cNvPr id="1" name=""/>
+        <p:cNvGrpSpPr/>
+        <p:nvPr/>
+      </p:nvGrpSpPr>
+      <p:grpSpPr>
+        <a:xfrm>
+          <a:off x="0" y="0"/>
+          <a:ext cx="0" cy="0"/>
+          <a:chOff x="0" y="0"/>
+          <a:chExt cx="0" cy="0"/>
+        </a:xfrm>
+      </p:grpSpPr>
+      <p:sp>
+        <p:nvSpPr>
+          <p:cNvPr id="2" name="Title 1"/>
+          <p:cNvSpPr>
+            <a:spLocks noGrp="1"/>
+          </p:cNvSpPr>
+          <p:nvPr>
+            <p:ph type="title"/>
+          </p:nvPr>
+        </p:nvSpPr>
+        <p:spPr/>
+        <p:txBody>
+          <a:bodyPr/>
+          <a:lstStyle/>
+          <a:p>
+            <a:r>
+              <a:rPr lang="en-US" b="1" dirty="0">
+                <a:solidFill>
+                  <a:schemeClr val="accent4"/>
+                </a:solidFill>
+              </a:rPr>
+              <a:t>Where’s the audience at, and our premise</a:t>
+            </a:r>
+          </a:p>
+        </p:txBody>
+      </p:sp>
+      <p:sp>
+        <p:nvSpPr>
+          <p:cNvPr id="3" name="Content Placeholder 2"/>
+          <p:cNvSpPr>
+            <a:spLocks noGrp="1"/>
+          </p:cNvSpPr>
+          <p:nvPr>
+            <p:ph idx="1"/>
+          </p:nvPr>
+        </p:nvSpPr>
+        <p:spPr/>
+        <p:txBody>
+          <a:bodyPr/>
+          <a:lstStyle/>
+          <a:p>
+            <a:r>
+              <a:rPr lang="en-US" dirty="0"/>
+              <a:t>Maturity framework of DevOps/cloud adoption</a:t>
+            </a:r>
+          </a:p>
+          <a:p>
+            <a:pPr lvl="1"/>
+            <a:r>
+              <a:rPr lang="en-US" dirty="0"/>
+              <a:t>Show framework, ask people where they are, we will show how </a:t>
+            </a:r>
+            <a:r>
+              <a:rPr lang="en-US" dirty="0" err="1"/>
+              <a:t>serverless</a:t>
+            </a:r>
+            <a:r>
+              <a:rPr lang="en-US" dirty="0"/>
+              <a:t> gets you to most mature stage</a:t>
+            </a:r>
+          </a:p>
+          <a:p>
+            <a:pPr lvl="1"/>
+            <a:endParaRPr lang="en-US" dirty="0"/>
+          </a:p>
+          <a:p>
+            <a:r>
+              <a:rPr lang="en-US" dirty="0"/>
+              <a:t>Makes it easier for you to do all the things you should have done before</a:t>
+            </a:r>
+          </a:p>
+          <a:p>
+            <a:pPr lvl="1"/>
+            <a:r>
+              <a:rPr lang="en-US" dirty="0" err="1"/>
+              <a:t>Serverless</a:t>
+            </a:r>
+            <a:r>
+              <a:rPr lang="en-US" dirty="0"/>
+              <a:t> democratizes the DevOps movement</a:t>
+            </a:r>
+          </a:p>
+          <a:p>
+            <a:pPr lvl="1"/>
+            <a:r>
+              <a:rPr lang="en-US" dirty="0" err="1"/>
+              <a:t>Serverless</a:t>
+            </a:r>
+            <a:r>
+              <a:rPr lang="en-US" dirty="0"/>
+              <a:t> is the pinnacle of the DevOps movement</a:t>
+            </a:r>
+          </a:p>
+          <a:p>
+            <a:pPr lvl="1"/>
+            <a:r>
+              <a:rPr lang="en-US" dirty="0"/>
+              <a:t>We think </a:t>
+            </a:r>
+            <a:r>
+              <a:rPr lang="en-US" dirty="0" err="1"/>
+              <a:t>serverless</a:t>
+            </a:r>
+            <a:r>
+              <a:rPr lang="en-US" dirty="0"/>
+              <a:t> is the best opportunity for adopting DevOps best practices at your organization</a:t>
+            </a:r>
+          </a:p>
+          <a:p>
+            <a:endParaRPr lang="en-US" dirty="0"/>
+          </a:p>
+        </p:txBody>
+      </p:sp>
+    </p:spTree>
+    <p:extLst>
+      <p:ext uri="{BB962C8B-B14F-4D97-AF65-F5344CB8AC3E}">
+        <p14:creationId xmlns:p14="http://schemas.microsoft.com/office/powerpoint/2010/main" val="3843945573"/>
+      </p:ext>
+    </p:extLst>
+  </p:cSld>
+  <p:clrMapOvr>
+    <a:masterClrMapping/>
+  </p:clrMapOvr>
+</p:sld>
+</file>
+
+<file path=ppt/slides/slide5.xml><?xml version="1.0" encoding="utf-8"?>
 <p:sld xmlns:a="http://schemas.openxmlformats.org/drawingml/2006/main" xmlns:r="http://schemas.openxmlformats.org/officeDocument/2006/relationships" xmlns:p="http://schemas.openxmlformats.org/presentationml/2006/main">
   <p:cSld>
     <p:spTree>
@@ -4665,130 +4881,6 @@
 </p:sld>
 </file>
 
-<file path=ppt/slides/slide5.xml><?xml version="1.0" encoding="utf-8"?>
-<p:sld xmlns:a="http://schemas.openxmlformats.org/drawingml/2006/main" xmlns:r="http://schemas.openxmlformats.org/officeDocument/2006/relationships" xmlns:p="http://schemas.openxmlformats.org/presentationml/2006/main">
-  <p:cSld>
-    <p:spTree>
-      <p:nvGrpSpPr>
-        <p:cNvPr id="1" name=""/>
-        <p:cNvGrpSpPr/>
-        <p:nvPr/>
-      </p:nvGrpSpPr>
-      <p:grpSpPr>
-        <a:xfrm>
-          <a:off x="0" y="0"/>
-          <a:ext cx="0" cy="0"/>
-          <a:chOff x="0" y="0"/>
-          <a:chExt cx="0" cy="0"/>
-        </a:xfrm>
-      </p:grpSpPr>
-      <p:sp>
-        <p:nvSpPr>
-          <p:cNvPr id="2" name="Title 1"/>
-          <p:cNvSpPr>
-            <a:spLocks noGrp="1"/>
-          </p:cNvSpPr>
-          <p:nvPr>
-            <p:ph type="title"/>
-          </p:nvPr>
-        </p:nvSpPr>
-        <p:spPr/>
-        <p:txBody>
-          <a:bodyPr/>
-          <a:lstStyle/>
-          <a:p>
-            <a:r>
-              <a:rPr lang="en-US" b="1" dirty="0" err="1">
-                <a:solidFill>
-                  <a:schemeClr val="accent4"/>
-                </a:solidFill>
-              </a:rPr>
-              <a:t>Serverless</a:t>
-            </a:r>
-            <a:r>
-              <a:rPr lang="en-US" b="1" dirty="0">
-                <a:solidFill>
-                  <a:schemeClr val="accent4"/>
-                </a:solidFill>
-              </a:rPr>
-              <a:t> is a commodity</a:t>
-            </a:r>
-          </a:p>
-        </p:txBody>
-      </p:sp>
-      <p:sp>
-        <p:nvSpPr>
-          <p:cNvPr id="3" name="Content Placeholder 2"/>
-          <p:cNvSpPr>
-            <a:spLocks noGrp="1"/>
-          </p:cNvSpPr>
-          <p:nvPr>
-            <p:ph idx="1"/>
-          </p:nvPr>
-        </p:nvSpPr>
-        <p:spPr/>
-        <p:txBody>
-          <a:bodyPr/>
-          <a:lstStyle/>
-          <a:p>
-            <a:r>
-              <a:rPr lang="en-US" dirty="0"/>
-              <a:t>Lets you move yourself up the value chain</a:t>
-            </a:r>
-          </a:p>
-          <a:p>
-            <a:r>
-              <a:rPr lang="en-US" dirty="0" err="1"/>
-              <a:t>Wardley</a:t>
-            </a:r>
-            <a:r>
-              <a:rPr lang="en-US" dirty="0"/>
-              <a:t> graph included here</a:t>
-            </a:r>
-          </a:p>
-          <a:p>
-            <a:pPr lvl="1"/>
-            <a:r>
-              <a:rPr lang="en-US" dirty="0"/>
-              <a:t>(revisit at the end when discussing adoption paths)</a:t>
-            </a:r>
-          </a:p>
-          <a:p>
-            <a:pPr lvl="2"/>
-            <a:r>
-              <a:rPr lang="en-US" dirty="0" err="1"/>
-              <a:t>Serverless</a:t>
-            </a:r>
-            <a:r>
-              <a:rPr lang="en-US" dirty="0"/>
-              <a:t> is focusing on the top of the value chain</a:t>
-            </a:r>
-          </a:p>
-          <a:p>
-            <a:pPr lvl="2"/>
-            <a:r>
-              <a:rPr lang="en-US" dirty="0"/>
-              <a:t>Lift and shift is focusing on the bottom of the value chain</a:t>
-            </a:r>
-          </a:p>
-          <a:p>
-            <a:endParaRPr lang="en-US" dirty="0"/>
-          </a:p>
-        </p:txBody>
-      </p:sp>
-    </p:spTree>
-    <p:extLst>
-      <p:ext uri="{BB962C8B-B14F-4D97-AF65-F5344CB8AC3E}">
-        <p14:creationId xmlns:p14="http://schemas.microsoft.com/office/powerpoint/2010/main" val="2922807310"/>
-      </p:ext>
-    </p:extLst>
-  </p:cSld>
-  <p:clrMapOvr>
-    <a:masterClrMapping/>
-  </p:clrMapOvr>
-</p:sld>
-</file>
-
 <file path=ppt/slides/slide6.xml><?xml version="1.0" encoding="utf-8"?>
 <p:sld xmlns:a="http://schemas.openxmlformats.org/drawingml/2006/main" xmlns:r="http://schemas.openxmlformats.org/officeDocument/2006/relationships" xmlns:p="http://schemas.openxmlformats.org/presentationml/2006/main">
   <p:cSld>
@@ -4822,12 +4914,20 @@
           <a:lstStyle/>
           <a:p>
             <a:r>
+              <a:rPr lang="en-US" b="1" dirty="0" err="1">
+                <a:solidFill>
+                  <a:schemeClr val="accent4"/>
+                </a:solidFill>
+              </a:rPr>
+              <a:t>Serverless</a:t>
+            </a:r>
+            <a:r>
               <a:rPr lang="en-US" b="1" dirty="0">
                 <a:solidFill>
                   <a:schemeClr val="accent4"/>
                 </a:solidFill>
               </a:rPr>
-              <a:t>Define what we’re talking about</a:t>
+              <a:t> is a commodity</a:t>
             </a:r>
           </a:p>
         </p:txBody>
@@ -4847,35 +4947,85 @@
           <a:bodyPr/>
           <a:lstStyle/>
           <a:p>
+            <a:r>
+              <a:rPr lang="en-US" dirty="0"/>
+              <a:t>Lets you move yourself up the value chain</a:t>
+            </a:r>
+          </a:p>
+          <a:p>
+            <a:r>
+              <a:rPr lang="en-US" dirty="0" err="1"/>
+              <a:t>Wardley</a:t>
+            </a:r>
+            <a:r>
+              <a:rPr lang="en-US" dirty="0"/>
+              <a:t> graph included here</a:t>
+            </a:r>
+          </a:p>
+          <a:p>
+            <a:pPr lvl="1"/>
+            <a:r>
+              <a:rPr lang="en-US" dirty="0"/>
+              <a:t>(revisit at the end when discussing adoption paths)</a:t>
+            </a:r>
+          </a:p>
+          <a:p>
+            <a:pPr lvl="2"/>
             <a:r>
               <a:rPr lang="en-US" dirty="0" err="1"/>
               <a:t>Serverless</a:t>
             </a:r>
             <a:r>
               <a:rPr lang="en-US" dirty="0"/>
-              <a:t> as general pattern</a:t>
-            </a:r>
-          </a:p>
-          <a:p>
+              <a:t> is focusing on the top of the value chain</a:t>
+            </a:r>
+          </a:p>
+          <a:p>
+            <a:pPr lvl="2"/>
             <a:r>
               <a:rPr lang="en-US" dirty="0"/>
-              <a:t>Specifically using experience we have with using the </a:t>
-            </a:r>
-            <a:r>
-              <a:rPr lang="en-US" dirty="0" err="1"/>
-              <a:t>Serverless</a:t>
-            </a:r>
-            <a:r>
-              <a:rPr lang="en-US" dirty="0"/>
-              <a:t> Framework on AWS</a:t>
-            </a:r>
-          </a:p>
-        </p:txBody>
-      </p:sp>
+              <a:t>Lift and shift is focusing on the bottom of the value chain</a:t>
+            </a:r>
+          </a:p>
+          <a:p>
+            <a:endParaRPr lang="en-US" dirty="0"/>
+          </a:p>
+        </p:txBody>
+      </p:sp>
+      <p:pic>
+        <p:nvPicPr>
+          <p:cNvPr id="4" name="Picture 3"/>
+          <p:cNvPicPr>
+            <a:picLocks noChangeAspect="1"/>
+          </p:cNvPicPr>
+          <p:nvPr/>
+        </p:nvPicPr>
+        <p:blipFill>
+          <a:blip r:embed="rId2">
+            <a:extLst>
+              <a:ext uri="{28A0092B-C50C-407E-A947-70E740481C1C}">
+                <a14:useLocalDpi xmlns:a14="http://schemas.microsoft.com/office/drawing/2010/main" val="0"/>
+              </a:ext>
+            </a:extLst>
+          </a:blip>
+          <a:stretch>
+            <a:fillRect/>
+          </a:stretch>
+        </p:blipFill>
+        <p:spPr>
+          <a:xfrm>
+            <a:off x="1186489" y="1140447"/>
+            <a:ext cx="9058223" cy="5565896"/>
+          </a:xfrm>
+          <a:prstGeom prst="rect">
+            <a:avLst/>
+          </a:prstGeom>
+        </p:spPr>
+      </p:pic>
     </p:spTree>
     <p:extLst>
       <p:ext uri="{BB962C8B-B14F-4D97-AF65-F5344CB8AC3E}">
-        <p14:creationId xmlns:p14="http://schemas.microsoft.com/office/powerpoint/2010/main" val="3922689527"/>
+        <p14:creationId xmlns:p14="http://schemas.microsoft.com/office/powerpoint/2010/main" val="2922807310"/>
       </p:ext>
     </p:extLst>
   </p:cSld>
@@ -4923,7 +5073,7 @@
                   <a:schemeClr val="accent4"/>
                 </a:solidFill>
               </a:rPr>
-              <a:t>DevOps best practices</a:t>
+              <a:t>Define what we’re talking about</a:t>
             </a:r>
           </a:p>
         </p:txBody>
@@ -4944,38 +5094,26 @@
           <a:lstStyle/>
           <a:p>
             <a:r>
+              <a:rPr lang="en-US" dirty="0" err="1"/>
+              <a:t>Serverless</a:t>
+            </a:r>
+            <a:r>
               <a:rPr lang="en-US" dirty="0"/>
-              <a:t>Infrastructure as code</a:t>
+              <a:t> as general pattern</a:t>
             </a:r>
           </a:p>
           <a:p>
             <a:r>
               <a:rPr lang="en-US" dirty="0"/>
-              <a:t>CI/CD for increased speed and stability</a:t>
-            </a:r>
-          </a:p>
-          <a:p>
+              <a:t>Specifically using experience we have with using the </a:t>
+            </a:r>
+            <a:r>
+              <a:rPr lang="en-US" dirty="0" err="1"/>
+              <a:t>Serverless</a:t>
+            </a:r>
             <a:r>
               <a:rPr lang="en-US" dirty="0"/>
-              <a:t>Monoliths to microservices to functions</a:t>
-            </a:r>
-          </a:p>
-          <a:p>
-            <a:r>
-              <a:rPr lang="en-US" dirty="0"/>
-              <a:t>Small teams, highly cohesive and loosely coupled</a:t>
-            </a:r>
-          </a:p>
-          <a:p>
-            <a:r>
-              <a:rPr lang="en-US" dirty="0"/>
-              <a:t>Only pay for what you use</a:t>
-            </a:r>
-          </a:p>
-          <a:p>
-            <a:r>
-              <a:rPr lang="en-US" dirty="0"/>
-              <a:t>Polyglot – the right language/framework for the job</a:t>
+              <a:t> Framework on AWS</a:t>
             </a:r>
           </a:p>
         </p:txBody>
@@ -4983,7 +5121,7 @@
     </p:spTree>
     <p:extLst>
       <p:ext uri="{BB962C8B-B14F-4D97-AF65-F5344CB8AC3E}">
-        <p14:creationId xmlns:p14="http://schemas.microsoft.com/office/powerpoint/2010/main" val="1859706539"/>
+        <p14:creationId xmlns:p14="http://schemas.microsoft.com/office/powerpoint/2010/main" val="3922689527"/>
       </p:ext>
     </p:extLst>
   </p:cSld>
@@ -5031,21 +5169,8 @@
                   <a:schemeClr val="accent4"/>
                 </a:solidFill>
               </a:rPr>
-              <a:t>Benefits of </a:t>
-            </a:r>
-            <a:r>
-              <a:rPr lang="en-US" b="1" dirty="0" err="1">
-                <a:solidFill>
-                  <a:schemeClr val="accent4"/>
-                </a:solidFill>
-              </a:rPr>
-              <a:t>serverless</a:t>
-            </a:r>
-            <a:endParaRPr lang="en-US" b="1" dirty="0">
-              <a:solidFill>
-                <a:schemeClr val="accent4"/>
-              </a:solidFill>
-            </a:endParaRPr>
+              <a:t>DevOps best practices</a:t>
+            </a:r>
           </a:p>
         </p:txBody>
       </p:sp>
@@ -5064,42 +5189,39 @@
           <a:bodyPr/>
           <a:lstStyle/>
           <a:p>
-            <a:r>
-              <a:rPr lang="en-US" dirty="0"/>
-              <a:t>True variable cost computing</a:t>
-            </a:r>
-          </a:p>
-          <a:p>
-            <a:r>
-              <a:rPr lang="en-US" dirty="0"/>
-              <a:t>Time to market goes from months or weeks to days or hours</a:t>
-            </a:r>
-          </a:p>
-          <a:p>
-            <a:r>
-              <a:rPr lang="en-US" dirty="0"/>
-              <a:t>Built in support for things you should be doing already</a:t>
-            </a:r>
-          </a:p>
-          <a:p>
-            <a:pPr lvl="1"/>
             <a:r>
               <a:rPr lang="en-US" dirty="0"/>
               <a:t>Infrastructure as code</a:t>
             </a:r>
           </a:p>
           <a:p>
-            <a:pPr lvl="1"/>
             <a:r>
               <a:rPr lang="en-US" dirty="0"/>
-              <a:t>API driven development and data analysis to inform product development</a:t>
-            </a:r>
-          </a:p>
-          <a:p>
-            <a:pPr lvl="1"/>
+              <a:t>CI/CD for increased speed and stability</a:t>
+            </a:r>
+          </a:p>
+          <a:p>
             <a:r>
               <a:rPr lang="en-US" dirty="0"/>
-              <a:t>Small teams</a:t>
+              <a:t>Monoliths to microservices to functions</a:t>
+            </a:r>
+          </a:p>
+          <a:p>
+            <a:r>
+              <a:rPr lang="en-US" dirty="0"/>
+              <a:t>Small teams, highly cohesive and loosely coupled</a:t>
+            </a:r>
+          </a:p>
+          <a:p>
+            <a:r>
+              <a:rPr lang="en-US" dirty="0"/>
+              <a:t>Only pay for what you use</a:t>
+            </a:r>
+          </a:p>
+          <a:p>
+            <a:r>
+              <a:rPr lang="en-US" dirty="0"/>
+              <a:t>Polyglot – the right language/framework for the job</a:t>
             </a:r>
           </a:p>
         </p:txBody>
@@ -5107,7 +5229,7 @@
     </p:spTree>
     <p:extLst>
       <p:ext uri="{BB962C8B-B14F-4D97-AF65-F5344CB8AC3E}">
-        <p14:creationId xmlns:p14="http://schemas.microsoft.com/office/powerpoint/2010/main" val="2276068305"/>
+        <p14:creationId xmlns:p14="http://schemas.microsoft.com/office/powerpoint/2010/main" val="1859706539"/>
       </p:ext>
     </p:extLst>
   </p:cSld>
@@ -5150,21 +5272,26 @@
           <a:lstStyle/>
           <a:p>
             <a:r>
+              <a:rPr lang="en-US" b="1" dirty="0">
+                <a:solidFill>
+                  <a:schemeClr val="accent4"/>
+                </a:solidFill>
+              </a:rPr>
+              <a:t>Benefits of </a:t>
+            </a:r>
+            <a:r>
               <a:rPr lang="en-US" b="1" dirty="0" err="1">
                 <a:solidFill>
                   <a:schemeClr val="accent4"/>
                 </a:solidFill>
               </a:rPr>
-              <a:t>Serverless</a:t>
-            </a:r>
-            <a:r>
-              <a:rPr lang="en-US" b="1" dirty="0">
-                <a:solidFill>
-                  <a:schemeClr val="accent4"/>
-                </a:solidFill>
-              </a:rPr>
-              <a:t> as Trojan horse</a:t>
-            </a:r>
+              <a:t>serverless</a:t>
+            </a:r>
+            <a:endParaRPr lang="en-US" b="1" dirty="0">
+              <a:solidFill>
+                <a:schemeClr val="accent4"/>
+              </a:solidFill>
+            </a:endParaRPr>
           </a:p>
         </p:txBody>
       </p:sp>
@@ -5185,19 +5312,40 @@
           <a:p>
             <a:r>
               <a:rPr lang="en-US" dirty="0"/>
-              <a:t>It’s like magic – haven’t met a developer who didn’t love it</a:t>
+              <a:t>True variable cost computing</a:t>
             </a:r>
           </a:p>
           <a:p>
             <a:r>
               <a:rPr lang="en-US" dirty="0"/>
-              <a:t>Easy to use, easy to experiment with</a:t>
+              <a:t>Time to market goes from months or weeks to days or hours</a:t>
             </a:r>
           </a:p>
           <a:p>
             <a:r>
               <a:rPr lang="en-US" dirty="0"/>
-              <a:t>Low cost to learn, develop with, experiment with – only cost is time, no infrastructure or hosting</a:t>
+              <a:t>Built in support for things you should be doing already</a:t>
+            </a:r>
+          </a:p>
+          <a:p>
+            <a:pPr lvl="1"/>
+            <a:r>
+              <a:rPr lang="en-US" dirty="0"/>
+              <a:t>Infrastructure as code</a:t>
+            </a:r>
+          </a:p>
+          <a:p>
+            <a:pPr lvl="1"/>
+            <a:r>
+              <a:rPr lang="en-US" dirty="0"/>
+              <a:t>API driven development and data analysis to inform product development</a:t>
+            </a:r>
+          </a:p>
+          <a:p>
+            <a:pPr lvl="1"/>
+            <a:r>
+              <a:rPr lang="en-US" dirty="0"/>
+              <a:t>Small teams</a:t>
             </a:r>
           </a:p>
         </p:txBody>
@@ -5205,7 +5353,7 @@
     </p:spTree>
     <p:extLst>
       <p:ext uri="{BB962C8B-B14F-4D97-AF65-F5344CB8AC3E}">
-        <p14:creationId xmlns:p14="http://schemas.microsoft.com/office/powerpoint/2010/main" val="3178848806"/>
+        <p14:creationId xmlns:p14="http://schemas.microsoft.com/office/powerpoint/2010/main" val="2276068305"/>
       </p:ext>
     </p:extLst>
   </p:cSld>

</xml_diff>

<commit_message>
add overview and challenges to adopt slides
</commit_message>
<xml_diff>
--- a/Serverless perspectives.pptx
+++ b/Serverless perspectives.pptx
@@ -17,7 +17,9 @@
     <p:sldId id="260" r:id="rId11"/>
     <p:sldId id="261" r:id="rId12"/>
     <p:sldId id="262" r:id="rId13"/>
-    <p:sldId id="265" r:id="rId14"/>
+    <p:sldId id="270" r:id="rId14"/>
+    <p:sldId id="271" r:id="rId15"/>
+    <p:sldId id="265" r:id="rId16"/>
   </p:sldIdLst>
   <p:sldSz cx="12192000" cy="6858000"/>
   <p:notesSz cx="6858000" cy="9144000"/>
@@ -3422,6 +3424,156 @@
                   <a:schemeClr val="accent4"/>
                 </a:solidFill>
               </a:rPr>
+              <a:t>Challenges to implement</a:t>
+            </a:r>
+          </a:p>
+        </p:txBody>
+      </p:sp>
+      <p:sp>
+        <p:nvSpPr>
+          <p:cNvPr id="3" name="Content Placeholder 2"/>
+          <p:cNvSpPr>
+            <a:spLocks noGrp="1"/>
+          </p:cNvSpPr>
+          <p:nvPr>
+            <p:ph idx="1"/>
+          </p:nvPr>
+        </p:nvSpPr>
+        <p:spPr/>
+        <p:txBody>
+          <a:bodyPr/>
+          <a:lstStyle/>
+          <a:p>
+            <a:endParaRPr lang="en-US" dirty="0"/>
+          </a:p>
+        </p:txBody>
+      </p:sp>
+    </p:spTree>
+    <p:extLst>
+      <p:ext uri="{BB962C8B-B14F-4D97-AF65-F5344CB8AC3E}">
+        <p14:creationId xmlns:p14="http://schemas.microsoft.com/office/powerpoint/2010/main" val="2979025380"/>
+      </p:ext>
+    </p:extLst>
+  </p:cSld>
+  <p:clrMapOvr>
+    <a:masterClrMapping/>
+  </p:clrMapOvr>
+</p:sld>
+</file>
+
+<file path=ppt/slides/slide14.xml><?xml version="1.0" encoding="utf-8"?>
+<p:sld xmlns:a="http://schemas.openxmlformats.org/drawingml/2006/main" xmlns:r="http://schemas.openxmlformats.org/officeDocument/2006/relationships" xmlns:p="http://schemas.openxmlformats.org/presentationml/2006/main">
+  <p:cSld>
+    <p:spTree>
+      <p:nvGrpSpPr>
+        <p:cNvPr id="1" name=""/>
+        <p:cNvGrpSpPr/>
+        <p:nvPr/>
+      </p:nvGrpSpPr>
+      <p:grpSpPr>
+        <a:xfrm>
+          <a:off x="0" y="0"/>
+          <a:ext cx="0" cy="0"/>
+          <a:chOff x="0" y="0"/>
+          <a:chExt cx="0" cy="0"/>
+        </a:xfrm>
+      </p:grpSpPr>
+      <p:sp>
+        <p:nvSpPr>
+          <p:cNvPr id="2" name="Title 1"/>
+          <p:cNvSpPr>
+            <a:spLocks noGrp="1"/>
+          </p:cNvSpPr>
+          <p:nvPr>
+            <p:ph type="title"/>
+          </p:nvPr>
+        </p:nvSpPr>
+        <p:spPr/>
+        <p:txBody>
+          <a:bodyPr/>
+          <a:lstStyle/>
+          <a:p>
+            <a:r>
+              <a:rPr lang="en-US" b="1" dirty="0">
+                <a:solidFill>
+                  <a:schemeClr val="accent4"/>
+                </a:solidFill>
+              </a:rPr>
+              <a:t>GameStop</a:t>
+            </a:r>
+          </a:p>
+        </p:txBody>
+      </p:sp>
+      <p:sp>
+        <p:nvSpPr>
+          <p:cNvPr id="3" name="Content Placeholder 2"/>
+          <p:cNvSpPr>
+            <a:spLocks noGrp="1"/>
+          </p:cNvSpPr>
+          <p:nvPr>
+            <p:ph idx="1"/>
+          </p:nvPr>
+        </p:nvSpPr>
+        <p:spPr/>
+        <p:txBody>
+          <a:bodyPr/>
+          <a:lstStyle/>
+          <a:p>
+            <a:endParaRPr lang="en-US" dirty="0"/>
+          </a:p>
+        </p:txBody>
+      </p:sp>
+    </p:spTree>
+    <p:extLst>
+      <p:ext uri="{BB962C8B-B14F-4D97-AF65-F5344CB8AC3E}">
+        <p14:creationId xmlns:p14="http://schemas.microsoft.com/office/powerpoint/2010/main" val="2891769644"/>
+      </p:ext>
+    </p:extLst>
+  </p:cSld>
+  <p:clrMapOvr>
+    <a:masterClrMapping/>
+  </p:clrMapOvr>
+</p:sld>
+</file>
+
+<file path=ppt/slides/slide15.xml><?xml version="1.0" encoding="utf-8"?>
+<p:sld xmlns:a="http://schemas.openxmlformats.org/drawingml/2006/main" xmlns:r="http://schemas.openxmlformats.org/officeDocument/2006/relationships" xmlns:p="http://schemas.openxmlformats.org/presentationml/2006/main">
+  <p:cSld>
+    <p:spTree>
+      <p:nvGrpSpPr>
+        <p:cNvPr id="1" name=""/>
+        <p:cNvGrpSpPr/>
+        <p:nvPr/>
+      </p:nvGrpSpPr>
+      <p:grpSpPr>
+        <a:xfrm>
+          <a:off x="0" y="0"/>
+          <a:ext cx="0" cy="0"/>
+          <a:chOff x="0" y="0"/>
+          <a:chExt cx="0" cy="0"/>
+        </a:xfrm>
+      </p:grpSpPr>
+      <p:sp>
+        <p:nvSpPr>
+          <p:cNvPr id="2" name="Title 1"/>
+          <p:cNvSpPr>
+            <a:spLocks noGrp="1"/>
+          </p:cNvSpPr>
+          <p:nvPr>
+            <p:ph type="title"/>
+          </p:nvPr>
+        </p:nvSpPr>
+        <p:spPr/>
+        <p:txBody>
+          <a:bodyPr/>
+          <a:lstStyle/>
+          <a:p>
+            <a:r>
+              <a:rPr lang="en-US" b="1" dirty="0">
+                <a:solidFill>
+                  <a:schemeClr val="accent4"/>
+                </a:solidFill>
+              </a:rPr>
               <a:t>Where it’s already started</a:t>
             </a:r>
           </a:p>
@@ -3721,6 +3873,18 @@
             <a:r>
               <a:rPr lang="en-US" dirty="0"/>
               <a:t>Focus on high value changes</a:t>
+            </a:r>
+          </a:p>
+          <a:p>
+            <a:r>
+              <a:rPr lang="en-US" dirty="0"/>
+              <a:t>Challenges to implement</a:t>
+            </a:r>
+          </a:p>
+          <a:p>
+            <a:r>
+              <a:rPr lang="en-US" dirty="0"/>
+              <a:t>Experiences at GameStop</a:t>
             </a:r>
           </a:p>
           <a:p>

</xml_diff>

<commit_message>
add black and decker logo
</commit_message>
<xml_diff>
--- a/Serverless perspectives.pptx
+++ b/Serverless perspectives.pptx
@@ -266,7 +266,7 @@
           <a:p>
             <a:fld id="{2FCDDBFB-5A55-4C7D-9621-3F1CC18082CF}" type="datetimeFigureOut">
               <a:rPr lang="en-US" smtClean="0"/>
-              <a:t>2/22/2017</a:t>
+              <a:t>2/23/2017</a:t>
             </a:fld>
             <a:endParaRPr lang="en-US"/>
           </a:p>
@@ -434,7 +434,7 @@
           <a:p>
             <a:fld id="{2FCDDBFB-5A55-4C7D-9621-3F1CC18082CF}" type="datetimeFigureOut">
               <a:rPr lang="en-US" smtClean="0"/>
-              <a:t>2/22/2017</a:t>
+              <a:t>2/23/2017</a:t>
             </a:fld>
             <a:endParaRPr lang="en-US"/>
           </a:p>
@@ -612,7 +612,7 @@
           <a:p>
             <a:fld id="{2FCDDBFB-5A55-4C7D-9621-3F1CC18082CF}" type="datetimeFigureOut">
               <a:rPr lang="en-US" smtClean="0"/>
-              <a:t>2/22/2017</a:t>
+              <a:t>2/23/2017</a:t>
             </a:fld>
             <a:endParaRPr lang="en-US"/>
           </a:p>
@@ -780,7 +780,7 @@
           <a:p>
             <a:fld id="{2FCDDBFB-5A55-4C7D-9621-3F1CC18082CF}" type="datetimeFigureOut">
               <a:rPr lang="en-US" smtClean="0"/>
-              <a:t>2/22/2017</a:t>
+              <a:t>2/23/2017</a:t>
             </a:fld>
             <a:endParaRPr lang="en-US"/>
           </a:p>
@@ -1025,7 +1025,7 @@
           <a:p>
             <a:fld id="{2FCDDBFB-5A55-4C7D-9621-3F1CC18082CF}" type="datetimeFigureOut">
               <a:rPr lang="en-US" smtClean="0"/>
-              <a:t>2/22/2017</a:t>
+              <a:t>2/23/2017</a:t>
             </a:fld>
             <a:endParaRPr lang="en-US"/>
           </a:p>
@@ -1254,7 +1254,7 @@
           <a:p>
             <a:fld id="{2FCDDBFB-5A55-4C7D-9621-3F1CC18082CF}" type="datetimeFigureOut">
               <a:rPr lang="en-US" smtClean="0"/>
-              <a:t>2/22/2017</a:t>
+              <a:t>2/23/2017</a:t>
             </a:fld>
             <a:endParaRPr lang="en-US"/>
           </a:p>
@@ -1618,7 +1618,7 @@
           <a:p>
             <a:fld id="{2FCDDBFB-5A55-4C7D-9621-3F1CC18082CF}" type="datetimeFigureOut">
               <a:rPr lang="en-US" smtClean="0"/>
-              <a:t>2/22/2017</a:t>
+              <a:t>2/23/2017</a:t>
             </a:fld>
             <a:endParaRPr lang="en-US"/>
           </a:p>
@@ -1735,7 +1735,7 @@
           <a:p>
             <a:fld id="{2FCDDBFB-5A55-4C7D-9621-3F1CC18082CF}" type="datetimeFigureOut">
               <a:rPr lang="en-US" smtClean="0"/>
-              <a:t>2/22/2017</a:t>
+              <a:t>2/23/2017</a:t>
             </a:fld>
             <a:endParaRPr lang="en-US"/>
           </a:p>
@@ -1830,7 +1830,7 @@
           <a:p>
             <a:fld id="{2FCDDBFB-5A55-4C7D-9621-3F1CC18082CF}" type="datetimeFigureOut">
               <a:rPr lang="en-US" smtClean="0"/>
-              <a:t>2/22/2017</a:t>
+              <a:t>2/23/2017</a:t>
             </a:fld>
             <a:endParaRPr lang="en-US"/>
           </a:p>
@@ -2105,7 +2105,7 @@
           <a:p>
             <a:fld id="{2FCDDBFB-5A55-4C7D-9621-3F1CC18082CF}" type="datetimeFigureOut">
               <a:rPr lang="en-US" smtClean="0"/>
-              <a:t>2/22/2017</a:t>
+              <a:t>2/23/2017</a:t>
             </a:fld>
             <a:endParaRPr lang="en-US"/>
           </a:p>
@@ -2357,7 +2357,7 @@
           <a:p>
             <a:fld id="{2FCDDBFB-5A55-4C7D-9621-3F1CC18082CF}" type="datetimeFigureOut">
               <a:rPr lang="en-US" smtClean="0"/>
-              <a:t>2/22/2017</a:t>
+              <a:t>2/23/2017</a:t>
             </a:fld>
             <a:endParaRPr lang="en-US"/>
           </a:p>
@@ -2571,7 +2571,7 @@
           <a:p>
             <a:fld id="{2FCDDBFB-5A55-4C7D-9621-3F1CC18082CF}" type="datetimeFigureOut">
               <a:rPr lang="en-US" smtClean="0"/>
-              <a:t>2/22/2017</a:t>
+              <a:t>2/23/2017</a:t>
             </a:fld>
             <a:endParaRPr lang="en-US"/>
           </a:p>
@@ -3751,8 +3751,38 @@
         </p:blipFill>
         <p:spPr>
           <a:xfrm>
-            <a:off x="6678450" y="1632607"/>
+            <a:off x="7441193" y="127306"/>
             <a:ext cx="4327699" cy="1563382"/>
+          </a:xfrm>
+          <a:prstGeom prst="rect">
+            <a:avLst/>
+          </a:prstGeom>
+        </p:spPr>
+      </p:pic>
+      <p:pic>
+        <p:nvPicPr>
+          <p:cNvPr id="3" name="Picture 2"/>
+          <p:cNvPicPr>
+            <a:picLocks noChangeAspect="1"/>
+          </p:cNvPicPr>
+          <p:nvPr/>
+        </p:nvPicPr>
+        <p:blipFill>
+          <a:blip r:embed="rId8">
+            <a:extLst>
+              <a:ext uri="{28A0092B-C50C-407E-A947-70E740481C1C}">
+                <a14:useLocalDpi xmlns:a14="http://schemas.microsoft.com/office/drawing/2010/main" val="0"/>
+              </a:ext>
+            </a:extLst>
+          </a:blip>
+          <a:stretch>
+            <a:fillRect/>
+          </a:stretch>
+        </p:blipFill>
+        <p:spPr>
+          <a:xfrm>
+            <a:off x="5080494" y="1928507"/>
+            <a:ext cx="6955573" cy="1154625"/>
           </a:xfrm>
           <a:prstGeom prst="rect">
             <a:avLst/>

</xml_diff>

<commit_message>
arrange logo slide around footer
</commit_message>
<xml_diff>
--- a/Serverless perspectives.pptx
+++ b/Serverless perspectives.pptx
@@ -3720,7 +3720,7 @@
         </p:blipFill>
         <p:spPr>
           <a:xfrm>
-            <a:off x="1118495" y="2076390"/>
+            <a:off x="1118495" y="1814517"/>
             <a:ext cx="3742451" cy="965513"/>
           </a:xfrm>
           <a:prstGeom prst="rect">
@@ -3750,7 +3750,7 @@
         </p:blipFill>
         <p:spPr>
           <a:xfrm>
-            <a:off x="1033872" y="3669774"/>
+            <a:off x="1033872" y="3141735"/>
             <a:ext cx="6225843" cy="877844"/>
           </a:xfrm>
           <a:prstGeom prst="rect">
@@ -3780,7 +3780,7 @@
         </p:blipFill>
         <p:spPr>
           <a:xfrm>
-            <a:off x="5559920" y="5657120"/>
+            <a:off x="5559920" y="4905845"/>
             <a:ext cx="5446229" cy="812680"/>
           </a:xfrm>
           <a:prstGeom prst="rect">
@@ -3810,7 +3810,7 @@
         </p:blipFill>
         <p:spPr>
           <a:xfrm>
-            <a:off x="1033872" y="5235224"/>
+            <a:off x="1033872" y="4483949"/>
             <a:ext cx="3976184" cy="1302200"/>
           </a:xfrm>
           <a:prstGeom prst="rect">
@@ -3840,7 +3840,7 @@
         </p:blipFill>
         <p:spPr>
           <a:xfrm>
-            <a:off x="8002750" y="3340321"/>
+            <a:off x="8002750" y="2812282"/>
             <a:ext cx="3003399" cy="1820060"/>
           </a:xfrm>
           <a:prstGeom prst="rect">
@@ -3900,7 +3900,7 @@
         </p:blipFill>
         <p:spPr>
           <a:xfrm>
-            <a:off x="5080494" y="1928507"/>
+            <a:off x="5080494" y="1666634"/>
             <a:ext cx="6955573" cy="1154625"/>
           </a:xfrm>
           <a:prstGeom prst="rect">

</xml_diff>

<commit_message>
check in white apn logo
</commit_message>
<xml_diff>
--- a/Serverless perspectives.pptx
+++ b/Serverless perspectives.pptx
@@ -2706,13 +2706,13 @@
       </p:sp>
       <p:pic>
         <p:nvPicPr>
-          <p:cNvPr id="7" name="Picture 6"/>
+          <p:cNvPr id="10" name="Picture 9"/>
           <p:cNvPicPr>
             <a:picLocks noChangeAspect="1"/>
           </p:cNvPicPr>
           <p:nvPr userDrawn="1"/>
         </p:nvPicPr>
-        <p:blipFill rotWithShape="1">
+        <p:blipFill>
           <a:blip r:embed="rId13">
             <a:extLst>
               <a:ext uri="{28A0092B-C50C-407E-A947-70E740481C1C}">
@@ -2720,13 +2720,14 @@
               </a:ext>
             </a:extLst>
           </a:blip>
-          <a:srcRect l="7895" t="24617" r="9466" b="21831"/>
-          <a:stretch/>
+          <a:stretch>
+            <a:fillRect/>
+          </a:stretch>
         </p:blipFill>
         <p:spPr>
           <a:xfrm>
-            <a:off x="10049814" y="6178526"/>
-            <a:ext cx="2142186" cy="679474"/>
+            <a:off x="34344" y="6220378"/>
+            <a:ext cx="2695977" cy="594206"/>
           </a:xfrm>
           <a:prstGeom prst="rect">
             <a:avLst/>
@@ -2735,7 +2736,7 @@
       </p:pic>
       <p:pic>
         <p:nvPicPr>
-          <p:cNvPr id="10" name="Picture 9"/>
+          <p:cNvPr id="11" name="Picture 10"/>
           <p:cNvPicPr>
             <a:picLocks noChangeAspect="1"/>
           </p:cNvPicPr>
@@ -2755,8 +2756,8 @@
         </p:blipFill>
         <p:spPr>
           <a:xfrm>
-            <a:off x="34344" y="6220378"/>
-            <a:ext cx="2695977" cy="594206"/>
+            <a:off x="9723955" y="6131000"/>
+            <a:ext cx="2502389" cy="782151"/>
           </a:xfrm>
           <a:prstGeom prst="rect">
             <a:avLst/>

</xml_diff>

<commit_message>
You don't have technology problems
</commit_message>
<xml_diff>
--- a/Serverless perspectives.pptx
+++ b/Serverless perspectives.pptx
@@ -4,22 +4,34 @@
   <p:sldMasterIdLst>
     <p:sldMasterId id="2147483648" r:id="rId1"/>
   </p:sldMasterIdLst>
+  <p:notesMasterIdLst>
+    <p:notesMasterId r:id="rId26"/>
+  </p:notesMasterIdLst>
   <p:sldIdLst>
     <p:sldId id="257" r:id="rId2"/>
     <p:sldId id="263" r:id="rId3"/>
-    <p:sldId id="267" r:id="rId4"/>
-    <p:sldId id="258" r:id="rId5"/>
-    <p:sldId id="269" r:id="rId6"/>
-    <p:sldId id="268" r:id="rId7"/>
-    <p:sldId id="266" r:id="rId8"/>
-    <p:sldId id="259" r:id="rId9"/>
-    <p:sldId id="264" r:id="rId10"/>
-    <p:sldId id="260" r:id="rId11"/>
-    <p:sldId id="261" r:id="rId12"/>
-    <p:sldId id="262" r:id="rId13"/>
-    <p:sldId id="270" r:id="rId14"/>
-    <p:sldId id="271" r:id="rId15"/>
-    <p:sldId id="265" r:id="rId16"/>
+    <p:sldId id="273" r:id="rId4"/>
+    <p:sldId id="274" r:id="rId5"/>
+    <p:sldId id="275" r:id="rId6"/>
+    <p:sldId id="277" r:id="rId7"/>
+    <p:sldId id="276" r:id="rId8"/>
+    <p:sldId id="279" r:id="rId9"/>
+    <p:sldId id="267" r:id="rId10"/>
+    <p:sldId id="282" r:id="rId11"/>
+    <p:sldId id="281" r:id="rId12"/>
+    <p:sldId id="280" r:id="rId13"/>
+    <p:sldId id="258" r:id="rId14"/>
+    <p:sldId id="269" r:id="rId15"/>
+    <p:sldId id="268" r:id="rId16"/>
+    <p:sldId id="266" r:id="rId17"/>
+    <p:sldId id="259" r:id="rId18"/>
+    <p:sldId id="264" r:id="rId19"/>
+    <p:sldId id="260" r:id="rId20"/>
+    <p:sldId id="261" r:id="rId21"/>
+    <p:sldId id="262" r:id="rId22"/>
+    <p:sldId id="270" r:id="rId23"/>
+    <p:sldId id="271" r:id="rId24"/>
+    <p:sldId id="265" r:id="rId25"/>
   </p:sldIdLst>
   <p:sldSz cx="12192000" cy="6858000"/>
   <p:notesSz cx="6858000" cy="9144000"/>
@@ -137,6 +149,356 @@
 </p:presentation>
 </file>
 
+<file path=ppt/notesMasters/notesMaster1.xml><?xml version="1.0" encoding="utf-8"?>
+<p:notesMaster xmlns:a="http://schemas.openxmlformats.org/drawingml/2006/main" xmlns:r="http://schemas.openxmlformats.org/officeDocument/2006/relationships" xmlns:p="http://schemas.openxmlformats.org/presentationml/2006/main">
+  <p:cSld>
+    <p:bg>
+      <p:bgRef idx="1001">
+        <a:schemeClr val="bg1"/>
+      </p:bgRef>
+    </p:bg>
+    <p:spTree>
+      <p:nvGrpSpPr>
+        <p:cNvPr id="1" name=""/>
+        <p:cNvGrpSpPr/>
+        <p:nvPr/>
+      </p:nvGrpSpPr>
+      <p:grpSpPr>
+        <a:xfrm>
+          <a:off x="0" y="0"/>
+          <a:ext cx="0" cy="0"/>
+          <a:chOff x="0" y="0"/>
+          <a:chExt cx="0" cy="0"/>
+        </a:xfrm>
+      </p:grpSpPr>
+      <p:sp>
+        <p:nvSpPr>
+          <p:cNvPr id="2" name="Header Placeholder 1"/>
+          <p:cNvSpPr>
+            <a:spLocks noGrp="1"/>
+          </p:cNvSpPr>
+          <p:nvPr>
+            <p:ph type="hdr" sz="quarter"/>
+          </p:nvPr>
+        </p:nvSpPr>
+        <p:spPr>
+          <a:xfrm>
+            <a:off x="0" y="0"/>
+            <a:ext cx="2971800" cy="458788"/>
+          </a:xfrm>
+          <a:prstGeom prst="rect">
+            <a:avLst/>
+          </a:prstGeom>
+        </p:spPr>
+        <p:txBody>
+          <a:bodyPr vert="horz" lIns="91440" tIns="45720" rIns="91440" bIns="45720" rtlCol="0"/>
+          <a:lstStyle>
+            <a:lvl1pPr algn="l">
+              <a:defRPr sz="1200"/>
+            </a:lvl1pPr>
+          </a:lstStyle>
+          <a:p>
+            <a:endParaRPr lang="en-US"/>
+          </a:p>
+        </p:txBody>
+      </p:sp>
+      <p:sp>
+        <p:nvSpPr>
+          <p:cNvPr id="3" name="Date Placeholder 2"/>
+          <p:cNvSpPr>
+            <a:spLocks noGrp="1"/>
+          </p:cNvSpPr>
+          <p:nvPr>
+            <p:ph type="dt" idx="1"/>
+          </p:nvPr>
+        </p:nvSpPr>
+        <p:spPr>
+          <a:xfrm>
+            <a:off x="3884613" y="0"/>
+            <a:ext cx="2971800" cy="458788"/>
+          </a:xfrm>
+          <a:prstGeom prst="rect">
+            <a:avLst/>
+          </a:prstGeom>
+        </p:spPr>
+        <p:txBody>
+          <a:bodyPr vert="horz" lIns="91440" tIns="45720" rIns="91440" bIns="45720" rtlCol="0"/>
+          <a:lstStyle>
+            <a:lvl1pPr algn="r">
+              <a:defRPr sz="1200"/>
+            </a:lvl1pPr>
+          </a:lstStyle>
+          <a:p>
+            <a:fld id="{4CD151FA-B384-F346-B249-1C7606628C41}" type="datetimeFigureOut">
+              <a:rPr lang="en-US" smtClean="0"/>
+              <a:t>2/28/17</a:t>
+            </a:fld>
+            <a:endParaRPr lang="en-US"/>
+          </a:p>
+        </p:txBody>
+      </p:sp>
+      <p:sp>
+        <p:nvSpPr>
+          <p:cNvPr id="4" name="Slide Image Placeholder 3"/>
+          <p:cNvSpPr>
+            <a:spLocks noGrp="1" noRot="1" noChangeAspect="1"/>
+          </p:cNvSpPr>
+          <p:nvPr>
+            <p:ph type="sldImg" idx="2"/>
+          </p:nvPr>
+        </p:nvSpPr>
+        <p:spPr>
+          <a:xfrm>
+            <a:off x="685800" y="1143000"/>
+            <a:ext cx="5486400" cy="3086100"/>
+          </a:xfrm>
+          <a:prstGeom prst="rect">
+            <a:avLst/>
+          </a:prstGeom>
+          <a:noFill/>
+          <a:ln w="12700">
+            <a:solidFill>
+              <a:prstClr val="black"/>
+            </a:solidFill>
+          </a:ln>
+        </p:spPr>
+        <p:txBody>
+          <a:bodyPr vert="horz" lIns="91440" tIns="45720" rIns="91440" bIns="45720" rtlCol="0" anchor="ctr"/>
+          <a:lstStyle/>
+          <a:p>
+            <a:endParaRPr lang="en-US"/>
+          </a:p>
+        </p:txBody>
+      </p:sp>
+      <p:sp>
+        <p:nvSpPr>
+          <p:cNvPr id="5" name="Notes Placeholder 4"/>
+          <p:cNvSpPr>
+            <a:spLocks noGrp="1"/>
+          </p:cNvSpPr>
+          <p:nvPr>
+            <p:ph type="body" sz="quarter" idx="3"/>
+          </p:nvPr>
+        </p:nvSpPr>
+        <p:spPr>
+          <a:xfrm>
+            <a:off x="685800" y="4400550"/>
+            <a:ext cx="5486400" cy="3600450"/>
+          </a:xfrm>
+          <a:prstGeom prst="rect">
+            <a:avLst/>
+          </a:prstGeom>
+        </p:spPr>
+        <p:txBody>
+          <a:bodyPr vert="horz" lIns="91440" tIns="45720" rIns="91440" bIns="45720" rtlCol="0"/>
+          <a:lstStyle/>
+          <a:p>
+            <a:pPr lvl="0"/>
+            <a:r>
+              <a:rPr lang="en-US" smtClean="0"/>
+              <a:t>Click to edit Master text styles</a:t>
+            </a:r>
+          </a:p>
+          <a:p>
+            <a:pPr lvl="1"/>
+            <a:r>
+              <a:rPr lang="en-US" smtClean="0"/>
+              <a:t>Second level</a:t>
+            </a:r>
+          </a:p>
+          <a:p>
+            <a:pPr lvl="2"/>
+            <a:r>
+              <a:rPr lang="en-US" smtClean="0"/>
+              <a:t>Third level</a:t>
+            </a:r>
+          </a:p>
+          <a:p>
+            <a:pPr lvl="3"/>
+            <a:r>
+              <a:rPr lang="en-US" smtClean="0"/>
+              <a:t>Fourth level</a:t>
+            </a:r>
+          </a:p>
+          <a:p>
+            <a:pPr lvl="4"/>
+            <a:r>
+              <a:rPr lang="en-US" smtClean="0"/>
+              <a:t>Fifth level</a:t>
+            </a:r>
+            <a:endParaRPr lang="en-US"/>
+          </a:p>
+        </p:txBody>
+      </p:sp>
+      <p:sp>
+        <p:nvSpPr>
+          <p:cNvPr id="6" name="Footer Placeholder 5"/>
+          <p:cNvSpPr>
+            <a:spLocks noGrp="1"/>
+          </p:cNvSpPr>
+          <p:nvPr>
+            <p:ph type="ftr" sz="quarter" idx="4"/>
+          </p:nvPr>
+        </p:nvSpPr>
+        <p:spPr>
+          <a:xfrm>
+            <a:off x="0" y="8685213"/>
+            <a:ext cx="2971800" cy="458787"/>
+          </a:xfrm>
+          <a:prstGeom prst="rect">
+            <a:avLst/>
+          </a:prstGeom>
+        </p:spPr>
+        <p:txBody>
+          <a:bodyPr vert="horz" lIns="91440" tIns="45720" rIns="91440" bIns="45720" rtlCol="0" anchor="b"/>
+          <a:lstStyle>
+            <a:lvl1pPr algn="l">
+              <a:defRPr sz="1200"/>
+            </a:lvl1pPr>
+          </a:lstStyle>
+          <a:p>
+            <a:endParaRPr lang="en-US"/>
+          </a:p>
+        </p:txBody>
+      </p:sp>
+      <p:sp>
+        <p:nvSpPr>
+          <p:cNvPr id="7" name="Slide Number Placeholder 6"/>
+          <p:cNvSpPr>
+            <a:spLocks noGrp="1"/>
+          </p:cNvSpPr>
+          <p:nvPr>
+            <p:ph type="sldNum" sz="quarter" idx="5"/>
+          </p:nvPr>
+        </p:nvSpPr>
+        <p:spPr>
+          <a:xfrm>
+            <a:off x="3884613" y="8685213"/>
+            <a:ext cx="2971800" cy="458787"/>
+          </a:xfrm>
+          <a:prstGeom prst="rect">
+            <a:avLst/>
+          </a:prstGeom>
+        </p:spPr>
+        <p:txBody>
+          <a:bodyPr vert="horz" lIns="91440" tIns="45720" rIns="91440" bIns="45720" rtlCol="0" anchor="b"/>
+          <a:lstStyle>
+            <a:lvl1pPr algn="r">
+              <a:defRPr sz="1200"/>
+            </a:lvl1pPr>
+          </a:lstStyle>
+          <a:p>
+            <a:fld id="{2A831ED4-E08A-FF4A-9171-536F7D3746E6}" type="slidenum">
+              <a:rPr lang="en-US" smtClean="0"/>
+              <a:t>‹#›</a:t>
+            </a:fld>
+            <a:endParaRPr lang="en-US"/>
+          </a:p>
+        </p:txBody>
+      </p:sp>
+    </p:spTree>
+    <p:extLst>
+      <p:ext uri="{BB962C8B-B14F-4D97-AF65-F5344CB8AC3E}">
+        <p14:creationId xmlns:p14="http://schemas.microsoft.com/office/powerpoint/2010/main" val="1689924002"/>
+      </p:ext>
+    </p:extLst>
+  </p:cSld>
+  <p:clrMap bg1="lt1" tx1="dk1" bg2="lt2" tx2="dk2" accent1="accent1" accent2="accent2" accent3="accent3" accent4="accent4" accent5="accent5" accent6="accent6" hlink="hlink" folHlink="folHlink"/>
+  <p:notesStyle>
+    <a:lvl1pPr marL="0" algn="l" defTabSz="914400" rtl="0" eaLnBrk="1" latinLnBrk="0" hangingPunct="1">
+      <a:defRPr sz="1200" kern="1200">
+        <a:solidFill>
+          <a:schemeClr val="tx1"/>
+        </a:solidFill>
+        <a:latin typeface="+mn-lt"/>
+        <a:ea typeface="+mn-ea"/>
+        <a:cs typeface="+mn-cs"/>
+      </a:defRPr>
+    </a:lvl1pPr>
+    <a:lvl2pPr marL="457200" algn="l" defTabSz="914400" rtl="0" eaLnBrk="1" latinLnBrk="0" hangingPunct="1">
+      <a:defRPr sz="1200" kern="1200">
+        <a:solidFill>
+          <a:schemeClr val="tx1"/>
+        </a:solidFill>
+        <a:latin typeface="+mn-lt"/>
+        <a:ea typeface="+mn-ea"/>
+        <a:cs typeface="+mn-cs"/>
+      </a:defRPr>
+    </a:lvl2pPr>
+    <a:lvl3pPr marL="914400" algn="l" defTabSz="914400" rtl="0" eaLnBrk="1" latinLnBrk="0" hangingPunct="1">
+      <a:defRPr sz="1200" kern="1200">
+        <a:solidFill>
+          <a:schemeClr val="tx1"/>
+        </a:solidFill>
+        <a:latin typeface="+mn-lt"/>
+        <a:ea typeface="+mn-ea"/>
+        <a:cs typeface="+mn-cs"/>
+      </a:defRPr>
+    </a:lvl3pPr>
+    <a:lvl4pPr marL="1371600" algn="l" defTabSz="914400" rtl="0" eaLnBrk="1" latinLnBrk="0" hangingPunct="1">
+      <a:defRPr sz="1200" kern="1200">
+        <a:solidFill>
+          <a:schemeClr val="tx1"/>
+        </a:solidFill>
+        <a:latin typeface="+mn-lt"/>
+        <a:ea typeface="+mn-ea"/>
+        <a:cs typeface="+mn-cs"/>
+      </a:defRPr>
+    </a:lvl4pPr>
+    <a:lvl5pPr marL="1828800" algn="l" defTabSz="914400" rtl="0" eaLnBrk="1" latinLnBrk="0" hangingPunct="1">
+      <a:defRPr sz="1200" kern="1200">
+        <a:solidFill>
+          <a:schemeClr val="tx1"/>
+        </a:solidFill>
+        <a:latin typeface="+mn-lt"/>
+        <a:ea typeface="+mn-ea"/>
+        <a:cs typeface="+mn-cs"/>
+      </a:defRPr>
+    </a:lvl5pPr>
+    <a:lvl6pPr marL="2286000" algn="l" defTabSz="914400" rtl="0" eaLnBrk="1" latinLnBrk="0" hangingPunct="1">
+      <a:defRPr sz="1200" kern="1200">
+        <a:solidFill>
+          <a:schemeClr val="tx1"/>
+        </a:solidFill>
+        <a:latin typeface="+mn-lt"/>
+        <a:ea typeface="+mn-ea"/>
+        <a:cs typeface="+mn-cs"/>
+      </a:defRPr>
+    </a:lvl6pPr>
+    <a:lvl7pPr marL="2743200" algn="l" defTabSz="914400" rtl="0" eaLnBrk="1" latinLnBrk="0" hangingPunct="1">
+      <a:defRPr sz="1200" kern="1200">
+        <a:solidFill>
+          <a:schemeClr val="tx1"/>
+        </a:solidFill>
+        <a:latin typeface="+mn-lt"/>
+        <a:ea typeface="+mn-ea"/>
+        <a:cs typeface="+mn-cs"/>
+      </a:defRPr>
+    </a:lvl7pPr>
+    <a:lvl8pPr marL="3200400" algn="l" defTabSz="914400" rtl="0" eaLnBrk="1" latinLnBrk="0" hangingPunct="1">
+      <a:defRPr sz="1200" kern="1200">
+        <a:solidFill>
+          <a:schemeClr val="tx1"/>
+        </a:solidFill>
+        <a:latin typeface="+mn-lt"/>
+        <a:ea typeface="+mn-ea"/>
+        <a:cs typeface="+mn-cs"/>
+      </a:defRPr>
+    </a:lvl8pPr>
+    <a:lvl9pPr marL="3657600" algn="l" defTabSz="914400" rtl="0" eaLnBrk="1" latinLnBrk="0" hangingPunct="1">
+      <a:defRPr sz="1200" kern="1200">
+        <a:solidFill>
+          <a:schemeClr val="tx1"/>
+        </a:solidFill>
+        <a:latin typeface="+mn-lt"/>
+        <a:ea typeface="+mn-ea"/>
+        <a:cs typeface="+mn-cs"/>
+      </a:defRPr>
+    </a:lvl9pPr>
+  </p:notesStyle>
+</p:notesMaster>
+</file>
+
 <file path=ppt/slideLayouts/slideLayout1.xml><?xml version="1.0" encoding="utf-8"?>
 <p:sldLayout xmlns:a="http://schemas.openxmlformats.org/drawingml/2006/main" xmlns:r="http://schemas.openxmlformats.org/officeDocument/2006/relationships" xmlns:p="http://schemas.openxmlformats.org/presentationml/2006/main" type="title" preserve="1">
   <p:cSld name="Title Slide">
@@ -266,7 +628,7 @@
           <a:p>
             <a:fld id="{2FCDDBFB-5A55-4C7D-9621-3F1CC18082CF}" type="datetimeFigureOut">
               <a:rPr lang="en-US" smtClean="0"/>
-              <a:t>2/28/2017</a:t>
+              <a:t>2/28/17</a:t>
             </a:fld>
             <a:endParaRPr lang="en-US"/>
           </a:p>
@@ -434,7 +796,7 @@
           <a:p>
             <a:fld id="{2FCDDBFB-5A55-4C7D-9621-3F1CC18082CF}" type="datetimeFigureOut">
               <a:rPr lang="en-US" smtClean="0"/>
-              <a:t>2/28/2017</a:t>
+              <a:t>2/28/17</a:t>
             </a:fld>
             <a:endParaRPr lang="en-US"/>
           </a:p>
@@ -612,7 +974,7 @@
           <a:p>
             <a:fld id="{2FCDDBFB-5A55-4C7D-9621-3F1CC18082CF}" type="datetimeFigureOut">
               <a:rPr lang="en-US" smtClean="0"/>
-              <a:t>2/28/2017</a:t>
+              <a:t>2/28/17</a:t>
             </a:fld>
             <a:endParaRPr lang="en-US"/>
           </a:p>
@@ -780,7 +1142,7 @@
           <a:p>
             <a:fld id="{2FCDDBFB-5A55-4C7D-9621-3F1CC18082CF}" type="datetimeFigureOut">
               <a:rPr lang="en-US" smtClean="0"/>
-              <a:t>2/28/2017</a:t>
+              <a:t>2/28/17</a:t>
             </a:fld>
             <a:endParaRPr lang="en-US"/>
           </a:p>
@@ -1025,7 +1387,7 @@
           <a:p>
             <a:fld id="{2FCDDBFB-5A55-4C7D-9621-3F1CC18082CF}" type="datetimeFigureOut">
               <a:rPr lang="en-US" smtClean="0"/>
-              <a:t>2/28/2017</a:t>
+              <a:t>2/28/17</a:t>
             </a:fld>
             <a:endParaRPr lang="en-US"/>
           </a:p>
@@ -1254,7 +1616,7 @@
           <a:p>
             <a:fld id="{2FCDDBFB-5A55-4C7D-9621-3F1CC18082CF}" type="datetimeFigureOut">
               <a:rPr lang="en-US" smtClean="0"/>
-              <a:t>2/28/2017</a:t>
+              <a:t>2/28/17</a:t>
             </a:fld>
             <a:endParaRPr lang="en-US"/>
           </a:p>
@@ -1618,7 +1980,7 @@
           <a:p>
             <a:fld id="{2FCDDBFB-5A55-4C7D-9621-3F1CC18082CF}" type="datetimeFigureOut">
               <a:rPr lang="en-US" smtClean="0"/>
-              <a:t>2/28/2017</a:t>
+              <a:t>2/28/17</a:t>
             </a:fld>
             <a:endParaRPr lang="en-US"/>
           </a:p>
@@ -1735,7 +2097,7 @@
           <a:p>
             <a:fld id="{2FCDDBFB-5A55-4C7D-9621-3F1CC18082CF}" type="datetimeFigureOut">
               <a:rPr lang="en-US" smtClean="0"/>
-              <a:t>2/28/2017</a:t>
+              <a:t>2/28/17</a:t>
             </a:fld>
             <a:endParaRPr lang="en-US"/>
           </a:p>
@@ -1830,7 +2192,7 @@
           <a:p>
             <a:fld id="{2FCDDBFB-5A55-4C7D-9621-3F1CC18082CF}" type="datetimeFigureOut">
               <a:rPr lang="en-US" smtClean="0"/>
-              <a:t>2/28/2017</a:t>
+              <a:t>2/28/17</a:t>
             </a:fld>
             <a:endParaRPr lang="en-US"/>
           </a:p>
@@ -2105,7 +2467,7 @@
           <a:p>
             <a:fld id="{2FCDDBFB-5A55-4C7D-9621-3F1CC18082CF}" type="datetimeFigureOut">
               <a:rPr lang="en-US" smtClean="0"/>
-              <a:t>2/28/2017</a:t>
+              <a:t>2/28/17</a:t>
             </a:fld>
             <a:endParaRPr lang="en-US"/>
           </a:p>
@@ -2357,7 +2719,7 @@
           <a:p>
             <a:fld id="{2FCDDBFB-5A55-4C7D-9621-3F1CC18082CF}" type="datetimeFigureOut">
               <a:rPr lang="en-US" smtClean="0"/>
-              <a:t>2/28/2017</a:t>
+              <a:t>2/28/17</a:t>
             </a:fld>
             <a:endParaRPr lang="en-US"/>
           </a:p>
@@ -2620,7 +2982,7 @@
           <a:p>
             <a:fld id="{2FCDDBFB-5A55-4C7D-9621-3F1CC18082CF}" type="datetimeFigureOut">
               <a:rPr lang="en-US" smtClean="0"/>
-              <a:t>2/28/2017</a:t>
+              <a:t>2/28/17</a:t>
             </a:fld>
             <a:endParaRPr lang="en-US"/>
           </a:p>
@@ -3198,7 +3560,7 @@
       </p:grpSpPr>
       <p:sp>
         <p:nvSpPr>
-          <p:cNvPr id="2" name="Title 1"/>
+          <p:cNvPr id="4" name="Title 3"/>
           <p:cNvSpPr>
             <a:spLocks noGrp="1"/>
           </p:cNvSpPr>
@@ -3212,27 +3574,16 @@
           <a:lstStyle/>
           <a:p>
             <a:r>
-              <a:rPr lang="en-US" b="1" dirty="0" err="1">
-                <a:solidFill>
-                  <a:schemeClr val="accent4"/>
-                </a:solidFill>
-              </a:rPr>
-              <a:t>Serverless</a:t>
-            </a:r>
-            <a:r>
-              <a:rPr lang="en-US" b="1" dirty="0">
-                <a:solidFill>
-                  <a:schemeClr val="accent4"/>
-                </a:solidFill>
-              </a:rPr>
-              <a:t> as Trojan horse</a:t>
-            </a:r>
-          </a:p>
-        </p:txBody>
-      </p:sp>
-      <p:sp>
-        <p:nvSpPr>
-          <p:cNvPr id="3" name="Content Placeholder 2"/>
+              <a:rPr lang="en-US" dirty="0" smtClean="0"/>
+              <a:t>Inject some strategy</a:t>
+            </a:r>
+            <a:endParaRPr lang="en-US" dirty="0"/>
+          </a:p>
+        </p:txBody>
+      </p:sp>
+      <p:sp>
+        <p:nvSpPr>
+          <p:cNvPr id="5" name="Content Placeholder 4"/>
           <p:cNvSpPr>
             <a:spLocks noGrp="1"/>
           </p:cNvSpPr>
@@ -3246,28 +3597,25 @@
           <a:lstStyle/>
           <a:p>
             <a:r>
-              <a:rPr lang="en-US" dirty="0"/>
-              <a:t>It’s like magic – haven’t met a developer who didn’t love it</a:t>
-            </a:r>
-          </a:p>
-          <a:p>
-            <a:r>
-              <a:rPr lang="en-US" dirty="0"/>
-              <a:t>Easy to use, easy to experiment with</a:t>
-            </a:r>
-          </a:p>
-          <a:p>
-            <a:r>
-              <a:rPr lang="en-US" dirty="0"/>
-              <a:t>Low cost to learn, develop with, experiment with – only cost is time, no infrastructure or hosting</a:t>
-            </a:r>
+              <a:rPr lang="en-US" dirty="0" smtClean="0"/>
+              <a:t>Value Chain Mapping</a:t>
+            </a:r>
+          </a:p>
+          <a:p>
+            <a:r>
+              <a:rPr lang="en-US" dirty="0" smtClean="0"/>
+              <a:t>Show size bubble to relate to time/energy savings on how you do IT</a:t>
+            </a:r>
+          </a:p>
+          <a:p>
+            <a:endParaRPr lang="en-US" dirty="0"/>
           </a:p>
         </p:txBody>
       </p:sp>
     </p:spTree>
     <p:extLst>
       <p:ext uri="{BB962C8B-B14F-4D97-AF65-F5344CB8AC3E}">
-        <p14:creationId xmlns:p14="http://schemas.microsoft.com/office/powerpoint/2010/main" val="3178848806"/>
+        <p14:creationId xmlns:p14="http://schemas.microsoft.com/office/powerpoint/2010/main" val="2129982576"/>
       </p:ext>
     </p:extLst>
   </p:cSld>
@@ -3296,7 +3644,7 @@
       </p:grpSpPr>
       <p:sp>
         <p:nvSpPr>
-          <p:cNvPr id="2" name="Title 1"/>
+          <p:cNvPr id="4" name="Title 3"/>
           <p:cNvSpPr>
             <a:spLocks noGrp="1"/>
           </p:cNvSpPr>
@@ -3304,60 +3652,28 @@
             <p:ph type="title"/>
           </p:nvPr>
         </p:nvSpPr>
-        <p:spPr/>
-        <p:txBody>
-          <a:bodyPr/>
-          <a:lstStyle/>
-          <a:p>
-            <a:r>
-              <a:rPr lang="en-US" b="1" dirty="0">
-                <a:solidFill>
-                  <a:schemeClr val="accent4"/>
-                </a:solidFill>
-              </a:rPr>
-              <a:t>Who should do it</a:t>
-            </a:r>
-          </a:p>
-        </p:txBody>
-      </p:sp>
-      <p:sp>
-        <p:nvSpPr>
-          <p:cNvPr id="3" name="Content Placeholder 2"/>
-          <p:cNvSpPr>
-            <a:spLocks noGrp="1"/>
-          </p:cNvSpPr>
-          <p:nvPr>
-            <p:ph idx="1"/>
-          </p:nvPr>
-        </p:nvSpPr>
-        <p:spPr/>
-        <p:txBody>
-          <a:bodyPr/>
-          <a:lstStyle/>
-          <a:p>
-            <a:r>
-              <a:rPr lang="en-US" dirty="0"/>
-              <a:t>Everyone, but the value will you get is inversely related to the investments you have made in DevOps and the cloud already</a:t>
-            </a:r>
-          </a:p>
-          <a:p>
-            <a:r>
-              <a:rPr lang="en-US" dirty="0"/>
-              <a:t>For mature DevOps and cloud companies the benefits will be more incremental because they are already following best practices</a:t>
-            </a:r>
-          </a:p>
-          <a:p>
-            <a:r>
-              <a:rPr lang="en-US" dirty="0"/>
-              <a:t>For companies without strong DevOps or cloud practices the value is much higher</a:t>
-            </a:r>
+        <p:spPr>
+          <a:xfrm>
+            <a:off x="5133975" y="2346325"/>
+            <a:ext cx="2771775" cy="1325563"/>
+          </a:xfrm>
+        </p:spPr>
+        <p:txBody>
+          <a:bodyPr/>
+          <a:lstStyle/>
+          <a:p>
+            <a:r>
+              <a:rPr lang="en-US" dirty="0" smtClean="0"/>
+              <a:t>-Break-</a:t>
+            </a:r>
+            <a:endParaRPr lang="en-US" dirty="0"/>
           </a:p>
         </p:txBody>
       </p:sp>
     </p:spTree>
     <p:extLst>
       <p:ext uri="{BB962C8B-B14F-4D97-AF65-F5344CB8AC3E}">
-        <p14:creationId xmlns:p14="http://schemas.microsoft.com/office/powerpoint/2010/main" val="2452892142"/>
+        <p14:creationId xmlns:p14="http://schemas.microsoft.com/office/powerpoint/2010/main" val="1528839424"/>
       </p:ext>
     </p:extLst>
   </p:cSld>
@@ -3405,8 +3721,21 @@
                   <a:schemeClr val="accent4"/>
                 </a:solidFill>
               </a:rPr>
-              <a:t>How to try it</a:t>
-            </a:r>
+              <a:t>Quick intro to </a:t>
+            </a:r>
+            <a:r>
+              <a:rPr lang="en-US" b="1" dirty="0" err="1">
+                <a:solidFill>
+                  <a:schemeClr val="accent4"/>
+                </a:solidFill>
+              </a:rPr>
+              <a:t>serverless</a:t>
+            </a:r>
+            <a:endParaRPr lang="en-US" b="1" dirty="0">
+              <a:solidFill>
+                <a:schemeClr val="accent4"/>
+              </a:solidFill>
+            </a:endParaRPr>
           </a:p>
         </p:txBody>
       </p:sp>
@@ -3427,65 +3756,30 @@
           <a:p>
             <a:r>
               <a:rPr lang="en-US" dirty="0"/>
-              <a:t>If the people you’ve hired have built a mature DevOps and cloud company they already know about </a:t>
-            </a:r>
-            <a:r>
-              <a:rPr lang="en-US" dirty="0" err="1"/>
-              <a:t>serverless</a:t>
-            </a:r>
+              <a:t>Patterns</a:t>
+            </a:r>
+          </a:p>
+          <a:p>
             <a:r>
               <a:rPr lang="en-US" dirty="0"/>
-              <a:t> and love it, and probably are already using it</a:t>
+              <a:t>Framework</a:t>
             </a:r>
           </a:p>
           <a:p>
             <a:r>
               <a:rPr lang="en-US" dirty="0"/>
-              <a:t>If the people you’ve hired haven’t built a mature DevOps and cloud company</a:t>
-            </a:r>
-          </a:p>
-          <a:p>
-            <a:pPr lvl="1"/>
-            <a:r>
-              <a:rPr lang="en-US" dirty="0"/>
-              <a:t>If they would like to but can’t for whatever reasons, they likely know about </a:t>
-            </a:r>
-            <a:r>
-              <a:rPr lang="en-US" dirty="0" err="1"/>
-              <a:t>serverless</a:t>
-            </a:r>
-            <a:r>
-              <a:rPr lang="en-US" dirty="0"/>
-              <a:t> and have used it on side projects and love it</a:t>
-            </a:r>
-          </a:p>
-          <a:p>
-            <a:pPr lvl="1"/>
-            <a:r>
-              <a:rPr lang="en-US" dirty="0"/>
-              <a:t>If they aren’t pushing for DevOps or cloud there’s a good chance they don’t know anything about </a:t>
-            </a:r>
-            <a:r>
-              <a:rPr lang="en-US" dirty="0" err="1"/>
-              <a:t>serverless</a:t>
-            </a:r>
-            <a:r>
-              <a:rPr lang="en-US" dirty="0"/>
-              <a:t> (or DevOps practices in general)</a:t>
-            </a:r>
-          </a:p>
-          <a:p>
-            <a:r>
-              <a:rPr lang="en-US" dirty="0"/>
-              <a:t>Know the group you are working with</a:t>
-            </a:r>
+              <a:t>AWS</a:t>
+            </a:r>
+          </a:p>
+          <a:p>
+            <a:endParaRPr lang="en-US" dirty="0"/>
           </a:p>
         </p:txBody>
       </p:sp>
     </p:spTree>
     <p:extLst>
       <p:ext uri="{BB962C8B-B14F-4D97-AF65-F5344CB8AC3E}">
-        <p14:creationId xmlns:p14="http://schemas.microsoft.com/office/powerpoint/2010/main" val="2985073515"/>
+        <p14:creationId xmlns:p14="http://schemas.microsoft.com/office/powerpoint/2010/main" val="2086479514"/>
       </p:ext>
     </p:extLst>
   </p:cSld>
@@ -3533,7 +3827,7 @@
                   <a:schemeClr val="accent4"/>
                 </a:solidFill>
               </a:rPr>
-              <a:t>Challenges to implement</a:t>
+              <a:t>Define what we’re talking about</a:t>
             </a:r>
           </a:p>
         </p:txBody>
@@ -3554,16 +3848,26 @@
           <a:lstStyle/>
           <a:p>
             <a:r>
+              <a:rPr lang="en-US" dirty="0" err="1"/>
+              <a:t>Serverless</a:t>
+            </a:r>
+            <a:r>
               <a:rPr lang="en-US" dirty="0"/>
-              <a:t>Retailers run large off the shelf software packages, how to incorporate </a:t>
+              <a:t> as general pattern</a:t>
+            </a:r>
+          </a:p>
+          <a:p>
+            <a:r>
+              <a:rPr lang="en-US" dirty="0"/>
+              <a:t>Specifically using experience we have with using the </a:t>
             </a:r>
             <a:r>
               <a:rPr lang="en-US" dirty="0" err="1"/>
-              <a:t>serverless</a:t>
+              <a:t>Serverless</a:t>
             </a:r>
             <a:r>
               <a:rPr lang="en-US" dirty="0"/>
-              <a:t> models around it</a:t>
+              <a:t> Framework on AWS</a:t>
             </a:r>
           </a:p>
         </p:txBody>
@@ -3571,7 +3875,7 @@
     </p:spTree>
     <p:extLst>
       <p:ext uri="{BB962C8B-B14F-4D97-AF65-F5344CB8AC3E}">
-        <p14:creationId xmlns:p14="http://schemas.microsoft.com/office/powerpoint/2010/main" val="2979025380"/>
+        <p14:creationId xmlns:p14="http://schemas.microsoft.com/office/powerpoint/2010/main" val="3922689527"/>
       </p:ext>
     </p:extLst>
   </p:cSld>
@@ -3619,6 +3923,1908 @@
                   <a:schemeClr val="accent4"/>
                 </a:solidFill>
               </a:rPr>
+              <a:t>Where’s the audience at, and our premise</a:t>
+            </a:r>
+          </a:p>
+        </p:txBody>
+      </p:sp>
+      <p:sp>
+        <p:nvSpPr>
+          <p:cNvPr id="3" name="Content Placeholder 2"/>
+          <p:cNvSpPr>
+            <a:spLocks noGrp="1"/>
+          </p:cNvSpPr>
+          <p:nvPr>
+            <p:ph idx="1"/>
+          </p:nvPr>
+        </p:nvSpPr>
+        <p:spPr/>
+        <p:txBody>
+          <a:bodyPr/>
+          <a:lstStyle/>
+          <a:p>
+            <a:r>
+              <a:rPr lang="en-US" dirty="0"/>
+              <a:t>Maturity framework of DevOps/cloud adoption</a:t>
+            </a:r>
+          </a:p>
+          <a:p>
+            <a:pPr lvl="1"/>
+            <a:r>
+              <a:rPr lang="en-US" dirty="0"/>
+              <a:t>Show framework, ask people where they are, we will show how </a:t>
+            </a:r>
+            <a:r>
+              <a:rPr lang="en-US" dirty="0" err="1"/>
+              <a:t>serverless</a:t>
+            </a:r>
+            <a:r>
+              <a:rPr lang="en-US" dirty="0"/>
+              <a:t> gets you to most mature stage</a:t>
+            </a:r>
+          </a:p>
+          <a:p>
+            <a:pPr lvl="1"/>
+            <a:endParaRPr lang="en-US" dirty="0"/>
+          </a:p>
+          <a:p>
+            <a:r>
+              <a:rPr lang="en-US" dirty="0"/>
+              <a:t>Makes it easier for you to do all the things you should have done before</a:t>
+            </a:r>
+          </a:p>
+          <a:p>
+            <a:pPr lvl="1"/>
+            <a:r>
+              <a:rPr lang="en-US" dirty="0" err="1"/>
+              <a:t>Serverless</a:t>
+            </a:r>
+            <a:r>
+              <a:rPr lang="en-US" dirty="0"/>
+              <a:t> democratizes the DevOps movement</a:t>
+            </a:r>
+          </a:p>
+          <a:p>
+            <a:pPr lvl="1"/>
+            <a:r>
+              <a:rPr lang="en-US" dirty="0" err="1"/>
+              <a:t>Serverless</a:t>
+            </a:r>
+            <a:r>
+              <a:rPr lang="en-US" dirty="0"/>
+              <a:t> is the pinnacle of the DevOps movement</a:t>
+            </a:r>
+          </a:p>
+          <a:p>
+            <a:pPr lvl="1"/>
+            <a:r>
+              <a:rPr lang="en-US" dirty="0"/>
+              <a:t>We think </a:t>
+            </a:r>
+            <a:r>
+              <a:rPr lang="en-US" dirty="0" err="1"/>
+              <a:t>serverless</a:t>
+            </a:r>
+            <a:r>
+              <a:rPr lang="en-US" dirty="0"/>
+              <a:t> is the best opportunity for adopting DevOps best practices at your organization</a:t>
+            </a:r>
+          </a:p>
+          <a:p>
+            <a:endParaRPr lang="en-US" dirty="0"/>
+          </a:p>
+        </p:txBody>
+      </p:sp>
+    </p:spTree>
+    <p:extLst>
+      <p:ext uri="{BB962C8B-B14F-4D97-AF65-F5344CB8AC3E}">
+        <p14:creationId xmlns:p14="http://schemas.microsoft.com/office/powerpoint/2010/main" val="3843945573"/>
+      </p:ext>
+    </p:extLst>
+  </p:cSld>
+  <p:clrMapOvr>
+    <a:masterClrMapping/>
+  </p:clrMapOvr>
+</p:sld>
+</file>
+
+<file path=ppt/slides/slide15.xml><?xml version="1.0" encoding="utf-8"?>
+<p:sld xmlns:a="http://schemas.openxmlformats.org/drawingml/2006/main" xmlns:r="http://schemas.openxmlformats.org/officeDocument/2006/relationships" xmlns:p="http://schemas.openxmlformats.org/presentationml/2006/main">
+  <p:cSld>
+    <p:spTree>
+      <p:nvGrpSpPr>
+        <p:cNvPr id="1" name=""/>
+        <p:cNvGrpSpPr/>
+        <p:nvPr/>
+      </p:nvGrpSpPr>
+      <p:grpSpPr>
+        <a:xfrm>
+          <a:off x="0" y="0"/>
+          <a:ext cx="0" cy="0"/>
+          <a:chOff x="0" y="0"/>
+          <a:chExt cx="0" cy="0"/>
+        </a:xfrm>
+      </p:grpSpPr>
+      <p:sp>
+        <p:nvSpPr>
+          <p:cNvPr id="2" name="Title 1"/>
+          <p:cNvSpPr>
+            <a:spLocks noGrp="1"/>
+          </p:cNvSpPr>
+          <p:nvPr>
+            <p:ph type="title"/>
+          </p:nvPr>
+        </p:nvSpPr>
+        <p:spPr/>
+        <p:txBody>
+          <a:bodyPr/>
+          <a:lstStyle/>
+          <a:p>
+            <a:r>
+              <a:rPr lang="en-US" b="1" dirty="0">
+                <a:solidFill>
+                  <a:schemeClr val="accent4"/>
+                </a:solidFill>
+              </a:rPr>
+              <a:t>DevOps &amp; cloud best practices maturity model</a:t>
+            </a:r>
+          </a:p>
+        </p:txBody>
+      </p:sp>
+      <p:graphicFrame>
+        <p:nvGraphicFramePr>
+          <p:cNvPr id="4" name="Table 3"/>
+          <p:cNvGraphicFramePr>
+            <a:graphicFrameLocks noGrp="1"/>
+          </p:cNvGraphicFramePr>
+          <p:nvPr>
+            <p:extLst>
+              <p:ext uri="{D42A27DB-BD31-4B8C-83A1-F6EECF244321}">
+                <p14:modId xmlns:p14="http://schemas.microsoft.com/office/powerpoint/2010/main" val="4004099653"/>
+              </p:ext>
+            </p:extLst>
+          </p:nvPr>
+        </p:nvGraphicFramePr>
+        <p:xfrm>
+          <a:off x="0" y="1433345"/>
+          <a:ext cx="12192000" cy="5354320"/>
+        </p:xfrm>
+        <a:graphic>
+          <a:graphicData uri="http://schemas.openxmlformats.org/drawingml/2006/table">
+            <a:tbl>
+              <a:tblPr firstRow="1" bandRow="1">
+                <a:tableStyleId>{91EBBBCC-DAD2-459C-BE2E-F6DE35CF9A28}</a:tableStyleId>
+              </a:tblPr>
+              <a:tblGrid>
+                <a:gridCol w="2007955">
+                  <a:extLst>
+                    <a:ext uri="{9D8B030D-6E8A-4147-A177-3AD203B41FA5}">
+                      <a16:colId xmlns:a16="http://schemas.microsoft.com/office/drawing/2014/main" xmlns="" val="2231685289"/>
+                    </a:ext>
+                  </a:extLst>
+                </a:gridCol>
+                <a:gridCol w="3025457">
+                  <a:extLst>
+                    <a:ext uri="{9D8B030D-6E8A-4147-A177-3AD203B41FA5}">
+                      <a16:colId xmlns:a16="http://schemas.microsoft.com/office/drawing/2014/main" xmlns="" val="692404139"/>
+                    </a:ext>
+                  </a:extLst>
+                </a:gridCol>
+                <a:gridCol w="3579294">
+                  <a:extLst>
+                    <a:ext uri="{9D8B030D-6E8A-4147-A177-3AD203B41FA5}">
+                      <a16:colId xmlns:a16="http://schemas.microsoft.com/office/drawing/2014/main" xmlns="" val="435260598"/>
+                    </a:ext>
+                  </a:extLst>
+                </a:gridCol>
+                <a:gridCol w="3579294">
+                  <a:extLst>
+                    <a:ext uri="{9D8B030D-6E8A-4147-A177-3AD203B41FA5}">
+                      <a16:colId xmlns:a16="http://schemas.microsoft.com/office/drawing/2014/main" xmlns="" val="3371916354"/>
+                    </a:ext>
+                  </a:extLst>
+                </a:gridCol>
+              </a:tblGrid>
+              <a:tr h="370840">
+                <a:tc>
+                  <a:txBody>
+                    <a:bodyPr/>
+                    <a:lstStyle/>
+                    <a:p>
+                      <a:r>
+                        <a:rPr lang="en-US" dirty="0"/>
+                        <a:t>Metric</a:t>
+                      </a:r>
+                    </a:p>
+                  </a:txBody>
+                  <a:tcPr/>
+                </a:tc>
+                <a:tc>
+                  <a:txBody>
+                    <a:bodyPr/>
+                    <a:lstStyle/>
+                    <a:p>
+                      <a:pPr algn="ctr"/>
+                      <a:r>
+                        <a:rPr lang="en-US" dirty="0"/>
+                        <a:t>I</a:t>
+                      </a:r>
+                    </a:p>
+                  </a:txBody>
+                  <a:tcPr/>
+                </a:tc>
+                <a:tc>
+                  <a:txBody>
+                    <a:bodyPr/>
+                    <a:lstStyle/>
+                    <a:p>
+                      <a:pPr algn="ctr"/>
+                      <a:r>
+                        <a:rPr lang="en-US" dirty="0"/>
+                        <a:t>II</a:t>
+                      </a:r>
+                    </a:p>
+                  </a:txBody>
+                  <a:tcPr/>
+                </a:tc>
+                <a:tc>
+                  <a:txBody>
+                    <a:bodyPr/>
+                    <a:lstStyle/>
+                    <a:p>
+                      <a:pPr algn="ctr"/>
+                      <a:r>
+                        <a:rPr lang="en-US" dirty="0"/>
+                        <a:t>III</a:t>
+                      </a:r>
+                    </a:p>
+                  </a:txBody>
+                  <a:tcPr/>
+                </a:tc>
+                <a:extLst>
+                  <a:ext uri="{0D108BD9-81ED-4DB2-BD59-A6C34878D82A}">
+                    <a16:rowId xmlns:a16="http://schemas.microsoft.com/office/drawing/2014/main" xmlns="" val="924742772"/>
+                  </a:ext>
+                </a:extLst>
+              </a:tr>
+              <a:tr h="370840">
+                <a:tc>
+                  <a:txBody>
+                    <a:bodyPr/>
+                    <a:lstStyle/>
+                    <a:p>
+                      <a:r>
+                        <a:rPr lang="en-US" b="1" dirty="0"/>
+                        <a:t>Culture</a:t>
+                      </a:r>
+                    </a:p>
+                  </a:txBody>
+                  <a:tcPr anchor="ctr"/>
+                </a:tc>
+                <a:tc>
+                  <a:txBody>
+                    <a:bodyPr/>
+                    <a:lstStyle/>
+                    <a:p>
+                      <a:pPr marL="285750" indent="-285750">
+                        <a:buFont typeface="Calibri" panose="020F0502020204030204" pitchFamily="34" charset="0"/>
+                        <a:buChar char="-"/>
+                      </a:pPr>
+                      <a:r>
+                        <a:rPr lang="en-US" sz="1600" dirty="0"/>
+                        <a:t>Execute defined processes</a:t>
+                      </a:r>
+                    </a:p>
+                  </a:txBody>
+                  <a:tcPr anchor="ctr"/>
+                </a:tc>
+                <a:tc>
+                  <a:txBody>
+                    <a:bodyPr/>
+                    <a:lstStyle/>
+                    <a:p>
+                      <a:pPr marL="285750" indent="-285750">
+                        <a:buFont typeface="Calibri" panose="020F0502020204030204" pitchFamily="34" charset="0"/>
+                        <a:buChar char="-"/>
+                      </a:pPr>
+                      <a:endParaRPr lang="en-US" sz="1600" dirty="0"/>
+                    </a:p>
+                  </a:txBody>
+                  <a:tcPr anchor="ctr"/>
+                </a:tc>
+                <a:tc>
+                  <a:txBody>
+                    <a:bodyPr/>
+                    <a:lstStyle/>
+                    <a:p>
+                      <a:pPr marL="285750" indent="-285750">
+                        <a:buFont typeface="Calibri" panose="020F0502020204030204" pitchFamily="34" charset="0"/>
+                        <a:buChar char="-"/>
+                      </a:pPr>
+                      <a:r>
+                        <a:rPr lang="en-US" sz="1600" dirty="0"/>
+                        <a:t>Learning organization</a:t>
+                      </a:r>
+                    </a:p>
+                    <a:p>
+                      <a:pPr marL="285750" indent="-285750">
+                        <a:buFont typeface="Calibri" panose="020F0502020204030204" pitchFamily="34" charset="0"/>
+                        <a:buChar char="-"/>
+                      </a:pPr>
+                      <a:r>
+                        <a:rPr lang="en-US" sz="1600" dirty="0"/>
+                        <a:t>Feedback loops</a:t>
+                      </a:r>
+                    </a:p>
+                  </a:txBody>
+                  <a:tcPr anchor="ctr"/>
+                </a:tc>
+                <a:extLst>
+                  <a:ext uri="{0D108BD9-81ED-4DB2-BD59-A6C34878D82A}">
+                    <a16:rowId xmlns:a16="http://schemas.microsoft.com/office/drawing/2014/main" xmlns="" val="2787532655"/>
+                  </a:ext>
+                </a:extLst>
+              </a:tr>
+              <a:tr h="370840">
+                <a:tc>
+                  <a:txBody>
+                    <a:bodyPr/>
+                    <a:lstStyle/>
+                    <a:p>
+                      <a:r>
+                        <a:rPr lang="en-US" b="1" dirty="0"/>
+                        <a:t>Organization</a:t>
+                      </a:r>
+                    </a:p>
+                  </a:txBody>
+                  <a:tcPr anchor="ctr"/>
+                </a:tc>
+                <a:tc>
+                  <a:txBody>
+                    <a:bodyPr/>
+                    <a:lstStyle/>
+                    <a:p>
+                      <a:pPr marL="285750" indent="-285750">
+                        <a:buFont typeface="Calibri" panose="020F0502020204030204" pitchFamily="34" charset="0"/>
+                        <a:buChar char="-"/>
+                      </a:pPr>
+                      <a:r>
+                        <a:rPr lang="en-US" sz="1600" dirty="0"/>
+                        <a:t>Technology &amp; platform teams</a:t>
+                      </a:r>
+                    </a:p>
+                  </a:txBody>
+                  <a:tcPr anchor="ctr"/>
+                </a:tc>
+                <a:tc>
+                  <a:txBody>
+                    <a:bodyPr/>
+                    <a:lstStyle/>
+                    <a:p>
+                      <a:pPr marL="285750" marR="0" lvl="0" indent="-285750" algn="l" defTabSz="914400" rtl="0" eaLnBrk="1" fontAlgn="auto" latinLnBrk="0" hangingPunct="1">
+                        <a:lnSpc>
+                          <a:spcPct val="100000"/>
+                        </a:lnSpc>
+                        <a:spcBef>
+                          <a:spcPts val="0"/>
+                        </a:spcBef>
+                        <a:spcAft>
+                          <a:spcPts val="0"/>
+                        </a:spcAft>
+                        <a:buClrTx/>
+                        <a:buSzTx/>
+                        <a:buFont typeface="Calibri" panose="020F0502020204030204" pitchFamily="34" charset="0"/>
+                        <a:buChar char="-"/>
+                        <a:tabLst/>
+                        <a:defRPr/>
+                      </a:pPr>
+                      <a:r>
+                        <a:rPr lang="en-US" sz="1600" dirty="0"/>
+                        <a:t>Lifecycle teams</a:t>
+                      </a:r>
+                    </a:p>
+                  </a:txBody>
+                  <a:tcPr anchor="ctr"/>
+                </a:tc>
+                <a:tc>
+                  <a:txBody>
+                    <a:bodyPr/>
+                    <a:lstStyle/>
+                    <a:p>
+                      <a:pPr marL="285750" indent="-285750">
+                        <a:buFont typeface="Calibri" panose="020F0502020204030204" pitchFamily="34" charset="0"/>
+                        <a:buChar char="-"/>
+                      </a:pPr>
+                      <a:r>
+                        <a:rPr lang="en-US" sz="1600" dirty="0"/>
+                        <a:t>Autonomous product lifecycle teams</a:t>
+                      </a:r>
+                    </a:p>
+                  </a:txBody>
+                  <a:tcPr anchor="ctr"/>
+                </a:tc>
+                <a:extLst>
+                  <a:ext uri="{0D108BD9-81ED-4DB2-BD59-A6C34878D82A}">
+                    <a16:rowId xmlns:a16="http://schemas.microsoft.com/office/drawing/2014/main" xmlns="" val="4207372121"/>
+                  </a:ext>
+                </a:extLst>
+              </a:tr>
+              <a:tr h="370840">
+                <a:tc>
+                  <a:txBody>
+                    <a:bodyPr/>
+                    <a:lstStyle/>
+                    <a:p>
+                      <a:r>
+                        <a:rPr lang="en-US" b="1" dirty="0"/>
+                        <a:t>Projects</a:t>
+                      </a:r>
+                    </a:p>
+                  </a:txBody>
+                  <a:tcPr anchor="ctr"/>
+                </a:tc>
+                <a:tc>
+                  <a:txBody>
+                    <a:bodyPr/>
+                    <a:lstStyle/>
+                    <a:p>
+                      <a:pPr marL="285750" indent="-285750">
+                        <a:buFont typeface="Calibri" panose="020F0502020204030204" pitchFamily="34" charset="0"/>
+                        <a:buChar char="-"/>
+                      </a:pPr>
+                      <a:r>
+                        <a:rPr lang="en-US" sz="1600" dirty="0"/>
+                        <a:t>Large, cross-team projects</a:t>
+                      </a:r>
+                    </a:p>
+                    <a:p>
+                      <a:pPr marL="285750" indent="-285750">
+                        <a:buFont typeface="Calibri" panose="020F0502020204030204" pitchFamily="34" charset="0"/>
+                        <a:buChar char="-"/>
+                      </a:pPr>
+                      <a:r>
+                        <a:rPr lang="en-US" sz="1600" dirty="0"/>
+                        <a:t>Multi-year</a:t>
+                      </a:r>
+                    </a:p>
+                  </a:txBody>
+                  <a:tcPr anchor="ctr"/>
+                </a:tc>
+                <a:tc>
+                  <a:txBody>
+                    <a:bodyPr/>
+                    <a:lstStyle/>
+                    <a:p>
+                      <a:pPr marL="285750" marR="0" lvl="0" indent="-285750" algn="l" defTabSz="914400" rtl="0" eaLnBrk="1" fontAlgn="auto" latinLnBrk="0" hangingPunct="1">
+                        <a:lnSpc>
+                          <a:spcPct val="100000"/>
+                        </a:lnSpc>
+                        <a:spcBef>
+                          <a:spcPts val="0"/>
+                        </a:spcBef>
+                        <a:spcAft>
+                          <a:spcPts val="0"/>
+                        </a:spcAft>
+                        <a:buClrTx/>
+                        <a:buSzTx/>
+                        <a:buFont typeface="Calibri" panose="020F0502020204030204" pitchFamily="34" charset="0"/>
+                        <a:buChar char="-"/>
+                        <a:tabLst/>
+                        <a:defRPr/>
+                      </a:pPr>
+                      <a:r>
+                        <a:rPr lang="en-US" sz="1600" dirty="0"/>
+                        <a:t>Series of small, discrete projects</a:t>
+                      </a:r>
+                    </a:p>
+                    <a:p>
+                      <a:pPr marL="285750" marR="0" lvl="0" indent="-285750" algn="l" defTabSz="914400" rtl="0" eaLnBrk="1" fontAlgn="auto" latinLnBrk="0" hangingPunct="1">
+                        <a:lnSpc>
+                          <a:spcPct val="100000"/>
+                        </a:lnSpc>
+                        <a:spcBef>
+                          <a:spcPts val="0"/>
+                        </a:spcBef>
+                        <a:spcAft>
+                          <a:spcPts val="0"/>
+                        </a:spcAft>
+                        <a:buClrTx/>
+                        <a:buSzTx/>
+                        <a:buFont typeface="Calibri" panose="020F0502020204030204" pitchFamily="34" charset="0"/>
+                        <a:buChar char="-"/>
+                        <a:tabLst/>
+                        <a:defRPr/>
+                      </a:pPr>
+                      <a:r>
+                        <a:rPr lang="en-US" sz="1600" dirty="0"/>
+                        <a:t>Some cross-cutting</a:t>
+                      </a:r>
+                    </a:p>
+                  </a:txBody>
+                  <a:tcPr anchor="ctr"/>
+                </a:tc>
+                <a:tc>
+                  <a:txBody>
+                    <a:bodyPr/>
+                    <a:lstStyle/>
+                    <a:p>
+                      <a:pPr marL="285750" indent="-285750">
+                        <a:buFont typeface="Calibri" panose="020F0502020204030204" pitchFamily="34" charset="0"/>
+                        <a:buChar char="-"/>
+                      </a:pPr>
+                      <a:r>
+                        <a:rPr lang="en-US" sz="1600" dirty="0"/>
+                        <a:t>Focus on products</a:t>
+                      </a:r>
+                    </a:p>
+                    <a:p>
+                      <a:pPr marL="285750" indent="-285750">
+                        <a:buFont typeface="Calibri" panose="020F0502020204030204" pitchFamily="34" charset="0"/>
+                        <a:buChar char="-"/>
+                      </a:pPr>
+                      <a:r>
+                        <a:rPr lang="en-US" sz="1600" dirty="0"/>
+                        <a:t>Mission-based</a:t>
+                      </a:r>
+                    </a:p>
+                    <a:p>
+                      <a:pPr marL="285750" indent="-285750">
+                        <a:buFont typeface="Calibri" panose="020F0502020204030204" pitchFamily="34" charset="0"/>
+                        <a:buChar char="-"/>
+                      </a:pPr>
+                      <a:r>
+                        <a:rPr lang="en-US" sz="1600" dirty="0"/>
+                        <a:t>Autonomy and experimentation</a:t>
+                      </a:r>
+                    </a:p>
+                    <a:p>
+                      <a:pPr marL="285750" indent="-285750">
+                        <a:buFont typeface="Calibri" panose="020F0502020204030204" pitchFamily="34" charset="0"/>
+                        <a:buChar char="-"/>
+                      </a:pPr>
+                      <a:r>
+                        <a:rPr lang="en-US" sz="1600" dirty="0"/>
+                        <a:t>Iterative</a:t>
+                      </a:r>
+                    </a:p>
+                  </a:txBody>
+                  <a:tcPr anchor="ctr"/>
+                </a:tc>
+                <a:extLst>
+                  <a:ext uri="{0D108BD9-81ED-4DB2-BD59-A6C34878D82A}">
+                    <a16:rowId xmlns:a16="http://schemas.microsoft.com/office/drawing/2014/main" xmlns="" val="570727899"/>
+                  </a:ext>
+                </a:extLst>
+              </a:tr>
+              <a:tr h="370840">
+                <a:tc>
+                  <a:txBody>
+                    <a:bodyPr/>
+                    <a:lstStyle/>
+                    <a:p>
+                      <a:r>
+                        <a:rPr lang="en-US" b="1" dirty="0"/>
+                        <a:t>Data decision making</a:t>
+                      </a:r>
+                    </a:p>
+                  </a:txBody>
+                  <a:tcPr anchor="ctr"/>
+                </a:tc>
+                <a:tc>
+                  <a:txBody>
+                    <a:bodyPr/>
+                    <a:lstStyle/>
+                    <a:p>
+                      <a:pPr marL="285750" indent="-285750">
+                        <a:buFont typeface="Calibri" panose="020F0502020204030204" pitchFamily="34" charset="0"/>
+                        <a:buChar char="-"/>
+                      </a:pPr>
+                      <a:r>
+                        <a:rPr lang="en-US" sz="1600" dirty="0" err="1"/>
+                        <a:t>HiPPO</a:t>
+                      </a:r>
+                      <a:endParaRPr lang="en-US" sz="1600" dirty="0"/>
+                    </a:p>
+                  </a:txBody>
+                  <a:tcPr anchor="ctr"/>
+                </a:tc>
+                <a:tc>
+                  <a:txBody>
+                    <a:bodyPr/>
+                    <a:lstStyle/>
+                    <a:p>
+                      <a:pPr marL="285750" indent="-285750">
+                        <a:buFont typeface="Calibri" panose="020F0502020204030204" pitchFamily="34" charset="0"/>
+                        <a:buChar char="-"/>
+                      </a:pPr>
+                      <a:r>
+                        <a:rPr lang="en-US" sz="1600" dirty="0"/>
+                        <a:t>Structured, schedule reporting</a:t>
+                      </a:r>
+                    </a:p>
+                    <a:p>
+                      <a:pPr marL="285750" indent="-285750">
+                        <a:buFont typeface="Calibri" panose="020F0502020204030204" pitchFamily="34" charset="0"/>
+                        <a:buChar char="-"/>
+                      </a:pPr>
+                      <a:r>
+                        <a:rPr lang="en-US" sz="1600" dirty="0"/>
+                        <a:t>Frequently in silos</a:t>
+                      </a:r>
+                    </a:p>
+                  </a:txBody>
+                  <a:tcPr anchor="ctr"/>
+                </a:tc>
+                <a:tc>
+                  <a:txBody>
+                    <a:bodyPr/>
+                    <a:lstStyle/>
+                    <a:p>
+                      <a:pPr marL="285750" indent="-285750">
+                        <a:buFont typeface="Calibri" panose="020F0502020204030204" pitchFamily="34" charset="0"/>
+                        <a:buChar char="-"/>
+                      </a:pPr>
+                      <a:r>
+                        <a:rPr lang="en-US" sz="1600" dirty="0"/>
+                        <a:t>Data-driven</a:t>
+                      </a:r>
+                    </a:p>
+                    <a:p>
+                      <a:pPr marL="285750" indent="-285750">
+                        <a:buFont typeface="Calibri" panose="020F0502020204030204" pitchFamily="34" charset="0"/>
+                        <a:buChar char="-"/>
+                      </a:pPr>
+                      <a:r>
+                        <a:rPr lang="en-US" sz="1600" dirty="0"/>
+                        <a:t>Everyone in organization has access to all data</a:t>
+                      </a:r>
+                    </a:p>
+                  </a:txBody>
+                  <a:tcPr anchor="ctr"/>
+                </a:tc>
+                <a:extLst>
+                  <a:ext uri="{0D108BD9-81ED-4DB2-BD59-A6C34878D82A}">
+                    <a16:rowId xmlns:a16="http://schemas.microsoft.com/office/drawing/2014/main" xmlns="" val="3237965323"/>
+                  </a:ext>
+                </a:extLst>
+              </a:tr>
+              <a:tr h="370840">
+                <a:tc>
+                  <a:txBody>
+                    <a:bodyPr/>
+                    <a:lstStyle/>
+                    <a:p>
+                      <a:r>
+                        <a:rPr lang="en-US" b="1" dirty="0"/>
+                        <a:t>Delivery</a:t>
+                      </a:r>
+                    </a:p>
+                  </a:txBody>
+                  <a:tcPr anchor="ctr"/>
+                </a:tc>
+                <a:tc>
+                  <a:txBody>
+                    <a:bodyPr/>
+                    <a:lstStyle/>
+                    <a:p>
+                      <a:pPr marL="285750" indent="-285750">
+                        <a:buFont typeface="Calibri" panose="020F0502020204030204" pitchFamily="34" charset="0"/>
+                        <a:buChar char="-"/>
+                      </a:pPr>
+                      <a:r>
+                        <a:rPr lang="en-US" sz="1600" dirty="0"/>
+                        <a:t>Monthly (+)</a:t>
+                      </a:r>
+                    </a:p>
+                    <a:p>
+                      <a:pPr marL="285750" indent="-285750">
+                        <a:buFont typeface="Calibri" panose="020F0502020204030204" pitchFamily="34" charset="0"/>
+                        <a:buChar char="-"/>
+                      </a:pPr>
+                      <a:r>
+                        <a:rPr lang="en-US" sz="1600" dirty="0"/>
+                        <a:t>Manual</a:t>
+                      </a:r>
+                    </a:p>
+                  </a:txBody>
+                  <a:tcPr anchor="ctr"/>
+                </a:tc>
+                <a:tc>
+                  <a:txBody>
+                    <a:bodyPr/>
+                    <a:lstStyle/>
+                    <a:p>
+                      <a:pPr marL="285750" indent="-285750">
+                        <a:buFont typeface="Calibri" panose="020F0502020204030204" pitchFamily="34" charset="0"/>
+                        <a:buChar char="-"/>
+                      </a:pPr>
+                      <a:r>
+                        <a:rPr lang="en-US" sz="1600" dirty="0"/>
+                        <a:t>Weekly</a:t>
+                      </a:r>
+                    </a:p>
+                    <a:p>
+                      <a:pPr marL="285750" indent="-285750">
+                        <a:buFont typeface="Calibri" panose="020F0502020204030204" pitchFamily="34" charset="0"/>
+                        <a:buChar char="-"/>
+                      </a:pPr>
+                      <a:r>
+                        <a:rPr lang="en-US" sz="1600" dirty="0"/>
+                        <a:t>Automated in some environments, for some applications</a:t>
+                      </a:r>
+                    </a:p>
+                  </a:txBody>
+                  <a:tcPr anchor="ctr"/>
+                </a:tc>
+                <a:tc>
+                  <a:txBody>
+                    <a:bodyPr/>
+                    <a:lstStyle/>
+                    <a:p>
+                      <a:pPr marL="285750" indent="-285750">
+                        <a:buFont typeface="Calibri" panose="020F0502020204030204" pitchFamily="34" charset="0"/>
+                        <a:buChar char="-"/>
+                      </a:pPr>
+                      <a:r>
+                        <a:rPr lang="en-US" sz="1600" dirty="0"/>
+                        <a:t>Multiple times a day</a:t>
+                      </a:r>
+                    </a:p>
+                    <a:p>
+                      <a:pPr marL="285750" indent="-285750">
+                        <a:buFont typeface="Calibri" panose="020F0502020204030204" pitchFamily="34" charset="0"/>
+                        <a:buChar char="-"/>
+                      </a:pPr>
+                      <a:r>
+                        <a:rPr lang="en-US" sz="1600" dirty="0"/>
+                        <a:t>Fully automated</a:t>
+                      </a:r>
+                    </a:p>
+                  </a:txBody>
+                  <a:tcPr anchor="ctr"/>
+                </a:tc>
+                <a:extLst>
+                  <a:ext uri="{0D108BD9-81ED-4DB2-BD59-A6C34878D82A}">
+                    <a16:rowId xmlns:a16="http://schemas.microsoft.com/office/drawing/2014/main" xmlns="" val="1003695712"/>
+                  </a:ext>
+                </a:extLst>
+              </a:tr>
+              <a:tr h="370840">
+                <a:tc>
+                  <a:txBody>
+                    <a:bodyPr/>
+                    <a:lstStyle/>
+                    <a:p>
+                      <a:r>
+                        <a:rPr lang="en-US" b="1" dirty="0"/>
+                        <a:t>Cloud adoption</a:t>
+                      </a:r>
+                    </a:p>
+                  </a:txBody>
+                  <a:tcPr anchor="ctr"/>
+                </a:tc>
+                <a:tc>
+                  <a:txBody>
+                    <a:bodyPr/>
+                    <a:lstStyle/>
+                    <a:p>
+                      <a:pPr marL="285750" indent="-285750">
+                        <a:buFont typeface="Calibri" panose="020F0502020204030204" pitchFamily="34" charset="0"/>
+                        <a:buChar char="-"/>
+                      </a:pPr>
+                      <a:r>
+                        <a:rPr lang="en-US" sz="1600" dirty="0"/>
+                        <a:t>Exploring the cloud</a:t>
+                      </a:r>
+                    </a:p>
+                  </a:txBody>
+                  <a:tcPr anchor="ctr"/>
+                </a:tc>
+                <a:tc>
+                  <a:txBody>
+                    <a:bodyPr/>
+                    <a:lstStyle/>
+                    <a:p>
+                      <a:pPr marL="285750" indent="-285750">
+                        <a:buFont typeface="Calibri" panose="020F0502020204030204" pitchFamily="34" charset="0"/>
+                        <a:buChar char="-"/>
+                      </a:pPr>
+                      <a:r>
+                        <a:rPr lang="en-US" sz="1600" dirty="0"/>
+                        <a:t>Moving to the cloud</a:t>
+                      </a:r>
+                    </a:p>
+                  </a:txBody>
+                  <a:tcPr anchor="ctr"/>
+                </a:tc>
+                <a:tc>
+                  <a:txBody>
+                    <a:bodyPr/>
+                    <a:lstStyle/>
+                    <a:p>
+                      <a:pPr marL="285750" indent="-285750">
+                        <a:buFont typeface="Calibri" panose="020F0502020204030204" pitchFamily="34" charset="0"/>
+                        <a:buChar char="-"/>
+                      </a:pPr>
+                      <a:r>
+                        <a:rPr lang="en-US" sz="1600" dirty="0"/>
+                        <a:t>100% cloud adoption</a:t>
+                      </a:r>
+                    </a:p>
+                  </a:txBody>
+                  <a:tcPr anchor="ctr"/>
+                </a:tc>
+                <a:extLst>
+                  <a:ext uri="{0D108BD9-81ED-4DB2-BD59-A6C34878D82A}">
+                    <a16:rowId xmlns:a16="http://schemas.microsoft.com/office/drawing/2014/main" xmlns="" val="1415041541"/>
+                  </a:ext>
+                </a:extLst>
+              </a:tr>
+              <a:tr h="370840">
+                <a:tc>
+                  <a:txBody>
+                    <a:bodyPr/>
+                    <a:lstStyle/>
+                    <a:p>
+                      <a:r>
+                        <a:rPr lang="en-US" b="1" dirty="0"/>
+                        <a:t>Operations</a:t>
+                      </a:r>
+                    </a:p>
+                  </a:txBody>
+                  <a:tcPr anchor="ctr"/>
+                </a:tc>
+                <a:tc>
+                  <a:txBody>
+                    <a:bodyPr/>
+                    <a:lstStyle/>
+                    <a:p>
+                      <a:pPr marL="285750" indent="-285750">
+                        <a:buFont typeface="Calibri" panose="020F0502020204030204" pitchFamily="34" charset="0"/>
+                        <a:buChar char="-"/>
+                      </a:pPr>
+                      <a:r>
+                        <a:rPr lang="en-US" sz="1600" dirty="0"/>
+                        <a:t>Analyzing to see if something broke</a:t>
+                      </a:r>
+                    </a:p>
+                  </a:txBody>
+                  <a:tcPr anchor="ctr"/>
+                </a:tc>
+                <a:tc>
+                  <a:txBody>
+                    <a:bodyPr/>
+                    <a:lstStyle/>
+                    <a:p>
+                      <a:pPr marL="285750" indent="-285750">
+                        <a:buFont typeface="Calibri" panose="020F0502020204030204" pitchFamily="34" charset="0"/>
+                        <a:buChar char="-"/>
+                      </a:pPr>
+                      <a:endParaRPr lang="en-US" sz="1600" dirty="0"/>
+                    </a:p>
+                  </a:txBody>
+                  <a:tcPr anchor="ctr"/>
+                </a:tc>
+                <a:tc>
+                  <a:txBody>
+                    <a:bodyPr/>
+                    <a:lstStyle/>
+                    <a:p>
+                      <a:pPr marL="285750" indent="-285750">
+                        <a:buFont typeface="Calibri" panose="020F0502020204030204" pitchFamily="34" charset="0"/>
+                        <a:buChar char="-"/>
+                      </a:pPr>
+                      <a:r>
+                        <a:rPr lang="en-US" sz="1600" dirty="0"/>
+                        <a:t>Analyzing to see if business value created</a:t>
+                      </a:r>
+                    </a:p>
+                  </a:txBody>
+                  <a:tcPr anchor="ctr"/>
+                </a:tc>
+                <a:extLst>
+                  <a:ext uri="{0D108BD9-81ED-4DB2-BD59-A6C34878D82A}">
+                    <a16:rowId xmlns:a16="http://schemas.microsoft.com/office/drawing/2014/main" xmlns="" val="2272553095"/>
+                  </a:ext>
+                </a:extLst>
+              </a:tr>
+              <a:tr h="370840">
+                <a:tc>
+                  <a:txBody>
+                    <a:bodyPr/>
+                    <a:lstStyle/>
+                    <a:p>
+                      <a:r>
+                        <a:rPr lang="en-US" b="1" dirty="0"/>
+                        <a:t>Security</a:t>
+                      </a:r>
+                    </a:p>
+                  </a:txBody>
+                  <a:tcPr anchor="ctr"/>
+                </a:tc>
+                <a:tc>
+                  <a:txBody>
+                    <a:bodyPr/>
+                    <a:lstStyle/>
+                    <a:p>
+                      <a:pPr marL="285750" indent="-285750">
+                        <a:buFont typeface="Calibri" panose="020F0502020204030204" pitchFamily="34" charset="0"/>
+                        <a:buChar char="-"/>
+                      </a:pPr>
+                      <a:r>
+                        <a:rPr lang="en-US" sz="1600" dirty="0"/>
+                        <a:t>Security theater</a:t>
+                      </a:r>
+                    </a:p>
+                  </a:txBody>
+                  <a:tcPr anchor="ctr"/>
+                </a:tc>
+                <a:tc>
+                  <a:txBody>
+                    <a:bodyPr/>
+                    <a:lstStyle/>
+                    <a:p>
+                      <a:pPr marL="285750" indent="-285750">
+                        <a:buFont typeface="Calibri" panose="020F0502020204030204" pitchFamily="34" charset="0"/>
+                        <a:buChar char="-"/>
+                      </a:pPr>
+                      <a:r>
+                        <a:rPr lang="en-US" sz="1600" dirty="0"/>
+                        <a:t>Firewall security blanket</a:t>
+                      </a:r>
+                    </a:p>
+                  </a:txBody>
+                  <a:tcPr anchor="ctr"/>
+                </a:tc>
+                <a:tc>
+                  <a:txBody>
+                    <a:bodyPr/>
+                    <a:lstStyle/>
+                    <a:p>
+                      <a:pPr marL="285750" indent="-285750">
+                        <a:buFont typeface="Calibri" panose="020F0502020204030204" pitchFamily="34" charset="0"/>
+                        <a:buChar char="-"/>
+                      </a:pPr>
+                      <a:r>
+                        <a:rPr lang="en-US" sz="1600" dirty="0"/>
+                        <a:t>Publish security practices</a:t>
+                      </a:r>
+                    </a:p>
+                  </a:txBody>
+                  <a:tcPr anchor="ctr"/>
+                </a:tc>
+                <a:extLst>
+                  <a:ext uri="{0D108BD9-81ED-4DB2-BD59-A6C34878D82A}">
+                    <a16:rowId xmlns:a16="http://schemas.microsoft.com/office/drawing/2014/main" xmlns="" val="3142695458"/>
+                  </a:ext>
+                </a:extLst>
+              </a:tr>
+            </a:tbl>
+          </a:graphicData>
+        </a:graphic>
+      </p:graphicFrame>
+    </p:spTree>
+    <p:extLst>
+      <p:ext uri="{BB962C8B-B14F-4D97-AF65-F5344CB8AC3E}">
+        <p14:creationId xmlns:p14="http://schemas.microsoft.com/office/powerpoint/2010/main" val="2494180651"/>
+      </p:ext>
+    </p:extLst>
+  </p:cSld>
+  <p:clrMapOvr>
+    <a:masterClrMapping/>
+  </p:clrMapOvr>
+</p:sld>
+</file>
+
+<file path=ppt/slides/slide16.xml><?xml version="1.0" encoding="utf-8"?>
+<p:sld xmlns:a="http://schemas.openxmlformats.org/drawingml/2006/main" xmlns:r="http://schemas.openxmlformats.org/officeDocument/2006/relationships" xmlns:p="http://schemas.openxmlformats.org/presentationml/2006/main">
+  <p:cSld>
+    <p:spTree>
+      <p:nvGrpSpPr>
+        <p:cNvPr id="1" name=""/>
+        <p:cNvGrpSpPr/>
+        <p:nvPr/>
+      </p:nvGrpSpPr>
+      <p:grpSpPr>
+        <a:xfrm>
+          <a:off x="0" y="0"/>
+          <a:ext cx="0" cy="0"/>
+          <a:chOff x="0" y="0"/>
+          <a:chExt cx="0" cy="0"/>
+        </a:xfrm>
+      </p:grpSpPr>
+      <p:sp>
+        <p:nvSpPr>
+          <p:cNvPr id="2" name="Title 1"/>
+          <p:cNvSpPr>
+            <a:spLocks noGrp="1"/>
+          </p:cNvSpPr>
+          <p:nvPr>
+            <p:ph type="title"/>
+          </p:nvPr>
+        </p:nvSpPr>
+        <p:spPr/>
+        <p:txBody>
+          <a:bodyPr/>
+          <a:lstStyle/>
+          <a:p>
+            <a:r>
+              <a:rPr lang="en-US" b="1" dirty="0" err="1">
+                <a:solidFill>
+                  <a:schemeClr val="accent4"/>
+                </a:solidFill>
+              </a:rPr>
+              <a:t>Serverless</a:t>
+            </a:r>
+            <a:r>
+              <a:rPr lang="en-US" b="1" dirty="0">
+                <a:solidFill>
+                  <a:schemeClr val="accent4"/>
+                </a:solidFill>
+              </a:rPr>
+              <a:t> is a commodity</a:t>
+            </a:r>
+          </a:p>
+        </p:txBody>
+      </p:sp>
+      <p:sp>
+        <p:nvSpPr>
+          <p:cNvPr id="3" name="Content Placeholder 2"/>
+          <p:cNvSpPr>
+            <a:spLocks noGrp="1"/>
+          </p:cNvSpPr>
+          <p:nvPr>
+            <p:ph idx="1"/>
+          </p:nvPr>
+        </p:nvSpPr>
+        <p:spPr/>
+        <p:txBody>
+          <a:bodyPr/>
+          <a:lstStyle/>
+          <a:p>
+            <a:r>
+              <a:rPr lang="en-US" dirty="0"/>
+              <a:t>Lets you move yourself up the value chain</a:t>
+            </a:r>
+          </a:p>
+          <a:p>
+            <a:r>
+              <a:rPr lang="en-US" dirty="0" err="1"/>
+              <a:t>Wardley</a:t>
+            </a:r>
+            <a:r>
+              <a:rPr lang="en-US" dirty="0"/>
+              <a:t> graph included here</a:t>
+            </a:r>
+          </a:p>
+          <a:p>
+            <a:pPr lvl="1"/>
+            <a:r>
+              <a:rPr lang="en-US" dirty="0"/>
+              <a:t>(revisit at the end when discussing adoption paths)</a:t>
+            </a:r>
+          </a:p>
+          <a:p>
+            <a:pPr lvl="2"/>
+            <a:r>
+              <a:rPr lang="en-US" dirty="0" err="1"/>
+              <a:t>Serverless</a:t>
+            </a:r>
+            <a:r>
+              <a:rPr lang="en-US" dirty="0"/>
+              <a:t> is focusing on the top of the value chain</a:t>
+            </a:r>
+          </a:p>
+          <a:p>
+            <a:pPr lvl="2"/>
+            <a:r>
+              <a:rPr lang="en-US" dirty="0"/>
+              <a:t>Lift and shift is focusing on the bottom of the value chain</a:t>
+            </a:r>
+          </a:p>
+          <a:p>
+            <a:endParaRPr lang="en-US" dirty="0"/>
+          </a:p>
+        </p:txBody>
+      </p:sp>
+      <p:pic>
+        <p:nvPicPr>
+          <p:cNvPr id="4" name="Picture 3"/>
+          <p:cNvPicPr>
+            <a:picLocks noChangeAspect="1"/>
+          </p:cNvPicPr>
+          <p:nvPr/>
+        </p:nvPicPr>
+        <p:blipFill>
+          <a:blip r:embed="rId2">
+            <a:extLst>
+              <a:ext uri="{28A0092B-C50C-407E-A947-70E740481C1C}">
+                <a14:useLocalDpi xmlns:a14="http://schemas.microsoft.com/office/drawing/2010/main" val="0"/>
+              </a:ext>
+            </a:extLst>
+          </a:blip>
+          <a:stretch>
+            <a:fillRect/>
+          </a:stretch>
+        </p:blipFill>
+        <p:spPr>
+          <a:xfrm>
+            <a:off x="1186489" y="1140447"/>
+            <a:ext cx="9058223" cy="5565896"/>
+          </a:xfrm>
+          <a:prstGeom prst="rect">
+            <a:avLst/>
+          </a:prstGeom>
+        </p:spPr>
+      </p:pic>
+    </p:spTree>
+    <p:extLst>
+      <p:ext uri="{BB962C8B-B14F-4D97-AF65-F5344CB8AC3E}">
+        <p14:creationId xmlns:p14="http://schemas.microsoft.com/office/powerpoint/2010/main" val="2922807310"/>
+      </p:ext>
+    </p:extLst>
+  </p:cSld>
+  <p:clrMapOvr>
+    <a:masterClrMapping/>
+  </p:clrMapOvr>
+</p:sld>
+</file>
+
+<file path=ppt/slides/slide17.xml><?xml version="1.0" encoding="utf-8"?>
+<p:sld xmlns:a="http://schemas.openxmlformats.org/drawingml/2006/main" xmlns:r="http://schemas.openxmlformats.org/officeDocument/2006/relationships" xmlns:p="http://schemas.openxmlformats.org/presentationml/2006/main">
+  <p:cSld>
+    <p:spTree>
+      <p:nvGrpSpPr>
+        <p:cNvPr id="1" name=""/>
+        <p:cNvGrpSpPr/>
+        <p:nvPr/>
+      </p:nvGrpSpPr>
+      <p:grpSpPr>
+        <a:xfrm>
+          <a:off x="0" y="0"/>
+          <a:ext cx="0" cy="0"/>
+          <a:chOff x="0" y="0"/>
+          <a:chExt cx="0" cy="0"/>
+        </a:xfrm>
+      </p:grpSpPr>
+      <p:sp>
+        <p:nvSpPr>
+          <p:cNvPr id="2" name="Title 1"/>
+          <p:cNvSpPr>
+            <a:spLocks noGrp="1"/>
+          </p:cNvSpPr>
+          <p:nvPr>
+            <p:ph type="title"/>
+          </p:nvPr>
+        </p:nvSpPr>
+        <p:spPr/>
+        <p:txBody>
+          <a:bodyPr/>
+          <a:lstStyle/>
+          <a:p>
+            <a:r>
+              <a:rPr lang="en-US" b="1" dirty="0">
+                <a:solidFill>
+                  <a:schemeClr val="accent4"/>
+                </a:solidFill>
+              </a:rPr>
+              <a:t>DevOps best practices</a:t>
+            </a:r>
+          </a:p>
+        </p:txBody>
+      </p:sp>
+      <p:sp>
+        <p:nvSpPr>
+          <p:cNvPr id="3" name="Content Placeholder 2"/>
+          <p:cNvSpPr>
+            <a:spLocks noGrp="1"/>
+          </p:cNvSpPr>
+          <p:nvPr>
+            <p:ph idx="1"/>
+          </p:nvPr>
+        </p:nvSpPr>
+        <p:spPr/>
+        <p:txBody>
+          <a:bodyPr/>
+          <a:lstStyle/>
+          <a:p>
+            <a:r>
+              <a:rPr lang="en-US" dirty="0"/>
+              <a:t>Infrastructure as code</a:t>
+            </a:r>
+          </a:p>
+          <a:p>
+            <a:r>
+              <a:rPr lang="en-US" dirty="0"/>
+              <a:t>CI/CD for increased speed and stability</a:t>
+            </a:r>
+          </a:p>
+          <a:p>
+            <a:r>
+              <a:rPr lang="en-US" dirty="0"/>
+              <a:t>Monoliths to microservices to functions</a:t>
+            </a:r>
+          </a:p>
+          <a:p>
+            <a:r>
+              <a:rPr lang="en-US" dirty="0"/>
+              <a:t>Small teams, highly cohesive and loosely coupled</a:t>
+            </a:r>
+          </a:p>
+          <a:p>
+            <a:r>
+              <a:rPr lang="en-US" dirty="0"/>
+              <a:t>Only pay for what you use</a:t>
+            </a:r>
+          </a:p>
+          <a:p>
+            <a:r>
+              <a:rPr lang="en-US" dirty="0"/>
+              <a:t>Polyglot – the right language/framework for the job</a:t>
+            </a:r>
+          </a:p>
+        </p:txBody>
+      </p:sp>
+    </p:spTree>
+    <p:extLst>
+      <p:ext uri="{BB962C8B-B14F-4D97-AF65-F5344CB8AC3E}">
+        <p14:creationId xmlns:p14="http://schemas.microsoft.com/office/powerpoint/2010/main" val="1859706539"/>
+      </p:ext>
+    </p:extLst>
+  </p:cSld>
+  <p:clrMapOvr>
+    <a:masterClrMapping/>
+  </p:clrMapOvr>
+</p:sld>
+</file>
+
+<file path=ppt/slides/slide18.xml><?xml version="1.0" encoding="utf-8"?>
+<p:sld xmlns:a="http://schemas.openxmlformats.org/drawingml/2006/main" xmlns:r="http://schemas.openxmlformats.org/officeDocument/2006/relationships" xmlns:p="http://schemas.openxmlformats.org/presentationml/2006/main">
+  <p:cSld>
+    <p:spTree>
+      <p:nvGrpSpPr>
+        <p:cNvPr id="1" name=""/>
+        <p:cNvGrpSpPr/>
+        <p:nvPr/>
+      </p:nvGrpSpPr>
+      <p:grpSpPr>
+        <a:xfrm>
+          <a:off x="0" y="0"/>
+          <a:ext cx="0" cy="0"/>
+          <a:chOff x="0" y="0"/>
+          <a:chExt cx="0" cy="0"/>
+        </a:xfrm>
+      </p:grpSpPr>
+      <p:sp>
+        <p:nvSpPr>
+          <p:cNvPr id="2" name="Title 1"/>
+          <p:cNvSpPr>
+            <a:spLocks noGrp="1"/>
+          </p:cNvSpPr>
+          <p:nvPr>
+            <p:ph type="title"/>
+          </p:nvPr>
+        </p:nvSpPr>
+        <p:spPr/>
+        <p:txBody>
+          <a:bodyPr/>
+          <a:lstStyle/>
+          <a:p>
+            <a:r>
+              <a:rPr lang="en-US" b="1" dirty="0">
+                <a:solidFill>
+                  <a:schemeClr val="accent4"/>
+                </a:solidFill>
+              </a:rPr>
+              <a:t>Benefits of </a:t>
+            </a:r>
+            <a:r>
+              <a:rPr lang="en-US" b="1" dirty="0" err="1">
+                <a:solidFill>
+                  <a:schemeClr val="accent4"/>
+                </a:solidFill>
+              </a:rPr>
+              <a:t>serverless</a:t>
+            </a:r>
+            <a:endParaRPr lang="en-US" b="1" dirty="0">
+              <a:solidFill>
+                <a:schemeClr val="accent4"/>
+              </a:solidFill>
+            </a:endParaRPr>
+          </a:p>
+        </p:txBody>
+      </p:sp>
+      <p:sp>
+        <p:nvSpPr>
+          <p:cNvPr id="3" name="Content Placeholder 2"/>
+          <p:cNvSpPr>
+            <a:spLocks noGrp="1"/>
+          </p:cNvSpPr>
+          <p:nvPr>
+            <p:ph idx="1"/>
+          </p:nvPr>
+        </p:nvSpPr>
+        <p:spPr/>
+        <p:txBody>
+          <a:bodyPr/>
+          <a:lstStyle/>
+          <a:p>
+            <a:r>
+              <a:rPr lang="en-US" dirty="0"/>
+              <a:t>True variable cost computing</a:t>
+            </a:r>
+          </a:p>
+          <a:p>
+            <a:r>
+              <a:rPr lang="en-US" dirty="0"/>
+              <a:t>Time to market goes from months or weeks to days or hours</a:t>
+            </a:r>
+          </a:p>
+          <a:p>
+            <a:r>
+              <a:rPr lang="en-US" dirty="0"/>
+              <a:t>Built in support for things you should be doing already</a:t>
+            </a:r>
+          </a:p>
+          <a:p>
+            <a:pPr lvl="1"/>
+            <a:r>
+              <a:rPr lang="en-US" dirty="0"/>
+              <a:t>Infrastructure as code</a:t>
+            </a:r>
+          </a:p>
+          <a:p>
+            <a:pPr lvl="1"/>
+            <a:r>
+              <a:rPr lang="en-US" dirty="0"/>
+              <a:t>API driven development and data analysis to inform product development</a:t>
+            </a:r>
+          </a:p>
+          <a:p>
+            <a:pPr lvl="1"/>
+            <a:r>
+              <a:rPr lang="en-US" dirty="0"/>
+              <a:t>Small teams</a:t>
+            </a:r>
+          </a:p>
+        </p:txBody>
+      </p:sp>
+    </p:spTree>
+    <p:extLst>
+      <p:ext uri="{BB962C8B-B14F-4D97-AF65-F5344CB8AC3E}">
+        <p14:creationId xmlns:p14="http://schemas.microsoft.com/office/powerpoint/2010/main" val="2276068305"/>
+      </p:ext>
+    </p:extLst>
+  </p:cSld>
+  <p:clrMapOvr>
+    <a:masterClrMapping/>
+  </p:clrMapOvr>
+</p:sld>
+</file>
+
+<file path=ppt/slides/slide19.xml><?xml version="1.0" encoding="utf-8"?>
+<p:sld xmlns:a="http://schemas.openxmlformats.org/drawingml/2006/main" xmlns:r="http://schemas.openxmlformats.org/officeDocument/2006/relationships" xmlns:p="http://schemas.openxmlformats.org/presentationml/2006/main">
+  <p:cSld>
+    <p:spTree>
+      <p:nvGrpSpPr>
+        <p:cNvPr id="1" name=""/>
+        <p:cNvGrpSpPr/>
+        <p:nvPr/>
+      </p:nvGrpSpPr>
+      <p:grpSpPr>
+        <a:xfrm>
+          <a:off x="0" y="0"/>
+          <a:ext cx="0" cy="0"/>
+          <a:chOff x="0" y="0"/>
+          <a:chExt cx="0" cy="0"/>
+        </a:xfrm>
+      </p:grpSpPr>
+      <p:sp>
+        <p:nvSpPr>
+          <p:cNvPr id="2" name="Title 1"/>
+          <p:cNvSpPr>
+            <a:spLocks noGrp="1"/>
+          </p:cNvSpPr>
+          <p:nvPr>
+            <p:ph type="title"/>
+          </p:nvPr>
+        </p:nvSpPr>
+        <p:spPr/>
+        <p:txBody>
+          <a:bodyPr/>
+          <a:lstStyle/>
+          <a:p>
+            <a:r>
+              <a:rPr lang="en-US" b="1" dirty="0" err="1">
+                <a:solidFill>
+                  <a:schemeClr val="accent4"/>
+                </a:solidFill>
+              </a:rPr>
+              <a:t>Serverless</a:t>
+            </a:r>
+            <a:r>
+              <a:rPr lang="en-US" b="1" dirty="0">
+                <a:solidFill>
+                  <a:schemeClr val="accent4"/>
+                </a:solidFill>
+              </a:rPr>
+              <a:t> as Trojan horse</a:t>
+            </a:r>
+          </a:p>
+        </p:txBody>
+      </p:sp>
+      <p:sp>
+        <p:nvSpPr>
+          <p:cNvPr id="3" name="Content Placeholder 2"/>
+          <p:cNvSpPr>
+            <a:spLocks noGrp="1"/>
+          </p:cNvSpPr>
+          <p:nvPr>
+            <p:ph idx="1"/>
+          </p:nvPr>
+        </p:nvSpPr>
+        <p:spPr/>
+        <p:txBody>
+          <a:bodyPr/>
+          <a:lstStyle/>
+          <a:p>
+            <a:r>
+              <a:rPr lang="en-US" dirty="0"/>
+              <a:t>It’s like magic – haven’t met a developer who didn’t love it</a:t>
+            </a:r>
+          </a:p>
+          <a:p>
+            <a:r>
+              <a:rPr lang="en-US" dirty="0"/>
+              <a:t>Easy to use, easy to experiment with</a:t>
+            </a:r>
+          </a:p>
+          <a:p>
+            <a:r>
+              <a:rPr lang="en-US" dirty="0"/>
+              <a:t>Low cost to learn, develop with, experiment with – only cost is time, no infrastructure or hosting</a:t>
+            </a:r>
+          </a:p>
+        </p:txBody>
+      </p:sp>
+    </p:spTree>
+    <p:extLst>
+      <p:ext uri="{BB962C8B-B14F-4D97-AF65-F5344CB8AC3E}">
+        <p14:creationId xmlns:p14="http://schemas.microsoft.com/office/powerpoint/2010/main" val="3178848806"/>
+      </p:ext>
+    </p:extLst>
+  </p:cSld>
+  <p:clrMapOvr>
+    <a:masterClrMapping/>
+  </p:clrMapOvr>
+</p:sld>
+</file>
+
+<file path=ppt/slides/slide2.xml><?xml version="1.0" encoding="utf-8"?>
+<p:sld xmlns:a="http://schemas.openxmlformats.org/drawingml/2006/main" xmlns:r="http://schemas.openxmlformats.org/officeDocument/2006/relationships" xmlns:p="http://schemas.openxmlformats.org/presentationml/2006/main">
+  <p:cSld>
+    <p:spTree>
+      <p:nvGrpSpPr>
+        <p:cNvPr id="1" name=""/>
+        <p:cNvGrpSpPr/>
+        <p:nvPr/>
+      </p:nvGrpSpPr>
+      <p:grpSpPr>
+        <a:xfrm>
+          <a:off x="0" y="0"/>
+          <a:ext cx="0" cy="0"/>
+          <a:chOff x="0" y="0"/>
+          <a:chExt cx="0" cy="0"/>
+        </a:xfrm>
+      </p:grpSpPr>
+      <p:sp>
+        <p:nvSpPr>
+          <p:cNvPr id="2" name="Title 1"/>
+          <p:cNvSpPr>
+            <a:spLocks noGrp="1"/>
+          </p:cNvSpPr>
+          <p:nvPr>
+            <p:ph type="title"/>
+          </p:nvPr>
+        </p:nvSpPr>
+        <p:spPr/>
+        <p:txBody>
+          <a:bodyPr/>
+          <a:lstStyle/>
+          <a:p>
+            <a:r>
+              <a:rPr lang="en-US" b="1" dirty="0" smtClean="0">
+                <a:solidFill>
+                  <a:schemeClr val="accent4"/>
+                </a:solidFill>
+              </a:rPr>
+              <a:t>You Don’t Have Technology Problems</a:t>
+            </a:r>
+            <a:endParaRPr lang="en-US" b="1" dirty="0">
+              <a:solidFill>
+                <a:schemeClr val="accent4"/>
+              </a:solidFill>
+            </a:endParaRPr>
+          </a:p>
+        </p:txBody>
+      </p:sp>
+      <p:sp>
+        <p:nvSpPr>
+          <p:cNvPr id="3" name="Content Placeholder 2"/>
+          <p:cNvSpPr>
+            <a:spLocks noGrp="1"/>
+          </p:cNvSpPr>
+          <p:nvPr>
+            <p:ph idx="1"/>
+          </p:nvPr>
+        </p:nvSpPr>
+        <p:spPr/>
+        <p:txBody>
+          <a:bodyPr/>
+          <a:lstStyle/>
+          <a:p>
+            <a:endParaRPr lang="en-US" dirty="0"/>
+          </a:p>
+          <a:p>
+            <a:endParaRPr lang="en-US" dirty="0"/>
+          </a:p>
+        </p:txBody>
+      </p:sp>
+    </p:spTree>
+    <p:extLst>
+      <p:ext uri="{BB962C8B-B14F-4D97-AF65-F5344CB8AC3E}">
+        <p14:creationId xmlns:p14="http://schemas.microsoft.com/office/powerpoint/2010/main" val="2056317850"/>
+      </p:ext>
+    </p:extLst>
+  </p:cSld>
+  <p:clrMapOvr>
+    <a:masterClrMapping/>
+  </p:clrMapOvr>
+</p:sld>
+</file>
+
+<file path=ppt/slides/slide20.xml><?xml version="1.0" encoding="utf-8"?>
+<p:sld xmlns:a="http://schemas.openxmlformats.org/drawingml/2006/main" xmlns:r="http://schemas.openxmlformats.org/officeDocument/2006/relationships" xmlns:p="http://schemas.openxmlformats.org/presentationml/2006/main">
+  <p:cSld>
+    <p:spTree>
+      <p:nvGrpSpPr>
+        <p:cNvPr id="1" name=""/>
+        <p:cNvGrpSpPr/>
+        <p:nvPr/>
+      </p:nvGrpSpPr>
+      <p:grpSpPr>
+        <a:xfrm>
+          <a:off x="0" y="0"/>
+          <a:ext cx="0" cy="0"/>
+          <a:chOff x="0" y="0"/>
+          <a:chExt cx="0" cy="0"/>
+        </a:xfrm>
+      </p:grpSpPr>
+      <p:sp>
+        <p:nvSpPr>
+          <p:cNvPr id="2" name="Title 1"/>
+          <p:cNvSpPr>
+            <a:spLocks noGrp="1"/>
+          </p:cNvSpPr>
+          <p:nvPr>
+            <p:ph type="title"/>
+          </p:nvPr>
+        </p:nvSpPr>
+        <p:spPr/>
+        <p:txBody>
+          <a:bodyPr/>
+          <a:lstStyle/>
+          <a:p>
+            <a:r>
+              <a:rPr lang="en-US" b="1" dirty="0">
+                <a:solidFill>
+                  <a:schemeClr val="accent4"/>
+                </a:solidFill>
+              </a:rPr>
+              <a:t>Who should do it</a:t>
+            </a:r>
+          </a:p>
+        </p:txBody>
+      </p:sp>
+      <p:sp>
+        <p:nvSpPr>
+          <p:cNvPr id="3" name="Content Placeholder 2"/>
+          <p:cNvSpPr>
+            <a:spLocks noGrp="1"/>
+          </p:cNvSpPr>
+          <p:nvPr>
+            <p:ph idx="1"/>
+          </p:nvPr>
+        </p:nvSpPr>
+        <p:spPr/>
+        <p:txBody>
+          <a:bodyPr/>
+          <a:lstStyle/>
+          <a:p>
+            <a:r>
+              <a:rPr lang="en-US" dirty="0"/>
+              <a:t>Everyone, but the value will you get is inversely related to the investments you have made in DevOps and the cloud already</a:t>
+            </a:r>
+          </a:p>
+          <a:p>
+            <a:r>
+              <a:rPr lang="en-US" dirty="0"/>
+              <a:t>For mature DevOps and cloud companies the benefits will be more incremental because they are already following best practices</a:t>
+            </a:r>
+          </a:p>
+          <a:p>
+            <a:r>
+              <a:rPr lang="en-US" dirty="0"/>
+              <a:t>For companies without strong DevOps or cloud practices the value is much higher</a:t>
+            </a:r>
+          </a:p>
+        </p:txBody>
+      </p:sp>
+    </p:spTree>
+    <p:extLst>
+      <p:ext uri="{BB962C8B-B14F-4D97-AF65-F5344CB8AC3E}">
+        <p14:creationId xmlns:p14="http://schemas.microsoft.com/office/powerpoint/2010/main" val="2452892142"/>
+      </p:ext>
+    </p:extLst>
+  </p:cSld>
+  <p:clrMapOvr>
+    <a:masterClrMapping/>
+  </p:clrMapOvr>
+</p:sld>
+</file>
+
+<file path=ppt/slides/slide21.xml><?xml version="1.0" encoding="utf-8"?>
+<p:sld xmlns:a="http://schemas.openxmlformats.org/drawingml/2006/main" xmlns:r="http://schemas.openxmlformats.org/officeDocument/2006/relationships" xmlns:p="http://schemas.openxmlformats.org/presentationml/2006/main">
+  <p:cSld>
+    <p:spTree>
+      <p:nvGrpSpPr>
+        <p:cNvPr id="1" name=""/>
+        <p:cNvGrpSpPr/>
+        <p:nvPr/>
+      </p:nvGrpSpPr>
+      <p:grpSpPr>
+        <a:xfrm>
+          <a:off x="0" y="0"/>
+          <a:ext cx="0" cy="0"/>
+          <a:chOff x="0" y="0"/>
+          <a:chExt cx="0" cy="0"/>
+        </a:xfrm>
+      </p:grpSpPr>
+      <p:sp>
+        <p:nvSpPr>
+          <p:cNvPr id="2" name="Title 1"/>
+          <p:cNvSpPr>
+            <a:spLocks noGrp="1"/>
+          </p:cNvSpPr>
+          <p:nvPr>
+            <p:ph type="title"/>
+          </p:nvPr>
+        </p:nvSpPr>
+        <p:spPr/>
+        <p:txBody>
+          <a:bodyPr/>
+          <a:lstStyle/>
+          <a:p>
+            <a:r>
+              <a:rPr lang="en-US" b="1" dirty="0">
+                <a:solidFill>
+                  <a:schemeClr val="accent4"/>
+                </a:solidFill>
+              </a:rPr>
+              <a:t>How to try it</a:t>
+            </a:r>
+          </a:p>
+        </p:txBody>
+      </p:sp>
+      <p:sp>
+        <p:nvSpPr>
+          <p:cNvPr id="3" name="Content Placeholder 2"/>
+          <p:cNvSpPr>
+            <a:spLocks noGrp="1"/>
+          </p:cNvSpPr>
+          <p:nvPr>
+            <p:ph idx="1"/>
+          </p:nvPr>
+        </p:nvSpPr>
+        <p:spPr/>
+        <p:txBody>
+          <a:bodyPr/>
+          <a:lstStyle/>
+          <a:p>
+            <a:r>
+              <a:rPr lang="en-US" dirty="0"/>
+              <a:t>If the people you’ve hired have built a mature DevOps and cloud company they already know about </a:t>
+            </a:r>
+            <a:r>
+              <a:rPr lang="en-US" dirty="0" err="1"/>
+              <a:t>serverless</a:t>
+            </a:r>
+            <a:r>
+              <a:rPr lang="en-US" dirty="0"/>
+              <a:t> and love it, and probably are already using it</a:t>
+            </a:r>
+          </a:p>
+          <a:p>
+            <a:r>
+              <a:rPr lang="en-US" dirty="0"/>
+              <a:t>If the people you’ve hired haven’t built a mature DevOps and cloud company</a:t>
+            </a:r>
+          </a:p>
+          <a:p>
+            <a:pPr lvl="1"/>
+            <a:r>
+              <a:rPr lang="en-US" dirty="0"/>
+              <a:t>If they would like to but can’t for whatever reasons, they likely know about </a:t>
+            </a:r>
+            <a:r>
+              <a:rPr lang="en-US" dirty="0" err="1"/>
+              <a:t>serverless</a:t>
+            </a:r>
+            <a:r>
+              <a:rPr lang="en-US" dirty="0"/>
+              <a:t> and have used it on side projects and love it</a:t>
+            </a:r>
+          </a:p>
+          <a:p>
+            <a:pPr lvl="1"/>
+            <a:r>
+              <a:rPr lang="en-US" dirty="0"/>
+              <a:t>If they aren’t pushing for DevOps or cloud there’s a good chance they don’t know anything about </a:t>
+            </a:r>
+            <a:r>
+              <a:rPr lang="en-US" dirty="0" err="1"/>
+              <a:t>serverless</a:t>
+            </a:r>
+            <a:r>
+              <a:rPr lang="en-US" dirty="0"/>
+              <a:t> (or DevOps practices in general)</a:t>
+            </a:r>
+          </a:p>
+          <a:p>
+            <a:r>
+              <a:rPr lang="en-US" dirty="0"/>
+              <a:t>Know the group you are working with</a:t>
+            </a:r>
+          </a:p>
+        </p:txBody>
+      </p:sp>
+    </p:spTree>
+    <p:extLst>
+      <p:ext uri="{BB962C8B-B14F-4D97-AF65-F5344CB8AC3E}">
+        <p14:creationId xmlns:p14="http://schemas.microsoft.com/office/powerpoint/2010/main" val="2985073515"/>
+      </p:ext>
+    </p:extLst>
+  </p:cSld>
+  <p:clrMapOvr>
+    <a:masterClrMapping/>
+  </p:clrMapOvr>
+</p:sld>
+</file>
+
+<file path=ppt/slides/slide22.xml><?xml version="1.0" encoding="utf-8"?>
+<p:sld xmlns:a="http://schemas.openxmlformats.org/drawingml/2006/main" xmlns:r="http://schemas.openxmlformats.org/officeDocument/2006/relationships" xmlns:p="http://schemas.openxmlformats.org/presentationml/2006/main">
+  <p:cSld>
+    <p:spTree>
+      <p:nvGrpSpPr>
+        <p:cNvPr id="1" name=""/>
+        <p:cNvGrpSpPr/>
+        <p:nvPr/>
+      </p:nvGrpSpPr>
+      <p:grpSpPr>
+        <a:xfrm>
+          <a:off x="0" y="0"/>
+          <a:ext cx="0" cy="0"/>
+          <a:chOff x="0" y="0"/>
+          <a:chExt cx="0" cy="0"/>
+        </a:xfrm>
+      </p:grpSpPr>
+      <p:sp>
+        <p:nvSpPr>
+          <p:cNvPr id="2" name="Title 1"/>
+          <p:cNvSpPr>
+            <a:spLocks noGrp="1"/>
+          </p:cNvSpPr>
+          <p:nvPr>
+            <p:ph type="title"/>
+          </p:nvPr>
+        </p:nvSpPr>
+        <p:spPr/>
+        <p:txBody>
+          <a:bodyPr/>
+          <a:lstStyle/>
+          <a:p>
+            <a:r>
+              <a:rPr lang="en-US" b="1" dirty="0">
+                <a:solidFill>
+                  <a:schemeClr val="accent4"/>
+                </a:solidFill>
+              </a:rPr>
+              <a:t>Challenges to implement</a:t>
+            </a:r>
+          </a:p>
+        </p:txBody>
+      </p:sp>
+      <p:sp>
+        <p:nvSpPr>
+          <p:cNvPr id="3" name="Content Placeholder 2"/>
+          <p:cNvSpPr>
+            <a:spLocks noGrp="1"/>
+          </p:cNvSpPr>
+          <p:nvPr>
+            <p:ph idx="1"/>
+          </p:nvPr>
+        </p:nvSpPr>
+        <p:spPr/>
+        <p:txBody>
+          <a:bodyPr/>
+          <a:lstStyle/>
+          <a:p>
+            <a:r>
+              <a:rPr lang="en-US" dirty="0"/>
+              <a:t>Retailers run large off the shelf software packages, how to incorporate </a:t>
+            </a:r>
+            <a:r>
+              <a:rPr lang="en-US" dirty="0" err="1"/>
+              <a:t>serverless</a:t>
+            </a:r>
+            <a:r>
+              <a:rPr lang="en-US" dirty="0"/>
+              <a:t> models around it</a:t>
+            </a:r>
+          </a:p>
+        </p:txBody>
+      </p:sp>
+    </p:spTree>
+    <p:extLst>
+      <p:ext uri="{BB962C8B-B14F-4D97-AF65-F5344CB8AC3E}">
+        <p14:creationId xmlns:p14="http://schemas.microsoft.com/office/powerpoint/2010/main" val="2979025380"/>
+      </p:ext>
+    </p:extLst>
+  </p:cSld>
+  <p:clrMapOvr>
+    <a:masterClrMapping/>
+  </p:clrMapOvr>
+</p:sld>
+</file>
+
+<file path=ppt/slides/slide23.xml><?xml version="1.0" encoding="utf-8"?>
+<p:sld xmlns:a="http://schemas.openxmlformats.org/drawingml/2006/main" xmlns:r="http://schemas.openxmlformats.org/officeDocument/2006/relationships" xmlns:p="http://schemas.openxmlformats.org/presentationml/2006/main">
+  <p:cSld>
+    <p:spTree>
+      <p:nvGrpSpPr>
+        <p:cNvPr id="1" name=""/>
+        <p:cNvGrpSpPr/>
+        <p:nvPr/>
+      </p:nvGrpSpPr>
+      <p:grpSpPr>
+        <a:xfrm>
+          <a:off x="0" y="0"/>
+          <a:ext cx="0" cy="0"/>
+          <a:chOff x="0" y="0"/>
+          <a:chExt cx="0" cy="0"/>
+        </a:xfrm>
+      </p:grpSpPr>
+      <p:sp>
+        <p:nvSpPr>
+          <p:cNvPr id="2" name="Title 1"/>
+          <p:cNvSpPr>
+            <a:spLocks noGrp="1"/>
+          </p:cNvSpPr>
+          <p:nvPr>
+            <p:ph type="title"/>
+          </p:nvPr>
+        </p:nvSpPr>
+        <p:spPr/>
+        <p:txBody>
+          <a:bodyPr/>
+          <a:lstStyle/>
+          <a:p>
+            <a:r>
+              <a:rPr lang="en-US" b="1" dirty="0">
+                <a:solidFill>
+                  <a:schemeClr val="accent4"/>
+                </a:solidFill>
+              </a:rPr>
               <a:t>GameStop</a:t>
             </a:r>
           </a:p>
@@ -3656,7 +5862,7 @@
 </p:sld>
 </file>
 
-<file path=ppt/slides/slide15.xml><?xml version="1.0" encoding="utf-8"?>
+<file path=ppt/slides/slide24.xml><?xml version="1.0" encoding="utf-8"?>
 <p:sld xmlns:a="http://schemas.openxmlformats.org/drawingml/2006/main" xmlns:r="http://schemas.openxmlformats.org/officeDocument/2006/relationships" xmlns:p="http://schemas.openxmlformats.org/presentationml/2006/main">
   <p:cSld>
     <p:spTree>
@@ -3922,142 +6128,6 @@
 </p:sld>
 </file>
 
-<file path=ppt/slides/slide2.xml><?xml version="1.0" encoding="utf-8"?>
-<p:sld xmlns:a="http://schemas.openxmlformats.org/drawingml/2006/main" xmlns:r="http://schemas.openxmlformats.org/officeDocument/2006/relationships" xmlns:p="http://schemas.openxmlformats.org/presentationml/2006/main">
-  <p:cSld>
-    <p:spTree>
-      <p:nvGrpSpPr>
-        <p:cNvPr id="1" name=""/>
-        <p:cNvGrpSpPr/>
-        <p:nvPr/>
-      </p:nvGrpSpPr>
-      <p:grpSpPr>
-        <a:xfrm>
-          <a:off x="0" y="0"/>
-          <a:ext cx="0" cy="0"/>
-          <a:chOff x="0" y="0"/>
-          <a:chExt cx="0" cy="0"/>
-        </a:xfrm>
-      </p:grpSpPr>
-      <p:sp>
-        <p:nvSpPr>
-          <p:cNvPr id="2" name="Title 1"/>
-          <p:cNvSpPr>
-            <a:spLocks noGrp="1"/>
-          </p:cNvSpPr>
-          <p:nvPr>
-            <p:ph type="title"/>
-          </p:nvPr>
-        </p:nvSpPr>
-        <p:spPr/>
-        <p:txBody>
-          <a:bodyPr/>
-          <a:lstStyle/>
-          <a:p>
-            <a:r>
-              <a:rPr lang="en-US" b="1" dirty="0">
-                <a:solidFill>
-                  <a:schemeClr val="accent4"/>
-                </a:solidFill>
-              </a:rPr>
-              <a:t>Agenda</a:t>
-            </a:r>
-          </a:p>
-        </p:txBody>
-      </p:sp>
-      <p:sp>
-        <p:nvSpPr>
-          <p:cNvPr id="3" name="Content Placeholder 2"/>
-          <p:cNvSpPr>
-            <a:spLocks noGrp="1"/>
-          </p:cNvSpPr>
-          <p:nvPr>
-            <p:ph idx="1"/>
-          </p:nvPr>
-        </p:nvSpPr>
-        <p:spPr/>
-        <p:txBody>
-          <a:bodyPr/>
-          <a:lstStyle/>
-          <a:p>
-            <a:r>
-              <a:rPr lang="en-US" dirty="0"/>
-              <a:t>Quick intro to </a:t>
-            </a:r>
-            <a:r>
-              <a:rPr lang="en-US" dirty="0" err="1"/>
-              <a:t>serverless</a:t>
-            </a:r>
-            <a:endParaRPr lang="en-US" dirty="0"/>
-          </a:p>
-          <a:p>
-            <a:r>
-              <a:rPr lang="en-US" dirty="0"/>
-              <a:t>Maturity model</a:t>
-            </a:r>
-          </a:p>
-          <a:p>
-            <a:r>
-              <a:rPr lang="en-US" dirty="0" err="1"/>
-              <a:t>Wardley</a:t>
-            </a:r>
-            <a:r>
-              <a:rPr lang="en-US" dirty="0"/>
-              <a:t> map, discussion on utilities</a:t>
-            </a:r>
-          </a:p>
-          <a:p>
-            <a:r>
-              <a:rPr lang="en-US" dirty="0"/>
-              <a:t>Benefits / ideas about how this changes everything</a:t>
-            </a:r>
-          </a:p>
-          <a:p>
-            <a:r>
-              <a:rPr lang="en-US" dirty="0"/>
-              <a:t>Adoption ideas</a:t>
-            </a:r>
-          </a:p>
-          <a:p>
-            <a:pPr lvl="1"/>
-            <a:r>
-              <a:rPr lang="en-US" dirty="0"/>
-              <a:t>Focus on high value changes</a:t>
-            </a:r>
-          </a:p>
-          <a:p>
-            <a:r>
-              <a:rPr lang="en-US" dirty="0"/>
-              <a:t>Challenges to implement</a:t>
-            </a:r>
-          </a:p>
-          <a:p>
-            <a:r>
-              <a:rPr lang="en-US" dirty="0"/>
-              <a:t>Experiences at GameStop</a:t>
-            </a:r>
-          </a:p>
-          <a:p>
-            <a:endParaRPr lang="en-US" dirty="0"/>
-          </a:p>
-          <a:p>
-            <a:endParaRPr lang="en-US" dirty="0"/>
-          </a:p>
-        </p:txBody>
-      </p:sp>
-    </p:spTree>
-    <p:extLst>
-      <p:ext uri="{BB962C8B-B14F-4D97-AF65-F5344CB8AC3E}">
-        <p14:creationId xmlns:p14="http://schemas.microsoft.com/office/powerpoint/2010/main" val="2056317850"/>
-      </p:ext>
-    </p:extLst>
-  </p:cSld>
-  <p:clrMapOvr>
-    <a:masterClrMapping/>
-  </p:clrMapOvr>
-</p:sld>
-</file>
-
 <file path=ppt/slides/slide3.xml><?xml version="1.0" encoding="utf-8"?>
 <p:sld xmlns:a="http://schemas.openxmlformats.org/drawingml/2006/main" xmlns:r="http://schemas.openxmlformats.org/officeDocument/2006/relationships" xmlns:p="http://schemas.openxmlformats.org/presentationml/2006/main">
   <p:cSld>
@@ -4096,55 +6166,85 @@
                   <a:schemeClr val="accent4"/>
                 </a:solidFill>
               </a:rPr>
+              <a:t>Agenda</a:t>
+            </a:r>
+          </a:p>
+        </p:txBody>
+      </p:sp>
+      <p:sp>
+        <p:nvSpPr>
+          <p:cNvPr id="3" name="Content Placeholder 2"/>
+          <p:cNvSpPr>
+            <a:spLocks noGrp="1"/>
+          </p:cNvSpPr>
+          <p:nvPr>
+            <p:ph idx="1"/>
+          </p:nvPr>
+        </p:nvSpPr>
+        <p:spPr/>
+        <p:txBody>
+          <a:bodyPr/>
+          <a:lstStyle/>
+          <a:p>
+            <a:r>
+              <a:rPr lang="en-US" dirty="0"/>
               <a:t>Quick intro to </a:t>
             </a:r>
             <a:r>
-              <a:rPr lang="en-US" b="1" dirty="0" err="1">
-                <a:solidFill>
-                  <a:schemeClr val="accent4"/>
-                </a:solidFill>
-              </a:rPr>
+              <a:rPr lang="en-US" dirty="0" err="1"/>
               <a:t>serverless</a:t>
             </a:r>
-            <a:endParaRPr lang="en-US" b="1" dirty="0">
-              <a:solidFill>
-                <a:schemeClr val="accent4"/>
-              </a:solidFill>
-            </a:endParaRPr>
-          </a:p>
-        </p:txBody>
-      </p:sp>
-      <p:sp>
-        <p:nvSpPr>
-          <p:cNvPr id="3" name="Content Placeholder 2"/>
-          <p:cNvSpPr>
-            <a:spLocks noGrp="1"/>
-          </p:cNvSpPr>
-          <p:nvPr>
-            <p:ph idx="1"/>
-          </p:nvPr>
-        </p:nvSpPr>
-        <p:spPr/>
-        <p:txBody>
-          <a:bodyPr/>
-          <a:lstStyle/>
+            <a:endParaRPr lang="en-US" dirty="0"/>
+          </a:p>
           <a:p>
             <a:r>
               <a:rPr lang="en-US" dirty="0"/>
-              <a:t>Patterns</a:t>
-            </a:r>
-          </a:p>
-          <a:p>
+              <a:t>Maturity model</a:t>
+            </a:r>
+          </a:p>
+          <a:p>
+            <a:r>
+              <a:rPr lang="en-US" dirty="0" err="1"/>
+              <a:t>Wardley</a:t>
+            </a:r>
             <a:r>
               <a:rPr lang="en-US" dirty="0"/>
-              <a:t>Framework</a:t>
+              <a:t> map, discussion on utilities</a:t>
             </a:r>
           </a:p>
           <a:p>
             <a:r>
               <a:rPr lang="en-US" dirty="0"/>
-              <a:t>AWS</a:t>
-            </a:r>
+              <a:t>Benefits / ideas about how this changes everything</a:t>
+            </a:r>
+          </a:p>
+          <a:p>
+            <a:r>
+              <a:rPr lang="en-US" dirty="0"/>
+              <a:t>Adoption ideas</a:t>
+            </a:r>
+          </a:p>
+          <a:p>
+            <a:pPr lvl="1"/>
+            <a:r>
+              <a:rPr lang="en-US" dirty="0"/>
+              <a:t>Focus on high value changes</a:t>
+            </a:r>
+          </a:p>
+          <a:p>
+            <a:r>
+              <a:rPr lang="en-US" dirty="0"/>
+              <a:t>Challenges to implement</a:t>
+            </a:r>
+          </a:p>
+          <a:p>
+            <a:r>
+              <a:rPr lang="en-US" dirty="0"/>
+              <a:t>Experiences at GameStop</a:t>
+            </a:r>
+          </a:p>
+          <a:p>
+            <a:endParaRPr lang="en-US" dirty="0"/>
           </a:p>
           <a:p>
             <a:endParaRPr lang="en-US" dirty="0"/>
@@ -4154,7 +6254,7 @@
     </p:spTree>
     <p:extLst>
       <p:ext uri="{BB962C8B-B14F-4D97-AF65-F5344CB8AC3E}">
-        <p14:creationId xmlns:p14="http://schemas.microsoft.com/office/powerpoint/2010/main" val="2318218812"/>
+        <p14:creationId xmlns:p14="http://schemas.microsoft.com/office/powerpoint/2010/main" val="2081470039"/>
       </p:ext>
     </p:extLst>
   </p:cSld>
@@ -4197,13 +6297,18 @@
           <a:lstStyle/>
           <a:p>
             <a:r>
-              <a:rPr lang="en-US" b="1" dirty="0">
+              <a:rPr lang="en-US" b="1" dirty="0" smtClean="0">
                 <a:solidFill>
                   <a:schemeClr val="accent4"/>
                 </a:solidFill>
               </a:rPr>
-              <a:t>Define what we’re talking about</a:t>
-            </a:r>
+              <a:t>An Example of a Technology Problem</a:t>
+            </a:r>
+            <a:endParaRPr lang="en-US" b="1" dirty="0">
+              <a:solidFill>
+                <a:schemeClr val="accent4"/>
+              </a:solidFill>
+            </a:endParaRPr>
           </a:p>
         </p:txBody>
       </p:sp>
@@ -4217,40 +6322,63 @@
             <p:ph idx="1"/>
           </p:nvPr>
         </p:nvSpPr>
-        <p:spPr/>
-        <p:txBody>
-          <a:bodyPr/>
-          <a:lstStyle/>
-          <a:p>
-            <a:r>
-              <a:rPr lang="en-US" dirty="0" err="1"/>
-              <a:t>Serverless</a:t>
-            </a:r>
+        <p:spPr>
+          <a:xfrm>
+            <a:off x="676275" y="1441617"/>
+            <a:ext cx="10515600" cy="1368258"/>
+          </a:xfrm>
+        </p:spPr>
+        <p:txBody>
+          <a:bodyPr/>
+          <a:lstStyle/>
+          <a:p>
+            <a:endParaRPr lang="en-US" dirty="0"/>
+          </a:p>
+          <a:p>
             <a:r>
               <a:rPr lang="en-US" dirty="0"/>
-              <a:t> as general pattern</a:t>
-            </a:r>
-          </a:p>
-          <a:p>
-            <a:r>
-              <a:rPr lang="en-US" dirty="0"/>
-              <a:t>Specifically using experience we have with using the </a:t>
-            </a:r>
-            <a:r>
-              <a:rPr lang="en-US" dirty="0" err="1"/>
-              <a:t>Serverless</a:t>
-            </a:r>
-            <a:r>
-              <a:rPr lang="en-US" dirty="0"/>
-              <a:t> Framework on AWS</a:t>
-            </a:r>
-          </a:p>
-        </p:txBody>
-      </p:sp>
+              <a:t>Landing a space probe on a barge</a:t>
+            </a:r>
+          </a:p>
+          <a:p>
+            <a:endParaRPr lang="en-US" dirty="0"/>
+          </a:p>
+        </p:txBody>
+      </p:sp>
+      <p:pic>
+        <p:nvPicPr>
+          <p:cNvPr id="6" name="Picture 5"/>
+          <p:cNvPicPr>
+            <a:picLocks noChangeAspect="1"/>
+          </p:cNvPicPr>
+          <p:nvPr/>
+        </p:nvPicPr>
+        <p:blipFill>
+          <a:blip r:embed="rId2">
+            <a:extLst>
+              <a:ext uri="{28A0092B-C50C-407E-A947-70E740481C1C}">
+                <a14:useLocalDpi xmlns:a14="http://schemas.microsoft.com/office/drawing/2010/main" val="0"/>
+              </a:ext>
+            </a:extLst>
+          </a:blip>
+          <a:stretch>
+            <a:fillRect/>
+          </a:stretch>
+        </p:blipFill>
+        <p:spPr>
+          <a:xfrm>
+            <a:off x="5295900" y="1690688"/>
+            <a:ext cx="6057900" cy="4038600"/>
+          </a:xfrm>
+          <a:prstGeom prst="rect">
+            <a:avLst/>
+          </a:prstGeom>
+        </p:spPr>
+      </p:pic>
     </p:spTree>
     <p:extLst>
       <p:ext uri="{BB962C8B-B14F-4D97-AF65-F5344CB8AC3E}">
-        <p14:creationId xmlns:p14="http://schemas.microsoft.com/office/powerpoint/2010/main" val="3922689527"/>
+        <p14:creationId xmlns:p14="http://schemas.microsoft.com/office/powerpoint/2010/main" val="1258594443"/>
       </p:ext>
     </p:extLst>
   </p:cSld>
@@ -4293,13 +6421,18 @@
           <a:lstStyle/>
           <a:p>
             <a:r>
-              <a:rPr lang="en-US" b="1" dirty="0">
+              <a:rPr lang="en-US" b="1" dirty="0" smtClean="0">
                 <a:solidFill>
                   <a:schemeClr val="accent4"/>
                 </a:solidFill>
               </a:rPr>
-              <a:t>Where’s the audience at, and our premise</a:t>
-            </a:r>
+              <a:t>An Example of a Technology Problem</a:t>
+            </a:r>
+            <a:endParaRPr lang="en-US" b="1" dirty="0">
+              <a:solidFill>
+                <a:schemeClr val="accent4"/>
+              </a:solidFill>
+            </a:endParaRPr>
           </a:p>
         </p:txBody>
       </p:sp>
@@ -4313,77 +6446,26 @@
             <p:ph idx="1"/>
           </p:nvPr>
         </p:nvSpPr>
-        <p:spPr/>
-        <p:txBody>
-          <a:bodyPr/>
-          <a:lstStyle/>
-          <a:p>
-            <a:r>
-              <a:rPr lang="en-US" dirty="0"/>
-              <a:t>Maturity framework of DevOps/cloud adoption</a:t>
-            </a:r>
-          </a:p>
-          <a:p>
-            <a:pPr lvl="1"/>
-            <a:r>
-              <a:rPr lang="en-US" dirty="0"/>
-              <a:t>Show framework, ask people where they are, we will show how </a:t>
-            </a:r>
-            <a:r>
-              <a:rPr lang="en-US" dirty="0" err="1"/>
-              <a:t>serverless</a:t>
-            </a:r>
-            <a:r>
-              <a:rPr lang="en-US" dirty="0"/>
-              <a:t> gets you to most mature stage</a:t>
-            </a:r>
-          </a:p>
-          <a:p>
-            <a:pPr lvl="1"/>
+        <p:spPr>
+          <a:xfrm>
+            <a:off x="676275" y="1409700"/>
+            <a:ext cx="4448175" cy="1400175"/>
+          </a:xfrm>
+        </p:spPr>
+        <p:txBody>
+          <a:bodyPr>
+            <a:normAutofit fontScale="92500" lnSpcReduction="20000"/>
+          </a:bodyPr>
+          <a:lstStyle/>
+          <a:p>
             <a:endParaRPr lang="en-US" dirty="0"/>
           </a:p>
           <a:p>
             <a:r>
-              <a:rPr lang="en-US" dirty="0"/>
-              <a:t>Makes it easier for you to do all the things you should have done before</a:t>
-            </a:r>
-          </a:p>
-          <a:p>
-            <a:pPr lvl="1"/>
-            <a:r>
-              <a:rPr lang="en-US" dirty="0" err="1"/>
-              <a:t>Serverless</a:t>
-            </a:r>
-            <a:r>
-              <a:rPr lang="en-US" dirty="0"/>
-              <a:t> democratizes the DevOps movement</a:t>
-            </a:r>
-          </a:p>
-          <a:p>
-            <a:pPr lvl="1"/>
-            <a:r>
-              <a:rPr lang="en-US" dirty="0" err="1"/>
-              <a:t>Serverless</a:t>
-            </a:r>
-            <a:r>
-              <a:rPr lang="en-US" dirty="0"/>
-              <a:t> is the pinnacle of the DevOps movement</a:t>
-            </a:r>
-          </a:p>
-          <a:p>
-            <a:pPr lvl="1"/>
-            <a:r>
-              <a:rPr lang="en-US" dirty="0"/>
-              <a:t>We think </a:t>
-            </a:r>
-            <a:r>
-              <a:rPr lang="en-US" dirty="0" err="1"/>
-              <a:t>serverless</a:t>
-            </a:r>
-            <a:r>
-              <a:rPr lang="en-US" dirty="0"/>
-              <a:t> is the best opportunity for adopting DevOps best practices at your organization</a:t>
-            </a:r>
+              <a:rPr lang="en-US" dirty="0" smtClean="0"/>
+              <a:t>Non-invasive brain cancer surgery using 3 medical imaging</a:t>
+            </a:r>
+            <a:endParaRPr lang="en-US" dirty="0"/>
           </a:p>
           <a:p>
             <a:endParaRPr lang="en-US" dirty="0"/>
@@ -4393,7 +6475,7 @@
     </p:spTree>
     <p:extLst>
       <p:ext uri="{BB962C8B-B14F-4D97-AF65-F5344CB8AC3E}">
-        <p14:creationId xmlns:p14="http://schemas.microsoft.com/office/powerpoint/2010/main" val="3843945573"/>
+        <p14:creationId xmlns:p14="http://schemas.microsoft.com/office/powerpoint/2010/main" val="82615728"/>
       </p:ext>
     </p:extLst>
   </p:cSld>
@@ -4436,852 +6518,158 @@
           <a:lstStyle/>
           <a:p>
             <a:r>
-              <a:rPr lang="en-US" b="1" dirty="0">
+              <a:rPr lang="en-US" b="1" dirty="0" smtClean="0">
                 <a:solidFill>
                   <a:schemeClr val="accent4"/>
                 </a:solidFill>
               </a:rPr>
-              <a:t>DevOps &amp; cloud best practices maturity model</a:t>
-            </a:r>
-          </a:p>
-        </p:txBody>
-      </p:sp>
-      <p:graphicFrame>
-        <p:nvGraphicFramePr>
-          <p:cNvPr id="4" name="Table 3"/>
-          <p:cNvGraphicFramePr>
-            <a:graphicFrameLocks noGrp="1"/>
-          </p:cNvGraphicFramePr>
-          <p:nvPr>
-            <p:extLst>
-              <p:ext uri="{D42A27DB-BD31-4B8C-83A1-F6EECF244321}">
-                <p14:modId xmlns:p14="http://schemas.microsoft.com/office/powerpoint/2010/main" val="4004099653"/>
-              </p:ext>
-            </p:extLst>
-          </p:nvPr>
-        </p:nvGraphicFramePr>
-        <p:xfrm>
-          <a:off x="0" y="1433345"/>
-          <a:ext cx="12192000" cy="5354320"/>
-        </p:xfrm>
-        <a:graphic>
-          <a:graphicData uri="http://schemas.openxmlformats.org/drawingml/2006/table">
-            <a:tbl>
-              <a:tblPr firstRow="1" bandRow="1">
-                <a:tableStyleId>{91EBBBCC-DAD2-459C-BE2E-F6DE35CF9A28}</a:tableStyleId>
-              </a:tblPr>
-              <a:tblGrid>
-                <a:gridCol w="2007955">
-                  <a:extLst>
-                    <a:ext uri="{9D8B030D-6E8A-4147-A177-3AD203B41FA5}">
-                      <a16:colId xmlns:a16="http://schemas.microsoft.com/office/drawing/2014/main" val="2231685289"/>
-                    </a:ext>
-                  </a:extLst>
-                </a:gridCol>
-                <a:gridCol w="3025457">
-                  <a:extLst>
-                    <a:ext uri="{9D8B030D-6E8A-4147-A177-3AD203B41FA5}">
-                      <a16:colId xmlns:a16="http://schemas.microsoft.com/office/drawing/2014/main" val="692404139"/>
-                    </a:ext>
-                  </a:extLst>
-                </a:gridCol>
-                <a:gridCol w="3579294">
-                  <a:extLst>
-                    <a:ext uri="{9D8B030D-6E8A-4147-A177-3AD203B41FA5}">
-                      <a16:colId xmlns:a16="http://schemas.microsoft.com/office/drawing/2014/main" val="435260598"/>
-                    </a:ext>
-                  </a:extLst>
-                </a:gridCol>
-                <a:gridCol w="3579294">
-                  <a:extLst>
-                    <a:ext uri="{9D8B030D-6E8A-4147-A177-3AD203B41FA5}">
-                      <a16:colId xmlns:a16="http://schemas.microsoft.com/office/drawing/2014/main" val="3371916354"/>
-                    </a:ext>
-                  </a:extLst>
-                </a:gridCol>
-              </a:tblGrid>
-              <a:tr h="370840">
-                <a:tc>
-                  <a:txBody>
-                    <a:bodyPr/>
-                    <a:lstStyle/>
-                    <a:p>
-                      <a:r>
-                        <a:rPr lang="en-US" dirty="0"/>
-                        <a:t>Metric</a:t>
-                      </a:r>
-                    </a:p>
-                  </a:txBody>
-                  <a:tcPr/>
-                </a:tc>
-                <a:tc>
-                  <a:txBody>
-                    <a:bodyPr/>
-                    <a:lstStyle/>
-                    <a:p>
-                      <a:pPr algn="ctr"/>
-                      <a:r>
-                        <a:rPr lang="en-US" dirty="0"/>
-                        <a:t>I</a:t>
-                      </a:r>
-                    </a:p>
-                  </a:txBody>
-                  <a:tcPr/>
-                </a:tc>
-                <a:tc>
-                  <a:txBody>
-                    <a:bodyPr/>
-                    <a:lstStyle/>
-                    <a:p>
-                      <a:pPr algn="ctr"/>
-                      <a:r>
-                        <a:rPr lang="en-US" dirty="0"/>
-                        <a:t>II</a:t>
-                      </a:r>
-                    </a:p>
-                  </a:txBody>
-                  <a:tcPr/>
-                </a:tc>
-                <a:tc>
-                  <a:txBody>
-                    <a:bodyPr/>
-                    <a:lstStyle/>
-                    <a:p>
-                      <a:pPr algn="ctr"/>
-                      <a:r>
-                        <a:rPr lang="en-US" dirty="0"/>
-                        <a:t>III</a:t>
-                      </a:r>
-                    </a:p>
-                  </a:txBody>
-                  <a:tcPr/>
-                </a:tc>
-                <a:extLst>
-                  <a:ext uri="{0D108BD9-81ED-4DB2-BD59-A6C34878D82A}">
-                    <a16:rowId xmlns:a16="http://schemas.microsoft.com/office/drawing/2014/main" val="924742772"/>
-                  </a:ext>
-                </a:extLst>
-              </a:tr>
-              <a:tr h="370840">
-                <a:tc>
-                  <a:txBody>
-                    <a:bodyPr/>
-                    <a:lstStyle/>
-                    <a:p>
-                      <a:r>
-                        <a:rPr lang="en-US" b="1" dirty="0"/>
-                        <a:t>Culture</a:t>
-                      </a:r>
-                    </a:p>
-                  </a:txBody>
-                  <a:tcPr anchor="ctr"/>
-                </a:tc>
-                <a:tc>
-                  <a:txBody>
-                    <a:bodyPr/>
-                    <a:lstStyle/>
-                    <a:p>
-                      <a:pPr marL="285750" indent="-285750">
-                        <a:buFont typeface="Calibri" panose="020F0502020204030204" pitchFamily="34" charset="0"/>
-                        <a:buChar char="-"/>
-                      </a:pPr>
-                      <a:r>
-                        <a:rPr lang="en-US" sz="1600" dirty="0"/>
-                        <a:t>Execute defined processes</a:t>
-                      </a:r>
-                    </a:p>
-                  </a:txBody>
-                  <a:tcPr anchor="ctr"/>
-                </a:tc>
-                <a:tc>
-                  <a:txBody>
-                    <a:bodyPr/>
-                    <a:lstStyle/>
-                    <a:p>
-                      <a:pPr marL="285750" indent="-285750">
-                        <a:buFont typeface="Calibri" panose="020F0502020204030204" pitchFamily="34" charset="0"/>
-                        <a:buChar char="-"/>
-                      </a:pPr>
-                      <a:endParaRPr lang="en-US" sz="1600" dirty="0"/>
-                    </a:p>
-                  </a:txBody>
-                  <a:tcPr anchor="ctr"/>
-                </a:tc>
-                <a:tc>
-                  <a:txBody>
-                    <a:bodyPr/>
-                    <a:lstStyle/>
-                    <a:p>
-                      <a:pPr marL="285750" indent="-285750">
-                        <a:buFont typeface="Calibri" panose="020F0502020204030204" pitchFamily="34" charset="0"/>
-                        <a:buChar char="-"/>
-                      </a:pPr>
-                      <a:r>
-                        <a:rPr lang="en-US" sz="1600" dirty="0"/>
-                        <a:t>Learning organization</a:t>
-                      </a:r>
-                    </a:p>
-                    <a:p>
-                      <a:pPr marL="285750" indent="-285750">
-                        <a:buFont typeface="Calibri" panose="020F0502020204030204" pitchFamily="34" charset="0"/>
-                        <a:buChar char="-"/>
-                      </a:pPr>
-                      <a:r>
-                        <a:rPr lang="en-US" sz="1600" dirty="0"/>
-                        <a:t>Feedback loops</a:t>
-                      </a:r>
-                    </a:p>
-                  </a:txBody>
-                  <a:tcPr anchor="ctr"/>
-                </a:tc>
-                <a:extLst>
-                  <a:ext uri="{0D108BD9-81ED-4DB2-BD59-A6C34878D82A}">
-                    <a16:rowId xmlns:a16="http://schemas.microsoft.com/office/drawing/2014/main" val="2787532655"/>
-                  </a:ext>
-                </a:extLst>
-              </a:tr>
-              <a:tr h="370840">
-                <a:tc>
-                  <a:txBody>
-                    <a:bodyPr/>
-                    <a:lstStyle/>
-                    <a:p>
-                      <a:r>
-                        <a:rPr lang="en-US" b="1" dirty="0"/>
-                        <a:t>Organization</a:t>
-                      </a:r>
-                    </a:p>
-                  </a:txBody>
-                  <a:tcPr anchor="ctr"/>
-                </a:tc>
-                <a:tc>
-                  <a:txBody>
-                    <a:bodyPr/>
-                    <a:lstStyle/>
-                    <a:p>
-                      <a:pPr marL="285750" indent="-285750">
-                        <a:buFont typeface="Calibri" panose="020F0502020204030204" pitchFamily="34" charset="0"/>
-                        <a:buChar char="-"/>
-                      </a:pPr>
-                      <a:r>
-                        <a:rPr lang="en-US" sz="1600" dirty="0"/>
-                        <a:t>Technology &amp; platform teams</a:t>
-                      </a:r>
-                    </a:p>
-                  </a:txBody>
-                  <a:tcPr anchor="ctr"/>
-                </a:tc>
-                <a:tc>
-                  <a:txBody>
-                    <a:bodyPr/>
-                    <a:lstStyle/>
-                    <a:p>
-                      <a:pPr marL="285750" marR="0" lvl="0" indent="-285750" algn="l" defTabSz="914400" rtl="0" eaLnBrk="1" fontAlgn="auto" latinLnBrk="0" hangingPunct="1">
-                        <a:lnSpc>
-                          <a:spcPct val="100000"/>
-                        </a:lnSpc>
-                        <a:spcBef>
-                          <a:spcPts val="0"/>
-                        </a:spcBef>
-                        <a:spcAft>
-                          <a:spcPts val="0"/>
-                        </a:spcAft>
-                        <a:buClrTx/>
-                        <a:buSzTx/>
-                        <a:buFont typeface="Calibri" panose="020F0502020204030204" pitchFamily="34" charset="0"/>
-                        <a:buChar char="-"/>
-                        <a:tabLst/>
-                        <a:defRPr/>
-                      </a:pPr>
-                      <a:r>
-                        <a:rPr lang="en-US" sz="1600" dirty="0"/>
-                        <a:t>Lifecycle teams</a:t>
-                      </a:r>
-                    </a:p>
-                  </a:txBody>
-                  <a:tcPr anchor="ctr"/>
-                </a:tc>
-                <a:tc>
-                  <a:txBody>
-                    <a:bodyPr/>
-                    <a:lstStyle/>
-                    <a:p>
-                      <a:pPr marL="285750" indent="-285750">
-                        <a:buFont typeface="Calibri" panose="020F0502020204030204" pitchFamily="34" charset="0"/>
-                        <a:buChar char="-"/>
-                      </a:pPr>
-                      <a:r>
-                        <a:rPr lang="en-US" sz="1600" dirty="0"/>
-                        <a:t>Autonomous product lifecycle teams</a:t>
-                      </a:r>
-                    </a:p>
-                  </a:txBody>
-                  <a:tcPr anchor="ctr"/>
-                </a:tc>
-                <a:extLst>
-                  <a:ext uri="{0D108BD9-81ED-4DB2-BD59-A6C34878D82A}">
-                    <a16:rowId xmlns:a16="http://schemas.microsoft.com/office/drawing/2014/main" val="4207372121"/>
-                  </a:ext>
-                </a:extLst>
-              </a:tr>
-              <a:tr h="370840">
-                <a:tc>
-                  <a:txBody>
-                    <a:bodyPr/>
-                    <a:lstStyle/>
-                    <a:p>
-                      <a:r>
-                        <a:rPr lang="en-US" b="1" dirty="0"/>
-                        <a:t>Projects</a:t>
-                      </a:r>
-                    </a:p>
-                  </a:txBody>
-                  <a:tcPr anchor="ctr"/>
-                </a:tc>
-                <a:tc>
-                  <a:txBody>
-                    <a:bodyPr/>
-                    <a:lstStyle/>
-                    <a:p>
-                      <a:pPr marL="285750" indent="-285750">
-                        <a:buFont typeface="Calibri" panose="020F0502020204030204" pitchFamily="34" charset="0"/>
-                        <a:buChar char="-"/>
-                      </a:pPr>
-                      <a:r>
-                        <a:rPr lang="en-US" sz="1600" dirty="0"/>
-                        <a:t>Large, cross-team projects</a:t>
-                      </a:r>
-                    </a:p>
-                    <a:p>
-                      <a:pPr marL="285750" indent="-285750">
-                        <a:buFont typeface="Calibri" panose="020F0502020204030204" pitchFamily="34" charset="0"/>
-                        <a:buChar char="-"/>
-                      </a:pPr>
-                      <a:r>
-                        <a:rPr lang="en-US" sz="1600" dirty="0"/>
-                        <a:t>Multi-year</a:t>
-                      </a:r>
-                    </a:p>
-                  </a:txBody>
-                  <a:tcPr anchor="ctr"/>
-                </a:tc>
-                <a:tc>
-                  <a:txBody>
-                    <a:bodyPr/>
-                    <a:lstStyle/>
-                    <a:p>
-                      <a:pPr marL="285750" marR="0" lvl="0" indent="-285750" algn="l" defTabSz="914400" rtl="0" eaLnBrk="1" fontAlgn="auto" latinLnBrk="0" hangingPunct="1">
-                        <a:lnSpc>
-                          <a:spcPct val="100000"/>
-                        </a:lnSpc>
-                        <a:spcBef>
-                          <a:spcPts val="0"/>
-                        </a:spcBef>
-                        <a:spcAft>
-                          <a:spcPts val="0"/>
-                        </a:spcAft>
-                        <a:buClrTx/>
-                        <a:buSzTx/>
-                        <a:buFont typeface="Calibri" panose="020F0502020204030204" pitchFamily="34" charset="0"/>
-                        <a:buChar char="-"/>
-                        <a:tabLst/>
-                        <a:defRPr/>
-                      </a:pPr>
-                      <a:r>
-                        <a:rPr lang="en-US" sz="1600" dirty="0"/>
-                        <a:t>Series of small, discrete projects</a:t>
-                      </a:r>
-                    </a:p>
-                    <a:p>
-                      <a:pPr marL="285750" marR="0" lvl="0" indent="-285750" algn="l" defTabSz="914400" rtl="0" eaLnBrk="1" fontAlgn="auto" latinLnBrk="0" hangingPunct="1">
-                        <a:lnSpc>
-                          <a:spcPct val="100000"/>
-                        </a:lnSpc>
-                        <a:spcBef>
-                          <a:spcPts val="0"/>
-                        </a:spcBef>
-                        <a:spcAft>
-                          <a:spcPts val="0"/>
-                        </a:spcAft>
-                        <a:buClrTx/>
-                        <a:buSzTx/>
-                        <a:buFont typeface="Calibri" panose="020F0502020204030204" pitchFamily="34" charset="0"/>
-                        <a:buChar char="-"/>
-                        <a:tabLst/>
-                        <a:defRPr/>
-                      </a:pPr>
-                      <a:r>
-                        <a:rPr lang="en-US" sz="1600" dirty="0"/>
-                        <a:t>Some cross-cutting</a:t>
-                      </a:r>
-                    </a:p>
-                  </a:txBody>
-                  <a:tcPr anchor="ctr"/>
-                </a:tc>
-                <a:tc>
-                  <a:txBody>
-                    <a:bodyPr/>
-                    <a:lstStyle/>
-                    <a:p>
-                      <a:pPr marL="285750" indent="-285750">
-                        <a:buFont typeface="Calibri" panose="020F0502020204030204" pitchFamily="34" charset="0"/>
-                        <a:buChar char="-"/>
-                      </a:pPr>
-                      <a:r>
-                        <a:rPr lang="en-US" sz="1600" dirty="0"/>
-                        <a:t>Focus on products</a:t>
-                      </a:r>
-                    </a:p>
-                    <a:p>
-                      <a:pPr marL="285750" indent="-285750">
-                        <a:buFont typeface="Calibri" panose="020F0502020204030204" pitchFamily="34" charset="0"/>
-                        <a:buChar char="-"/>
-                      </a:pPr>
-                      <a:r>
-                        <a:rPr lang="en-US" sz="1600" dirty="0"/>
-                        <a:t>Mission-based</a:t>
-                      </a:r>
-                    </a:p>
-                    <a:p>
-                      <a:pPr marL="285750" indent="-285750">
-                        <a:buFont typeface="Calibri" panose="020F0502020204030204" pitchFamily="34" charset="0"/>
-                        <a:buChar char="-"/>
-                      </a:pPr>
-                      <a:r>
-                        <a:rPr lang="en-US" sz="1600" dirty="0"/>
-                        <a:t>Autonomy and experimentation</a:t>
-                      </a:r>
-                    </a:p>
-                    <a:p>
-                      <a:pPr marL="285750" indent="-285750">
-                        <a:buFont typeface="Calibri" panose="020F0502020204030204" pitchFamily="34" charset="0"/>
-                        <a:buChar char="-"/>
-                      </a:pPr>
-                      <a:r>
-                        <a:rPr lang="en-US" sz="1600" dirty="0"/>
-                        <a:t>Iterative</a:t>
-                      </a:r>
-                    </a:p>
-                  </a:txBody>
-                  <a:tcPr anchor="ctr"/>
-                </a:tc>
-                <a:extLst>
-                  <a:ext uri="{0D108BD9-81ED-4DB2-BD59-A6C34878D82A}">
-                    <a16:rowId xmlns:a16="http://schemas.microsoft.com/office/drawing/2014/main" val="570727899"/>
-                  </a:ext>
-                </a:extLst>
-              </a:tr>
-              <a:tr h="370840">
-                <a:tc>
-                  <a:txBody>
-                    <a:bodyPr/>
-                    <a:lstStyle/>
-                    <a:p>
-                      <a:r>
-                        <a:rPr lang="en-US" b="1" dirty="0"/>
-                        <a:t>Data decision making</a:t>
-                      </a:r>
-                    </a:p>
-                  </a:txBody>
-                  <a:tcPr anchor="ctr"/>
-                </a:tc>
-                <a:tc>
-                  <a:txBody>
-                    <a:bodyPr/>
-                    <a:lstStyle/>
-                    <a:p>
-                      <a:pPr marL="285750" indent="-285750">
-                        <a:buFont typeface="Calibri" panose="020F0502020204030204" pitchFamily="34" charset="0"/>
-                        <a:buChar char="-"/>
-                      </a:pPr>
-                      <a:r>
-                        <a:rPr lang="en-US" sz="1600" dirty="0" err="1"/>
-                        <a:t>HiPPO</a:t>
-                      </a:r>
-                      <a:endParaRPr lang="en-US" sz="1600" dirty="0"/>
-                    </a:p>
-                  </a:txBody>
-                  <a:tcPr anchor="ctr"/>
-                </a:tc>
-                <a:tc>
-                  <a:txBody>
-                    <a:bodyPr/>
-                    <a:lstStyle/>
-                    <a:p>
-                      <a:pPr marL="285750" indent="-285750">
-                        <a:buFont typeface="Calibri" panose="020F0502020204030204" pitchFamily="34" charset="0"/>
-                        <a:buChar char="-"/>
-                      </a:pPr>
-                      <a:r>
-                        <a:rPr lang="en-US" sz="1600" dirty="0"/>
-                        <a:t>Structured, schedule reporting</a:t>
-                      </a:r>
-                    </a:p>
-                    <a:p>
-                      <a:pPr marL="285750" indent="-285750">
-                        <a:buFont typeface="Calibri" panose="020F0502020204030204" pitchFamily="34" charset="0"/>
-                        <a:buChar char="-"/>
-                      </a:pPr>
-                      <a:r>
-                        <a:rPr lang="en-US" sz="1600" dirty="0"/>
-                        <a:t>Frequently in silos</a:t>
-                      </a:r>
-                    </a:p>
-                  </a:txBody>
-                  <a:tcPr anchor="ctr"/>
-                </a:tc>
-                <a:tc>
-                  <a:txBody>
-                    <a:bodyPr/>
-                    <a:lstStyle/>
-                    <a:p>
-                      <a:pPr marL="285750" indent="-285750">
-                        <a:buFont typeface="Calibri" panose="020F0502020204030204" pitchFamily="34" charset="0"/>
-                        <a:buChar char="-"/>
-                      </a:pPr>
-                      <a:r>
-                        <a:rPr lang="en-US" sz="1600" dirty="0"/>
-                        <a:t>Data-driven</a:t>
-                      </a:r>
-                    </a:p>
-                    <a:p>
-                      <a:pPr marL="285750" indent="-285750">
-                        <a:buFont typeface="Calibri" panose="020F0502020204030204" pitchFamily="34" charset="0"/>
-                        <a:buChar char="-"/>
-                      </a:pPr>
-                      <a:r>
-                        <a:rPr lang="en-US" sz="1600" dirty="0"/>
-                        <a:t>Everyone in organization has access to all data</a:t>
-                      </a:r>
-                    </a:p>
-                  </a:txBody>
-                  <a:tcPr anchor="ctr"/>
-                </a:tc>
-                <a:extLst>
-                  <a:ext uri="{0D108BD9-81ED-4DB2-BD59-A6C34878D82A}">
-                    <a16:rowId xmlns:a16="http://schemas.microsoft.com/office/drawing/2014/main" val="3237965323"/>
-                  </a:ext>
-                </a:extLst>
-              </a:tr>
-              <a:tr h="370840">
-                <a:tc>
-                  <a:txBody>
-                    <a:bodyPr/>
-                    <a:lstStyle/>
-                    <a:p>
-                      <a:r>
-                        <a:rPr lang="en-US" b="1" dirty="0"/>
-                        <a:t>Delivery</a:t>
-                      </a:r>
-                    </a:p>
-                  </a:txBody>
-                  <a:tcPr anchor="ctr"/>
-                </a:tc>
-                <a:tc>
-                  <a:txBody>
-                    <a:bodyPr/>
-                    <a:lstStyle/>
-                    <a:p>
-                      <a:pPr marL="285750" indent="-285750">
-                        <a:buFont typeface="Calibri" panose="020F0502020204030204" pitchFamily="34" charset="0"/>
-                        <a:buChar char="-"/>
-                      </a:pPr>
-                      <a:r>
-                        <a:rPr lang="en-US" sz="1600" dirty="0"/>
-                        <a:t>Monthly (+)</a:t>
-                      </a:r>
-                    </a:p>
-                    <a:p>
-                      <a:pPr marL="285750" indent="-285750">
-                        <a:buFont typeface="Calibri" panose="020F0502020204030204" pitchFamily="34" charset="0"/>
-                        <a:buChar char="-"/>
-                      </a:pPr>
-                      <a:r>
-                        <a:rPr lang="en-US" sz="1600" dirty="0"/>
-                        <a:t>Manual</a:t>
-                      </a:r>
-                    </a:p>
-                  </a:txBody>
-                  <a:tcPr anchor="ctr"/>
-                </a:tc>
-                <a:tc>
-                  <a:txBody>
-                    <a:bodyPr/>
-                    <a:lstStyle/>
-                    <a:p>
-                      <a:pPr marL="285750" indent="-285750">
-                        <a:buFont typeface="Calibri" panose="020F0502020204030204" pitchFamily="34" charset="0"/>
-                        <a:buChar char="-"/>
-                      </a:pPr>
-                      <a:r>
-                        <a:rPr lang="en-US" sz="1600" dirty="0"/>
-                        <a:t>Weekly</a:t>
-                      </a:r>
-                    </a:p>
-                    <a:p>
-                      <a:pPr marL="285750" indent="-285750">
-                        <a:buFont typeface="Calibri" panose="020F0502020204030204" pitchFamily="34" charset="0"/>
-                        <a:buChar char="-"/>
-                      </a:pPr>
-                      <a:r>
-                        <a:rPr lang="en-US" sz="1600" dirty="0"/>
-                        <a:t>Automated in some environments, for some applications</a:t>
-                      </a:r>
-                    </a:p>
-                  </a:txBody>
-                  <a:tcPr anchor="ctr"/>
-                </a:tc>
-                <a:tc>
-                  <a:txBody>
-                    <a:bodyPr/>
-                    <a:lstStyle/>
-                    <a:p>
-                      <a:pPr marL="285750" indent="-285750">
-                        <a:buFont typeface="Calibri" panose="020F0502020204030204" pitchFamily="34" charset="0"/>
-                        <a:buChar char="-"/>
-                      </a:pPr>
-                      <a:r>
-                        <a:rPr lang="en-US" sz="1600" dirty="0"/>
-                        <a:t>Multiple times a day</a:t>
-                      </a:r>
-                    </a:p>
-                    <a:p>
-                      <a:pPr marL="285750" indent="-285750">
-                        <a:buFont typeface="Calibri" panose="020F0502020204030204" pitchFamily="34" charset="0"/>
-                        <a:buChar char="-"/>
-                      </a:pPr>
-                      <a:r>
-                        <a:rPr lang="en-US" sz="1600" dirty="0"/>
-                        <a:t>Fully automated</a:t>
-                      </a:r>
-                    </a:p>
-                  </a:txBody>
-                  <a:tcPr anchor="ctr"/>
-                </a:tc>
-                <a:extLst>
-                  <a:ext uri="{0D108BD9-81ED-4DB2-BD59-A6C34878D82A}">
-                    <a16:rowId xmlns:a16="http://schemas.microsoft.com/office/drawing/2014/main" val="1003695712"/>
-                  </a:ext>
-                </a:extLst>
-              </a:tr>
-              <a:tr h="370840">
-                <a:tc>
-                  <a:txBody>
-                    <a:bodyPr/>
-                    <a:lstStyle/>
-                    <a:p>
-                      <a:r>
-                        <a:rPr lang="en-US" b="1" dirty="0"/>
-                        <a:t>Cloud adoption</a:t>
-                      </a:r>
-                    </a:p>
-                  </a:txBody>
-                  <a:tcPr anchor="ctr"/>
-                </a:tc>
-                <a:tc>
-                  <a:txBody>
-                    <a:bodyPr/>
-                    <a:lstStyle/>
-                    <a:p>
-                      <a:pPr marL="285750" indent="-285750">
-                        <a:buFont typeface="Calibri" panose="020F0502020204030204" pitchFamily="34" charset="0"/>
-                        <a:buChar char="-"/>
-                      </a:pPr>
-                      <a:r>
-                        <a:rPr lang="en-US" sz="1600" dirty="0"/>
-                        <a:t>Exploring the cloud</a:t>
-                      </a:r>
-                    </a:p>
-                  </a:txBody>
-                  <a:tcPr anchor="ctr"/>
-                </a:tc>
-                <a:tc>
-                  <a:txBody>
-                    <a:bodyPr/>
-                    <a:lstStyle/>
-                    <a:p>
-                      <a:pPr marL="285750" indent="-285750">
-                        <a:buFont typeface="Calibri" panose="020F0502020204030204" pitchFamily="34" charset="0"/>
-                        <a:buChar char="-"/>
-                      </a:pPr>
-                      <a:r>
-                        <a:rPr lang="en-US" sz="1600" dirty="0"/>
-                        <a:t>Moving to the cloud</a:t>
-                      </a:r>
-                    </a:p>
-                  </a:txBody>
-                  <a:tcPr anchor="ctr"/>
-                </a:tc>
-                <a:tc>
-                  <a:txBody>
-                    <a:bodyPr/>
-                    <a:lstStyle/>
-                    <a:p>
-                      <a:pPr marL="285750" indent="-285750">
-                        <a:buFont typeface="Calibri" panose="020F0502020204030204" pitchFamily="34" charset="0"/>
-                        <a:buChar char="-"/>
-                      </a:pPr>
-                      <a:r>
-                        <a:rPr lang="en-US" sz="1600" dirty="0"/>
-                        <a:t>100% cloud adoption</a:t>
-                      </a:r>
-                    </a:p>
-                  </a:txBody>
-                  <a:tcPr anchor="ctr"/>
-                </a:tc>
-                <a:extLst>
-                  <a:ext uri="{0D108BD9-81ED-4DB2-BD59-A6C34878D82A}">
-                    <a16:rowId xmlns:a16="http://schemas.microsoft.com/office/drawing/2014/main" val="1415041541"/>
-                  </a:ext>
-                </a:extLst>
-              </a:tr>
-              <a:tr h="370840">
-                <a:tc>
-                  <a:txBody>
-                    <a:bodyPr/>
-                    <a:lstStyle/>
-                    <a:p>
-                      <a:r>
-                        <a:rPr lang="en-US" b="1" dirty="0"/>
-                        <a:t>Operations</a:t>
-                      </a:r>
-                    </a:p>
-                  </a:txBody>
-                  <a:tcPr anchor="ctr"/>
-                </a:tc>
-                <a:tc>
-                  <a:txBody>
-                    <a:bodyPr/>
-                    <a:lstStyle/>
-                    <a:p>
-                      <a:pPr marL="285750" indent="-285750">
-                        <a:buFont typeface="Calibri" panose="020F0502020204030204" pitchFamily="34" charset="0"/>
-                        <a:buChar char="-"/>
-                      </a:pPr>
-                      <a:r>
-                        <a:rPr lang="en-US" sz="1600" dirty="0"/>
-                        <a:t>Analyzing to see if something broke</a:t>
-                      </a:r>
-                    </a:p>
-                  </a:txBody>
-                  <a:tcPr anchor="ctr"/>
-                </a:tc>
-                <a:tc>
-                  <a:txBody>
-                    <a:bodyPr/>
-                    <a:lstStyle/>
-                    <a:p>
-                      <a:pPr marL="285750" indent="-285750">
-                        <a:buFont typeface="Calibri" panose="020F0502020204030204" pitchFamily="34" charset="0"/>
-                        <a:buChar char="-"/>
-                      </a:pPr>
-                      <a:endParaRPr lang="en-US" sz="1600" dirty="0"/>
-                    </a:p>
-                  </a:txBody>
-                  <a:tcPr anchor="ctr"/>
-                </a:tc>
-                <a:tc>
-                  <a:txBody>
-                    <a:bodyPr/>
-                    <a:lstStyle/>
-                    <a:p>
-                      <a:pPr marL="285750" indent="-285750">
-                        <a:buFont typeface="Calibri" panose="020F0502020204030204" pitchFamily="34" charset="0"/>
-                        <a:buChar char="-"/>
-                      </a:pPr>
-                      <a:r>
-                        <a:rPr lang="en-US" sz="1600" dirty="0"/>
-                        <a:t>Analyzing to see if business value created</a:t>
-                      </a:r>
-                    </a:p>
-                  </a:txBody>
-                  <a:tcPr anchor="ctr"/>
-                </a:tc>
-                <a:extLst>
-                  <a:ext uri="{0D108BD9-81ED-4DB2-BD59-A6C34878D82A}">
-                    <a16:rowId xmlns:a16="http://schemas.microsoft.com/office/drawing/2014/main" val="2272553095"/>
-                  </a:ext>
-                </a:extLst>
-              </a:tr>
-              <a:tr h="370840">
-                <a:tc>
-                  <a:txBody>
-                    <a:bodyPr/>
-                    <a:lstStyle/>
-                    <a:p>
-                      <a:r>
-                        <a:rPr lang="en-US" b="1" dirty="0"/>
-                        <a:t>Security</a:t>
-                      </a:r>
-                    </a:p>
-                  </a:txBody>
-                  <a:tcPr anchor="ctr"/>
-                </a:tc>
-                <a:tc>
-                  <a:txBody>
-                    <a:bodyPr/>
-                    <a:lstStyle/>
-                    <a:p>
-                      <a:pPr marL="285750" indent="-285750">
-                        <a:buFont typeface="Calibri" panose="020F0502020204030204" pitchFamily="34" charset="0"/>
-                        <a:buChar char="-"/>
-                      </a:pPr>
-                      <a:r>
-                        <a:rPr lang="en-US" sz="1600" dirty="0"/>
-                        <a:t>Security theater</a:t>
-                      </a:r>
-                    </a:p>
-                  </a:txBody>
-                  <a:tcPr anchor="ctr"/>
-                </a:tc>
-                <a:tc>
-                  <a:txBody>
-                    <a:bodyPr/>
-                    <a:lstStyle/>
-                    <a:p>
-                      <a:pPr marL="285750" indent="-285750">
-                        <a:buFont typeface="Calibri" panose="020F0502020204030204" pitchFamily="34" charset="0"/>
-                        <a:buChar char="-"/>
-                      </a:pPr>
-                      <a:r>
-                        <a:rPr lang="en-US" sz="1600" dirty="0"/>
-                        <a:t>Firewall security blanket</a:t>
-                      </a:r>
-                    </a:p>
-                  </a:txBody>
-                  <a:tcPr anchor="ctr"/>
-                </a:tc>
-                <a:tc>
-                  <a:txBody>
-                    <a:bodyPr/>
-                    <a:lstStyle/>
-                    <a:p>
-                      <a:pPr marL="285750" indent="-285750">
-                        <a:buFont typeface="Calibri" panose="020F0502020204030204" pitchFamily="34" charset="0"/>
-                        <a:buChar char="-"/>
-                      </a:pPr>
-                      <a:r>
-                        <a:rPr lang="en-US" sz="1600" dirty="0"/>
-                        <a:t>Publish security practices</a:t>
-                      </a:r>
-                    </a:p>
-                  </a:txBody>
-                  <a:tcPr anchor="ctr"/>
-                </a:tc>
-                <a:extLst>
-                  <a:ext uri="{0D108BD9-81ED-4DB2-BD59-A6C34878D82A}">
-                    <a16:rowId xmlns:a16="http://schemas.microsoft.com/office/drawing/2014/main" val="3142695458"/>
-                  </a:ext>
-                </a:extLst>
-              </a:tr>
-            </a:tbl>
-          </a:graphicData>
-        </a:graphic>
-      </p:graphicFrame>
+              <a:t>An Example of a Technology Problem</a:t>
+            </a:r>
+            <a:endParaRPr lang="en-US" b="1" dirty="0">
+              <a:solidFill>
+                <a:schemeClr val="accent4"/>
+              </a:solidFill>
+            </a:endParaRPr>
+          </a:p>
+        </p:txBody>
+      </p:sp>
+      <p:sp>
+        <p:nvSpPr>
+          <p:cNvPr id="3" name="Content Placeholder 2"/>
+          <p:cNvSpPr>
+            <a:spLocks noGrp="1"/>
+          </p:cNvSpPr>
+          <p:nvPr>
+            <p:ph idx="1"/>
+          </p:nvPr>
+        </p:nvSpPr>
+        <p:spPr>
+          <a:xfrm>
+            <a:off x="676275" y="1409700"/>
+            <a:ext cx="4448175" cy="4381500"/>
+          </a:xfrm>
+        </p:spPr>
+        <p:txBody>
+          <a:bodyPr>
+            <a:normAutofit fontScale="92500" lnSpcReduction="10000"/>
+          </a:bodyPr>
+          <a:lstStyle/>
+          <a:p>
+            <a:endParaRPr lang="en-US" dirty="0"/>
+          </a:p>
+          <a:p>
+            <a:r>
+              <a:rPr lang="en-US" dirty="0" smtClean="0"/>
+              <a:t>Spanner (</a:t>
+            </a:r>
+            <a:r>
+              <a:rPr lang="en-US" dirty="0"/>
+              <a:t> </a:t>
+            </a:r>
+            <a:r>
+              <a:rPr lang="en-US" dirty="0" smtClean="0"/>
+              <a:t>Google’s </a:t>
+            </a:r>
+            <a:r>
+              <a:rPr lang="en-US" dirty="0"/>
+              <a:t>modern </a:t>
+            </a:r>
+            <a:r>
+              <a:rPr lang="en-US" dirty="0">
+                <a:hlinkClick r:id="rId2" tooltip="Relational database management system"/>
+              </a:rPr>
+              <a:t>relational</a:t>
+            </a:r>
+            <a:r>
+              <a:rPr lang="en-US" dirty="0"/>
+              <a:t> </a:t>
+            </a:r>
+            <a:r>
+              <a:rPr lang="en-US" dirty="0">
+                <a:hlinkClick r:id="rId3" tooltip="Database management system"/>
+              </a:rPr>
+              <a:t>database management systems</a:t>
+            </a:r>
+            <a:r>
+              <a:rPr lang="en-US" dirty="0"/>
+              <a:t> that seek to provide the same scalable performance of </a:t>
+            </a:r>
+            <a:r>
+              <a:rPr lang="en-US" dirty="0">
+                <a:hlinkClick r:id="rId4" tooltip="NoSQL"/>
+              </a:rPr>
+              <a:t>NoSQL</a:t>
+            </a:r>
+            <a:r>
+              <a:rPr lang="en-US" dirty="0"/>
+              <a:t> systems for </a:t>
+            </a:r>
+            <a:r>
+              <a:rPr lang="en-US" dirty="0">
+                <a:hlinkClick r:id="rId5" tooltip="Online transaction processing"/>
+              </a:rPr>
+              <a:t>online transaction processing</a:t>
+            </a:r>
+            <a:r>
+              <a:rPr lang="en-US" dirty="0"/>
+              <a:t> (OLTP) read-write workloads while still maintaining the </a:t>
+            </a:r>
+            <a:r>
+              <a:rPr lang="en-US" dirty="0">
+                <a:hlinkClick r:id="rId6" tooltip="ACID"/>
+              </a:rPr>
+              <a:t>ACID</a:t>
+            </a:r>
+            <a:r>
+              <a:rPr lang="en-US" dirty="0"/>
+              <a:t> guarantees of a traditional database system</a:t>
+            </a:r>
+            <a:r>
+              <a:rPr lang="en-US" dirty="0" smtClean="0"/>
+              <a:t>.</a:t>
+            </a:r>
+            <a:r>
+              <a:rPr lang="en-US" baseline="30000" dirty="0" smtClean="0">
+                <a:hlinkClick r:id="rId7"/>
+              </a:rPr>
+              <a:t>[)1</a:t>
+            </a:r>
+            <a:r>
+              <a:rPr lang="en-US" baseline="30000" dirty="0">
+                <a:hlinkClick r:id="rId7"/>
+              </a:rPr>
+              <a:t>]</a:t>
+            </a:r>
+            <a:r>
+              <a:rPr lang="en-US" baseline="30000" dirty="0">
+                <a:hlinkClick r:id="rId8"/>
+              </a:rPr>
+              <a:t>[2]</a:t>
+            </a:r>
+            <a:r>
+              <a:rPr lang="en-US" baseline="30000" dirty="0">
+                <a:hlinkClick r:id="rId9"/>
+              </a:rPr>
+              <a:t>[3</a:t>
+            </a:r>
+            <a:r>
+              <a:rPr lang="en-US" baseline="30000" dirty="0" smtClean="0">
+                <a:hlinkClick r:id="rId9"/>
+              </a:rPr>
+              <a:t>]</a:t>
+            </a:r>
+            <a:r>
+              <a:rPr lang="en-US" baseline="30000" dirty="0" smtClean="0"/>
+              <a:t>)</a:t>
+            </a:r>
+            <a:endParaRPr lang="en-US" dirty="0"/>
+          </a:p>
+        </p:txBody>
+      </p:sp>
     </p:spTree>
     <p:extLst>
       <p:ext uri="{BB962C8B-B14F-4D97-AF65-F5344CB8AC3E}">
-        <p14:creationId xmlns:p14="http://schemas.microsoft.com/office/powerpoint/2010/main" val="2494180651"/>
+        <p14:creationId xmlns:p14="http://schemas.microsoft.com/office/powerpoint/2010/main" val="624962956"/>
       </p:ext>
     </p:extLst>
   </p:cSld>
@@ -5324,21 +6712,18 @@
           <a:lstStyle/>
           <a:p>
             <a:r>
-              <a:rPr lang="en-US" b="1" dirty="0" err="1">
+              <a:rPr lang="en-US" b="1" dirty="0" smtClean="0">
                 <a:solidFill>
                   <a:schemeClr val="accent4"/>
                 </a:solidFill>
               </a:rPr>
-              <a:t>Serverless</a:t>
-            </a:r>
-            <a:r>
-              <a:rPr lang="en-US" b="1" dirty="0">
-                <a:solidFill>
-                  <a:schemeClr val="accent4"/>
-                </a:solidFill>
-              </a:rPr>
-              <a:t> is a commodity</a:t>
-            </a:r>
+              <a:t>But you still have problems</a:t>
+            </a:r>
+            <a:endParaRPr lang="en-US" b="1" dirty="0">
+              <a:solidFill>
+                <a:schemeClr val="accent4"/>
+              </a:solidFill>
+            </a:endParaRPr>
           </a:p>
         </p:txBody>
       </p:sp>
@@ -5352,90 +6737,80 @@
             <p:ph idx="1"/>
           </p:nvPr>
         </p:nvSpPr>
-        <p:spPr/>
-        <p:txBody>
-          <a:bodyPr/>
-          <a:lstStyle/>
-          <a:p>
-            <a:r>
-              <a:rPr lang="en-US" dirty="0"/>
-              <a:t>Lets you move yourself up the value chain</a:t>
-            </a:r>
-          </a:p>
-          <a:p>
-            <a:r>
-              <a:rPr lang="en-US" dirty="0" err="1"/>
-              <a:t>Wardley</a:t>
-            </a:r>
-            <a:r>
-              <a:rPr lang="en-US" dirty="0"/>
-              <a:t> graph included here</a:t>
-            </a:r>
-          </a:p>
-          <a:p>
-            <a:pPr lvl="1"/>
-            <a:r>
-              <a:rPr lang="en-US" dirty="0"/>
-              <a:t>(revisit at the end when discussing adoption paths)</a:t>
-            </a:r>
-          </a:p>
-          <a:p>
-            <a:pPr lvl="2"/>
-            <a:r>
-              <a:rPr lang="en-US" dirty="0" err="1"/>
-              <a:t>Serverless</a:t>
-            </a:r>
-            <a:r>
-              <a:rPr lang="en-US" dirty="0"/>
-              <a:t> is focusing on the top of the value chain</a:t>
-            </a:r>
-          </a:p>
-          <a:p>
-            <a:pPr lvl="2"/>
-            <a:r>
-              <a:rPr lang="en-US" dirty="0"/>
-              <a:t>Lift and shift is focusing on the bottom of the value chain</a:t>
-            </a:r>
-          </a:p>
-          <a:p>
-            <a:endParaRPr lang="en-US" dirty="0"/>
-          </a:p>
-        </p:txBody>
-      </p:sp>
-      <p:pic>
-        <p:nvPicPr>
-          <p:cNvPr id="4" name="Picture 3"/>
-          <p:cNvPicPr>
-            <a:picLocks noChangeAspect="1"/>
-          </p:cNvPicPr>
-          <p:nvPr/>
-        </p:nvPicPr>
-        <p:blipFill>
-          <a:blip r:embed="rId2">
-            <a:extLst>
-              <a:ext uri="{28A0092B-C50C-407E-A947-70E740481C1C}">
-                <a14:useLocalDpi xmlns:a14="http://schemas.microsoft.com/office/drawing/2010/main" val="0"/>
-              </a:ext>
-            </a:extLst>
-          </a:blip>
-          <a:stretch>
-            <a:fillRect/>
-          </a:stretch>
-        </p:blipFill>
         <p:spPr>
           <a:xfrm>
-            <a:off x="1186489" y="1140447"/>
-            <a:ext cx="9058223" cy="5565896"/>
+            <a:off x="676275" y="1409700"/>
+            <a:ext cx="11220450" cy="4276725"/>
           </a:xfrm>
-          <a:prstGeom prst="rect">
-            <a:avLst/>
-          </a:prstGeom>
         </p:spPr>
-      </p:pic>
+        <p:txBody>
+          <a:bodyPr>
+            <a:normAutofit/>
+          </a:bodyPr>
+          <a:lstStyle/>
+          <a:p>
+            <a:endParaRPr lang="en-US" dirty="0"/>
+          </a:p>
+          <a:p>
+            <a:r>
+              <a:rPr lang="en-US" dirty="0" smtClean="0"/>
+              <a:t>Staying relevant (</a:t>
+            </a:r>
+            <a:r>
+              <a:rPr lang="en-US" dirty="0" err="1" smtClean="0"/>
+              <a:t>MySpace</a:t>
+            </a:r>
+            <a:r>
+              <a:rPr lang="en-US" dirty="0" smtClean="0"/>
+              <a:t>) - Facebook</a:t>
+            </a:r>
+          </a:p>
+          <a:p>
+            <a:r>
+              <a:rPr lang="en-US" dirty="0" smtClean="0"/>
+              <a:t>Scaling globally (?)</a:t>
+            </a:r>
+          </a:p>
+          <a:p>
+            <a:r>
+              <a:rPr lang="en-US" dirty="0" smtClean="0"/>
+              <a:t>Reaching new demographics (Netflix launches to 60 countries)</a:t>
+            </a:r>
+          </a:p>
+          <a:p>
+            <a:r>
+              <a:rPr lang="en-US" dirty="0" smtClean="0"/>
+              <a:t>Avoiding political pitfalls </a:t>
+            </a:r>
+          </a:p>
+          <a:p>
+            <a:r>
+              <a:rPr lang="en-US" dirty="0" smtClean="0"/>
+              <a:t>Creating new products/services</a:t>
+            </a:r>
+          </a:p>
+          <a:p>
+            <a:r>
+              <a:rPr lang="en-US" dirty="0" smtClean="0"/>
+              <a:t>Staying price competitive</a:t>
+            </a:r>
+          </a:p>
+          <a:p>
+            <a:r>
+              <a:rPr lang="en-US" dirty="0" smtClean="0"/>
+              <a:t>Adapting to change (Blockbuster)</a:t>
+            </a:r>
+            <a:endParaRPr lang="en-US" dirty="0"/>
+          </a:p>
+          <a:p>
+            <a:endParaRPr lang="en-US" dirty="0"/>
+          </a:p>
+        </p:txBody>
+      </p:sp>
     </p:spTree>
     <p:extLst>
       <p:ext uri="{BB962C8B-B14F-4D97-AF65-F5344CB8AC3E}">
-        <p14:creationId xmlns:p14="http://schemas.microsoft.com/office/powerpoint/2010/main" val="2922807310"/>
+        <p14:creationId xmlns:p14="http://schemas.microsoft.com/office/powerpoint/2010/main" val="1481959186"/>
       </p:ext>
     </p:extLst>
   </p:cSld>
@@ -5478,13 +6853,18 @@
           <a:lstStyle/>
           <a:p>
             <a:r>
-              <a:rPr lang="en-US" b="1" dirty="0">
+              <a:rPr lang="en-US" b="1" dirty="0" smtClean="0">
                 <a:solidFill>
                   <a:schemeClr val="accent4"/>
                 </a:solidFill>
               </a:rPr>
-              <a:t>DevOps best practices</a:t>
-            </a:r>
+              <a:t>Manager’s/Engineers/CXX’s Agenda</a:t>
+            </a:r>
+            <a:endParaRPr lang="en-US" b="1" dirty="0">
+              <a:solidFill>
+                <a:schemeClr val="accent4"/>
+              </a:solidFill>
+            </a:endParaRPr>
           </a:p>
         </p:txBody>
       </p:sp>
@@ -5504,46 +6884,58 @@
           <a:lstStyle/>
           <a:p>
             <a:r>
+              <a:rPr lang="en-US" dirty="0" smtClean="0"/>
+              <a:t>Manager/Engineer/CXX </a:t>
+            </a:r>
+          </a:p>
+          <a:p>
+            <a:r>
+              <a:rPr lang="en-US" dirty="0" smtClean="0"/>
+              <a:t>[Calendar blocks visual]</a:t>
+            </a:r>
+            <a:r>
               <a:rPr lang="en-US" dirty="0"/>
-              <a:t>Infrastructure as code</a:t>
-            </a:r>
-          </a:p>
-          <a:p>
-            <a:r>
-              <a:rPr lang="en-US" dirty="0"/>
-              <a:t>CI/CD for increased speed and stability</a:t>
-            </a:r>
-          </a:p>
-          <a:p>
-            <a:r>
-              <a:rPr lang="en-US" dirty="0"/>
-              <a:t>Monoliths to microservices to functions</a:t>
-            </a:r>
-          </a:p>
-          <a:p>
-            <a:r>
-              <a:rPr lang="en-US" dirty="0"/>
-              <a:t>Small teams, highly cohesive and loosely coupled</a:t>
-            </a:r>
-          </a:p>
-          <a:p>
-            <a:r>
-              <a:rPr lang="en-US" dirty="0"/>
-              <a:t>Only pay for what you use</a:t>
-            </a:r>
-          </a:p>
-          <a:p>
-            <a:r>
-              <a:rPr lang="en-US" dirty="0"/>
-              <a:t>Polyglot – the right language/framework for the job</a:t>
-            </a:r>
+              <a:t> </a:t>
+            </a:r>
+            <a:r>
+              <a:rPr lang="mr-IN" dirty="0" smtClean="0"/>
+              <a:t>–</a:t>
+            </a:r>
+            <a:r>
+              <a:rPr lang="en-US" dirty="0" smtClean="0"/>
+              <a:t> governance, meetings, reports, reviews</a:t>
+            </a:r>
+          </a:p>
+          <a:p>
+            <a:r>
+              <a:rPr lang="en-US" dirty="0" smtClean="0"/>
+              <a:t>Engineer : Delivery , requirements, test, train, provision, post-mortems</a:t>
+            </a:r>
+          </a:p>
+          <a:p>
+            <a:r>
+              <a:rPr lang="en-US" dirty="0" smtClean="0"/>
+              <a:t>CXX </a:t>
+            </a:r>
+            <a:r>
+              <a:rPr lang="mr-IN" dirty="0" smtClean="0"/>
+              <a:t>–</a:t>
+            </a:r>
+            <a:r>
+              <a:rPr lang="en-US" dirty="0" smtClean="0"/>
+              <a:t> wondering why no one is focused on the big business problems (how are they spending their time??!)</a:t>
+            </a:r>
+            <a:endParaRPr lang="en-US" dirty="0"/>
+          </a:p>
+          <a:p>
+            <a:endParaRPr lang="en-US" dirty="0"/>
           </a:p>
         </p:txBody>
       </p:sp>
     </p:spTree>
     <p:extLst>
       <p:ext uri="{BB962C8B-B14F-4D97-AF65-F5344CB8AC3E}">
-        <p14:creationId xmlns:p14="http://schemas.microsoft.com/office/powerpoint/2010/main" val="1859706539"/>
+        <p14:creationId xmlns:p14="http://schemas.microsoft.com/office/powerpoint/2010/main" val="1207999755"/>
       </p:ext>
     </p:extLst>
   </p:cSld>
@@ -5572,7 +6964,7 @@
       </p:grpSpPr>
       <p:sp>
         <p:nvSpPr>
-          <p:cNvPr id="2" name="Title 1"/>
+          <p:cNvPr id="4" name="Title 3"/>
           <p:cNvSpPr>
             <a:spLocks noGrp="1"/>
           </p:cNvSpPr>
@@ -5586,32 +6978,16 @@
           <a:lstStyle/>
           <a:p>
             <a:r>
-              <a:rPr lang="en-US" b="1" dirty="0">
-                <a:solidFill>
-                  <a:schemeClr val="accent4"/>
-                </a:solidFill>
-              </a:rPr>
-              <a:t>Benefits of </a:t>
-            </a:r>
-            <a:r>
-              <a:rPr lang="en-US" b="1" dirty="0" err="1">
-                <a:solidFill>
-                  <a:schemeClr val="accent4"/>
-                </a:solidFill>
-              </a:rPr>
-              <a:t>serverless</a:t>
-            </a:r>
-            <a:endParaRPr lang="en-US" b="1" dirty="0">
-              <a:solidFill>
-                <a:schemeClr val="accent4"/>
-              </a:solidFill>
-            </a:endParaRPr>
-          </a:p>
-        </p:txBody>
-      </p:sp>
-      <p:sp>
-        <p:nvSpPr>
-          <p:cNvPr id="3" name="Content Placeholder 2"/>
+              <a:rPr lang="en-US" dirty="0" smtClean="0"/>
+              <a:t>Workflow analysis report</a:t>
+            </a:r>
+            <a:endParaRPr lang="en-US" dirty="0"/>
+          </a:p>
+        </p:txBody>
+      </p:sp>
+      <p:sp>
+        <p:nvSpPr>
+          <p:cNvPr id="5" name="Content Placeholder 4"/>
           <p:cNvSpPr>
             <a:spLocks noGrp="1"/>
           </p:cNvSpPr>
@@ -5625,49 +7001,19 @@
           <a:lstStyle/>
           <a:p>
             <a:r>
-              <a:rPr lang="en-US" dirty="0"/>
-              <a:t>True variable cost computing</a:t>
-            </a:r>
-          </a:p>
-          <a:p>
-            <a:r>
-              <a:rPr lang="en-US" dirty="0"/>
-              <a:t>Time to market goes from months or weeks to days or hours</a:t>
-            </a:r>
-          </a:p>
-          <a:p>
-            <a:r>
-              <a:rPr lang="en-US" dirty="0"/>
-              <a:t>Built in support for things you should be doing already</a:t>
-            </a:r>
-          </a:p>
-          <a:p>
-            <a:pPr lvl="1"/>
-            <a:r>
-              <a:rPr lang="en-US" dirty="0"/>
-              <a:t>Infrastructure as code</a:t>
-            </a:r>
-          </a:p>
-          <a:p>
-            <a:pPr lvl="1"/>
-            <a:r>
-              <a:rPr lang="en-US" dirty="0"/>
-              <a:t>API driven development and data analysis to inform product development</a:t>
-            </a:r>
-          </a:p>
-          <a:p>
-            <a:pPr lvl="1"/>
-            <a:r>
-              <a:rPr lang="en-US" dirty="0"/>
-              <a:t>Small teams</a:t>
-            </a:r>
+              <a:rPr lang="en-US" dirty="0" smtClean="0"/>
+              <a:t>Job Descriptions -&gt; How time is actually spent</a:t>
+            </a:r>
+          </a:p>
+          <a:p>
+            <a:endParaRPr lang="en-US" dirty="0" smtClean="0"/>
           </a:p>
         </p:txBody>
       </p:sp>
     </p:spTree>
     <p:extLst>
       <p:ext uri="{BB962C8B-B14F-4D97-AF65-F5344CB8AC3E}">
-        <p14:creationId xmlns:p14="http://schemas.microsoft.com/office/powerpoint/2010/main" val="2276068305"/>
+        <p14:creationId xmlns:p14="http://schemas.microsoft.com/office/powerpoint/2010/main" val="2318218812"/>
       </p:ext>
     </p:extLst>
   </p:cSld>
@@ -5970,4 +7316,265 @@
     </a:ext>
   </a:extLst>
 </a:theme>
+</file>
+
+<file path=ppt/theme/theme2.xml><?xml version="1.0" encoding="utf-8"?>
+<a:theme xmlns:a="http://schemas.openxmlformats.org/drawingml/2006/main" name="Office Theme">
+  <a:themeElements>
+    <a:clrScheme name="Office">
+      <a:dk1>
+        <a:sysClr val="windowText" lastClr="000000"/>
+      </a:dk1>
+      <a:lt1>
+        <a:sysClr val="window" lastClr="FFFFFF"/>
+      </a:lt1>
+      <a:dk2>
+        <a:srgbClr val="44546A"/>
+      </a:dk2>
+      <a:lt2>
+        <a:srgbClr val="E7E6E6"/>
+      </a:lt2>
+      <a:accent1>
+        <a:srgbClr val="4472C4"/>
+      </a:accent1>
+      <a:accent2>
+        <a:srgbClr val="ED7D31"/>
+      </a:accent2>
+      <a:accent3>
+        <a:srgbClr val="A5A5A5"/>
+      </a:accent3>
+      <a:accent4>
+        <a:srgbClr val="FFC000"/>
+      </a:accent4>
+      <a:accent5>
+        <a:srgbClr val="5B9BD5"/>
+      </a:accent5>
+      <a:accent6>
+        <a:srgbClr val="70AD47"/>
+      </a:accent6>
+      <a:hlink>
+        <a:srgbClr val="0563C1"/>
+      </a:hlink>
+      <a:folHlink>
+        <a:srgbClr val="954F72"/>
+      </a:folHlink>
+    </a:clrScheme>
+    <a:fontScheme name="Office">
+      <a:majorFont>
+        <a:latin typeface="Calibri Light" panose="020F0302020204030204"/>
+        <a:ea typeface=""/>
+        <a:cs typeface=""/>
+        <a:font script="Jpan" typeface="Yu Gothic Light"/>
+        <a:font script="Hang" typeface="맑은 고딕"/>
+        <a:font script="Hans" typeface="DengXian Light"/>
+        <a:font script="Hant" typeface="新細明體"/>
+        <a:font script="Arab" typeface="Times New Roman"/>
+        <a:font script="Hebr" typeface="Times New Roman"/>
+        <a:font script="Thai" typeface="Angsana New"/>
+        <a:font script="Ethi" typeface="Nyala"/>
+        <a:font script="Beng" typeface="Vrinda"/>
+        <a:font script="Gujr" typeface="Shruti"/>
+        <a:font script="Khmr" typeface="MoolBoran"/>
+        <a:font script="Knda" typeface="Tunga"/>
+        <a:font script="Guru" typeface="Raavi"/>
+        <a:font script="Cans" typeface="Euphemia"/>
+        <a:font script="Cher" typeface="Plantagenet Cherokee"/>
+        <a:font script="Yiii" typeface="Microsoft Yi Baiti"/>
+        <a:font script="Tibt" typeface="Microsoft Himalaya"/>
+        <a:font script="Thaa" typeface="MV Boli"/>
+        <a:font script="Deva" typeface="Mangal"/>
+        <a:font script="Telu" typeface="Gautami"/>
+        <a:font script="Taml" typeface="Latha"/>
+        <a:font script="Syrc" typeface="Estrangelo Edessa"/>
+        <a:font script="Orya" typeface="Kalinga"/>
+        <a:font script="Mlym" typeface="Kartika"/>
+        <a:font script="Laoo" typeface="DokChampa"/>
+        <a:font script="Sinh" typeface="Iskoola Pota"/>
+        <a:font script="Mong" typeface="Mongolian Baiti"/>
+        <a:font script="Viet" typeface="Times New Roman"/>
+        <a:font script="Uigh" typeface="Microsoft Uighur"/>
+        <a:font script="Geor" typeface="Sylfaen"/>
+      </a:majorFont>
+      <a:minorFont>
+        <a:latin typeface="Calibri" panose="020F0502020204030204"/>
+        <a:ea typeface=""/>
+        <a:cs typeface=""/>
+        <a:font script="Jpan" typeface="Yu Gothic"/>
+        <a:font script="Hang" typeface="맑은 고딕"/>
+        <a:font script="Hans" typeface="DengXian"/>
+        <a:font script="Hant" typeface="新細明體"/>
+        <a:font script="Arab" typeface="Arial"/>
+        <a:font script="Hebr" typeface="Arial"/>
+        <a:font script="Thai" typeface="Cordia New"/>
+        <a:font script="Ethi" typeface="Nyala"/>
+        <a:font script="Beng" typeface="Vrinda"/>
+        <a:font script="Gujr" typeface="Shruti"/>
+        <a:font script="Khmr" typeface="DaunPenh"/>
+        <a:font script="Knda" typeface="Tunga"/>
+        <a:font script="Guru" typeface="Raavi"/>
+        <a:font script="Cans" typeface="Euphemia"/>
+        <a:font script="Cher" typeface="Plantagenet Cherokee"/>
+        <a:font script="Yiii" typeface="Microsoft Yi Baiti"/>
+        <a:font script="Tibt" typeface="Microsoft Himalaya"/>
+        <a:font script="Thaa" typeface="MV Boli"/>
+        <a:font script="Deva" typeface="Mangal"/>
+        <a:font script="Telu" typeface="Gautami"/>
+        <a:font script="Taml" typeface="Latha"/>
+        <a:font script="Syrc" typeface="Estrangelo Edessa"/>
+        <a:font script="Orya" typeface="Kalinga"/>
+        <a:font script="Mlym" typeface="Kartika"/>
+        <a:font script="Laoo" typeface="DokChampa"/>
+        <a:font script="Sinh" typeface="Iskoola Pota"/>
+        <a:font script="Mong" typeface="Mongolian Baiti"/>
+        <a:font script="Viet" typeface="Arial"/>
+        <a:font script="Uigh" typeface="Microsoft Uighur"/>
+        <a:font script="Geor" typeface="Sylfaen"/>
+      </a:minorFont>
+    </a:fontScheme>
+    <a:fmtScheme name="Office">
+      <a:fillStyleLst>
+        <a:solidFill>
+          <a:schemeClr val="phClr"/>
+        </a:solidFill>
+        <a:gradFill rotWithShape="1">
+          <a:gsLst>
+            <a:gs pos="0">
+              <a:schemeClr val="phClr">
+                <a:lumMod val="110000"/>
+                <a:satMod val="105000"/>
+                <a:tint val="67000"/>
+              </a:schemeClr>
+            </a:gs>
+            <a:gs pos="50000">
+              <a:schemeClr val="phClr">
+                <a:lumMod val="105000"/>
+                <a:satMod val="103000"/>
+                <a:tint val="73000"/>
+              </a:schemeClr>
+            </a:gs>
+            <a:gs pos="100000">
+              <a:schemeClr val="phClr">
+                <a:lumMod val="105000"/>
+                <a:satMod val="109000"/>
+                <a:tint val="81000"/>
+              </a:schemeClr>
+            </a:gs>
+          </a:gsLst>
+          <a:lin ang="5400000" scaled="0"/>
+        </a:gradFill>
+        <a:gradFill rotWithShape="1">
+          <a:gsLst>
+            <a:gs pos="0">
+              <a:schemeClr val="phClr">
+                <a:satMod val="103000"/>
+                <a:lumMod val="102000"/>
+                <a:tint val="94000"/>
+              </a:schemeClr>
+            </a:gs>
+            <a:gs pos="50000">
+              <a:schemeClr val="phClr">
+                <a:satMod val="110000"/>
+                <a:lumMod val="100000"/>
+                <a:shade val="100000"/>
+              </a:schemeClr>
+            </a:gs>
+            <a:gs pos="100000">
+              <a:schemeClr val="phClr">
+                <a:lumMod val="99000"/>
+                <a:satMod val="120000"/>
+                <a:shade val="78000"/>
+              </a:schemeClr>
+            </a:gs>
+          </a:gsLst>
+          <a:lin ang="5400000" scaled="0"/>
+        </a:gradFill>
+      </a:fillStyleLst>
+      <a:lnStyleLst>
+        <a:ln w="6350" cap="flat" cmpd="sng" algn="ctr">
+          <a:solidFill>
+            <a:schemeClr val="phClr"/>
+          </a:solidFill>
+          <a:prstDash val="solid"/>
+          <a:miter lim="800000"/>
+        </a:ln>
+        <a:ln w="12700" cap="flat" cmpd="sng" algn="ctr">
+          <a:solidFill>
+            <a:schemeClr val="phClr"/>
+          </a:solidFill>
+          <a:prstDash val="solid"/>
+          <a:miter lim="800000"/>
+        </a:ln>
+        <a:ln w="19050" cap="flat" cmpd="sng" algn="ctr">
+          <a:solidFill>
+            <a:schemeClr val="phClr"/>
+          </a:solidFill>
+          <a:prstDash val="solid"/>
+          <a:miter lim="800000"/>
+        </a:ln>
+      </a:lnStyleLst>
+      <a:effectStyleLst>
+        <a:effectStyle>
+          <a:effectLst/>
+        </a:effectStyle>
+        <a:effectStyle>
+          <a:effectLst/>
+        </a:effectStyle>
+        <a:effectStyle>
+          <a:effectLst>
+            <a:outerShdw blurRad="57150" dist="19050" dir="5400000" algn="ctr" rotWithShape="0">
+              <a:srgbClr val="000000">
+                <a:alpha val="63000"/>
+              </a:srgbClr>
+            </a:outerShdw>
+          </a:effectLst>
+        </a:effectStyle>
+      </a:effectStyleLst>
+      <a:bgFillStyleLst>
+        <a:solidFill>
+          <a:schemeClr val="phClr"/>
+        </a:solidFill>
+        <a:solidFill>
+          <a:schemeClr val="phClr">
+            <a:tint val="95000"/>
+            <a:satMod val="170000"/>
+          </a:schemeClr>
+        </a:solidFill>
+        <a:gradFill rotWithShape="1">
+          <a:gsLst>
+            <a:gs pos="0">
+              <a:schemeClr val="phClr">
+                <a:tint val="93000"/>
+                <a:satMod val="150000"/>
+                <a:shade val="98000"/>
+                <a:lumMod val="102000"/>
+              </a:schemeClr>
+            </a:gs>
+            <a:gs pos="50000">
+              <a:schemeClr val="phClr">
+                <a:tint val="98000"/>
+                <a:satMod val="130000"/>
+                <a:shade val="90000"/>
+                <a:lumMod val="103000"/>
+              </a:schemeClr>
+            </a:gs>
+            <a:gs pos="100000">
+              <a:schemeClr val="phClr">
+                <a:shade val="63000"/>
+                <a:satMod val="120000"/>
+              </a:schemeClr>
+            </a:gs>
+          </a:gsLst>
+          <a:lin ang="5400000" scaled="0"/>
+        </a:gradFill>
+      </a:bgFillStyleLst>
+    </a:fmtScheme>
+  </a:themeElements>
+  <a:objectDefaults/>
+  <a:extraClrSchemeLst/>
+  <a:extLst>
+    <a:ext uri="{05A4C25C-085E-4340-85A3-A5531E510DB2}">
+      <thm15:themeFamily xmlns:thm15="http://schemas.microsoft.com/office/thememl/2012/main" name="Office Theme" id="{62F939B6-93AF-4DB8-9C6B-D6C7DFDC589F}" vid="{4A3C46E8-61CC-4603-A589-7422A47A8E4A}"/>
+    </a:ext>
+  </a:extLst>
+</a:theme>
 </file>
</xml_diff>